<commit_message>
RBAC user-group-role added to com-api-user. com-lib removed.
</commit_message>
<xml_diff>
--- a/MOF.pptx
+++ b/MOF.pptx
@@ -2,14 +2,15 @@
 <file path=ppt/presentation.xml><?xml version="1.0" encoding="utf-8"?>
 <p:presentation xmlns:a="http://schemas.openxmlformats.org/drawingml/2006/main" xmlns:r="http://schemas.openxmlformats.org/officeDocument/2006/relationships" xmlns:p="http://schemas.openxmlformats.org/presentationml/2006/main" saveSubsetFonts="1">
   <p:sldMasterIdLst>
-    <p:sldMasterId id="2147483648" r:id="rId13"/>
+    <p:sldMasterId id="2147483648" r:id="rId15"/>
   </p:sldMasterIdLst>
   <p:sldIdLst>
-    <p:sldId id="2147375798" r:id="rId14"/>
-    <p:sldId id="2147375801" r:id="rId15"/>
-    <p:sldId id="2147375799" r:id="rId16"/>
-    <p:sldId id="2147375800" r:id="rId17"/>
-    <p:sldId id="2147375802" r:id="rId18"/>
+    <p:sldId id="2147375798" r:id="rId16"/>
+    <p:sldId id="2147375801" r:id="rId17"/>
+    <p:sldId id="2147375799" r:id="rId18"/>
+    <p:sldId id="2147375800" r:id="rId19"/>
+    <p:sldId id="2147375802" r:id="rId20"/>
+    <p:sldId id="2147375803" r:id="rId21"/>
   </p:sldIdLst>
   <p:sldSz cx="12192000" cy="6858000"/>
   <p:notesSz cx="6858000" cy="9144000"/>
@@ -263,7 +264,7 @@
           <a:p>
             <a:fld id="{04EA401D-5055-4814-A1ED-3DA3CC804920}" type="datetimeFigureOut">
               <a:rPr lang="en-US" smtClean="0"/>
-              <a:t>4/16/2022</a:t>
+              <a:t>4/18/2022</a:t>
             </a:fld>
             <a:endParaRPr lang="en-US"/>
           </a:p>
@@ -461,7 +462,7 @@
           <a:p>
             <a:fld id="{04EA401D-5055-4814-A1ED-3DA3CC804920}" type="datetimeFigureOut">
               <a:rPr lang="en-US" smtClean="0"/>
-              <a:t>4/16/2022</a:t>
+              <a:t>4/18/2022</a:t>
             </a:fld>
             <a:endParaRPr lang="en-US"/>
           </a:p>
@@ -669,7 +670,7 @@
           <a:p>
             <a:fld id="{04EA401D-5055-4814-A1ED-3DA3CC804920}" type="datetimeFigureOut">
               <a:rPr lang="en-US" smtClean="0"/>
-              <a:t>4/16/2022</a:t>
+              <a:t>4/18/2022</a:t>
             </a:fld>
             <a:endParaRPr lang="en-US"/>
           </a:p>
@@ -790,7 +791,7 @@
           <a:graphicData uri="http://schemas.openxmlformats.org/presentationml/2006/ole">
             <mc:AlternateContent xmlns:mc="http://schemas.openxmlformats.org/markup-compatibility/2006">
               <mc:Choice xmlns:v="urn:schemas-microsoft-com:vml" Requires="v">
-                <p:oleObj spid="_x0000_s1658" name="think-cell Slide" r:id="rId5" imgW="479" imgH="478" progId="TCLayout.ActiveDocument.1">
+                <p:oleObj spid="_x0000_s1708" name="think-cell Slide" r:id="rId5" imgW="479" imgH="478" progId="TCLayout.ActiveDocument.1">
                   <p:embed/>
                 </p:oleObj>
               </mc:Choice>
@@ -1313,7 +1314,7 @@
           <a:p>
             <a:fld id="{04EA401D-5055-4814-A1ED-3DA3CC804920}" type="datetimeFigureOut">
               <a:rPr lang="en-US" smtClean="0"/>
-              <a:t>4/16/2022</a:t>
+              <a:t>4/18/2022</a:t>
             </a:fld>
             <a:endParaRPr lang="en-US"/>
           </a:p>
@@ -1588,7 +1589,7 @@
           <a:p>
             <a:fld id="{04EA401D-5055-4814-A1ED-3DA3CC804920}" type="datetimeFigureOut">
               <a:rPr lang="en-US" smtClean="0"/>
-              <a:t>4/16/2022</a:t>
+              <a:t>4/18/2022</a:t>
             </a:fld>
             <a:endParaRPr lang="en-US"/>
           </a:p>
@@ -1853,7 +1854,7 @@
           <a:p>
             <a:fld id="{04EA401D-5055-4814-A1ED-3DA3CC804920}" type="datetimeFigureOut">
               <a:rPr lang="en-US" smtClean="0"/>
-              <a:t>4/16/2022</a:t>
+              <a:t>4/18/2022</a:t>
             </a:fld>
             <a:endParaRPr lang="en-US"/>
           </a:p>
@@ -2265,7 +2266,7 @@
           <a:p>
             <a:fld id="{04EA401D-5055-4814-A1ED-3DA3CC804920}" type="datetimeFigureOut">
               <a:rPr lang="en-US" smtClean="0"/>
-              <a:t>4/16/2022</a:t>
+              <a:t>4/18/2022</a:t>
             </a:fld>
             <a:endParaRPr lang="en-US"/>
           </a:p>
@@ -2406,7 +2407,7 @@
           <a:p>
             <a:fld id="{04EA401D-5055-4814-A1ED-3DA3CC804920}" type="datetimeFigureOut">
               <a:rPr lang="en-US" smtClean="0"/>
-              <a:t>4/16/2022</a:t>
+              <a:t>4/18/2022</a:t>
             </a:fld>
             <a:endParaRPr lang="en-US"/>
           </a:p>
@@ -2519,7 +2520,7 @@
           <a:p>
             <a:fld id="{04EA401D-5055-4814-A1ED-3DA3CC804920}" type="datetimeFigureOut">
               <a:rPr lang="en-US" smtClean="0"/>
-              <a:t>4/16/2022</a:t>
+              <a:t>4/18/2022</a:t>
             </a:fld>
             <a:endParaRPr lang="en-US"/>
           </a:p>
@@ -2830,7 +2831,7 @@
           <a:p>
             <a:fld id="{04EA401D-5055-4814-A1ED-3DA3CC804920}" type="datetimeFigureOut">
               <a:rPr lang="en-US" smtClean="0"/>
-              <a:t>4/16/2022</a:t>
+              <a:t>4/18/2022</a:t>
             </a:fld>
             <a:endParaRPr lang="en-US"/>
           </a:p>
@@ -3118,7 +3119,7 @@
           <a:p>
             <a:fld id="{04EA401D-5055-4814-A1ED-3DA3CC804920}" type="datetimeFigureOut">
               <a:rPr lang="en-US" smtClean="0"/>
-              <a:t>4/16/2022</a:t>
+              <a:t>4/18/2022</a:t>
             </a:fld>
             <a:endParaRPr lang="en-US"/>
           </a:p>
@@ -3359,7 +3360,7 @@
           <a:p>
             <a:fld id="{04EA401D-5055-4814-A1ED-3DA3CC804920}" type="datetimeFigureOut">
               <a:rPr lang="en-US" smtClean="0"/>
-              <a:t>4/16/2022</a:t>
+              <a:t>4/18/2022</a:t>
             </a:fld>
             <a:endParaRPr lang="en-US"/>
           </a:p>
@@ -10734,6 +10735,1536 @@
 </p:sld>
 </file>
 
+<file path=ppt/slides/slide6.xml><?xml version="1.0" encoding="utf-8"?>
+<p:sld xmlns:a="http://schemas.openxmlformats.org/drawingml/2006/main" xmlns:r="http://schemas.openxmlformats.org/officeDocument/2006/relationships" xmlns:p="http://schemas.openxmlformats.org/presentationml/2006/main">
+  <p:cSld>
+    <p:spTree>
+      <p:nvGrpSpPr>
+        <p:cNvPr id="1" name=""/>
+        <p:cNvGrpSpPr/>
+        <p:nvPr/>
+      </p:nvGrpSpPr>
+      <p:grpSpPr>
+        <a:xfrm>
+          <a:off x="0" y="0"/>
+          <a:ext cx="0" cy="0"/>
+          <a:chOff x="0" y="0"/>
+          <a:chExt cx="0" cy="0"/>
+        </a:xfrm>
+      </p:grpSpPr>
+      <p:sp>
+        <p:nvSpPr>
+          <p:cNvPr id="36" name="Rectangle 35">
+            <a:extLst>
+              <a:ext uri="{FF2B5EF4-FFF2-40B4-BE49-F238E27FC236}">
+                <a16:creationId xmlns:a16="http://schemas.microsoft.com/office/drawing/2014/main" id="{8E291A00-5DA5-46FA-AB74-4C16C694FDA3}"/>
+              </a:ext>
+            </a:extLst>
+          </p:cNvPr>
+          <p:cNvSpPr/>
+          <p:nvPr/>
+        </p:nvSpPr>
+        <p:spPr>
+          <a:xfrm>
+            <a:off x="563370" y="2157574"/>
+            <a:ext cx="10481350" cy="1557322"/>
+          </a:xfrm>
+          <a:prstGeom prst="rect">
+            <a:avLst/>
+          </a:prstGeom>
+        </p:spPr>
+        <p:style>
+          <a:lnRef idx="2">
+            <a:schemeClr val="accent1">
+              <a:shade val="50000"/>
+            </a:schemeClr>
+          </a:lnRef>
+          <a:fillRef idx="1">
+            <a:schemeClr val="accent1"/>
+          </a:fillRef>
+          <a:effectRef idx="0">
+            <a:schemeClr val="accent1"/>
+          </a:effectRef>
+          <a:fontRef idx="minor">
+            <a:schemeClr val="lt1"/>
+          </a:fontRef>
+        </p:style>
+        <p:txBody>
+          <a:bodyPr rtlCol="0" anchor="ctr"/>
+          <a:lstStyle/>
+          <a:p>
+            <a:pPr algn="ctr"/>
+            <a:endParaRPr lang="en-US"/>
+          </a:p>
+        </p:txBody>
+      </p:sp>
+      <p:sp>
+        <p:nvSpPr>
+          <p:cNvPr id="2" name="Title 1">
+            <a:extLst>
+              <a:ext uri="{FF2B5EF4-FFF2-40B4-BE49-F238E27FC236}">
+                <a16:creationId xmlns:a16="http://schemas.microsoft.com/office/drawing/2014/main" id="{F3802A6F-0493-7845-9E0B-F82F7ED5C4E8}"/>
+              </a:ext>
+            </a:extLst>
+          </p:cNvPr>
+          <p:cNvSpPr>
+            <a:spLocks noGrp="1"/>
+          </p:cNvSpPr>
+          <p:nvPr>
+            <p:ph type="title"/>
+          </p:nvPr>
+        </p:nvSpPr>
+        <p:spPr>
+          <a:xfrm>
+            <a:off x="278204" y="249504"/>
+            <a:ext cx="10031916" cy="644842"/>
+          </a:xfrm>
+        </p:spPr>
+        <p:txBody>
+          <a:bodyPr>
+            <a:normAutofit fontScale="90000"/>
+          </a:bodyPr>
+          <a:lstStyle/>
+          <a:p>
+            <a:r>
+              <a:rPr lang="en-US" dirty="0"/>
+              <a:t>Realize Processed – Boundaries between core engine and custom implementation </a:t>
+            </a:r>
+          </a:p>
+        </p:txBody>
+      </p:sp>
+      <p:sp>
+        <p:nvSpPr>
+          <p:cNvPr id="30" name="Rectangle: Rounded Corners 29">
+            <a:extLst>
+              <a:ext uri="{FF2B5EF4-FFF2-40B4-BE49-F238E27FC236}">
+                <a16:creationId xmlns:a16="http://schemas.microsoft.com/office/drawing/2014/main" id="{C3652913-5810-40EB-BCB1-4C1C82FB75B6}"/>
+              </a:ext>
+            </a:extLst>
+          </p:cNvPr>
+          <p:cNvSpPr/>
+          <p:nvPr/>
+        </p:nvSpPr>
+        <p:spPr>
+          <a:xfrm>
+            <a:off x="680484" y="2986756"/>
+            <a:ext cx="830241" cy="504000"/>
+          </a:xfrm>
+          <a:prstGeom prst="roundRect">
+            <a:avLst/>
+          </a:prstGeom>
+          <a:solidFill>
+            <a:schemeClr val="accent4">
+              <a:lumMod val="20000"/>
+              <a:lumOff val="80000"/>
+            </a:schemeClr>
+          </a:solidFill>
+        </p:spPr>
+        <p:style>
+          <a:lnRef idx="2">
+            <a:schemeClr val="accent1">
+              <a:shade val="50000"/>
+            </a:schemeClr>
+          </a:lnRef>
+          <a:fillRef idx="1">
+            <a:schemeClr val="accent1"/>
+          </a:fillRef>
+          <a:effectRef idx="0">
+            <a:schemeClr val="accent1"/>
+          </a:effectRef>
+          <a:fontRef idx="minor">
+            <a:schemeClr val="lt1"/>
+          </a:fontRef>
+        </p:style>
+        <p:txBody>
+          <a:bodyPr rtlCol="0" anchor="ctr"/>
+          <a:lstStyle/>
+          <a:p>
+            <a:pPr algn="ctr"/>
+            <a:r>
+              <a:rPr lang="en-IN" sz="800" dirty="0">
+                <a:solidFill>
+                  <a:schemeClr val="tx1"/>
+                </a:solidFill>
+              </a:rPr>
+              <a:t>Check Application Completeness</a:t>
+            </a:r>
+            <a:endParaRPr lang="en-US" sz="800" dirty="0">
+              <a:solidFill>
+                <a:schemeClr val="tx1"/>
+              </a:solidFill>
+            </a:endParaRPr>
+          </a:p>
+        </p:txBody>
+      </p:sp>
+      <p:sp>
+        <p:nvSpPr>
+          <p:cNvPr id="44" name="Rectangle: Rounded Corners 43">
+            <a:extLst>
+              <a:ext uri="{FF2B5EF4-FFF2-40B4-BE49-F238E27FC236}">
+                <a16:creationId xmlns:a16="http://schemas.microsoft.com/office/drawing/2014/main" id="{68923BF8-E49E-4F94-917F-DF1386571ADC}"/>
+              </a:ext>
+            </a:extLst>
+          </p:cNvPr>
+          <p:cNvSpPr/>
+          <p:nvPr/>
+        </p:nvSpPr>
+        <p:spPr>
+          <a:xfrm>
+            <a:off x="2529726" y="2986756"/>
+            <a:ext cx="830241" cy="504000"/>
+          </a:xfrm>
+          <a:prstGeom prst="roundRect">
+            <a:avLst/>
+          </a:prstGeom>
+          <a:solidFill>
+            <a:schemeClr val="accent4">
+              <a:lumMod val="20000"/>
+              <a:lumOff val="80000"/>
+            </a:schemeClr>
+          </a:solidFill>
+        </p:spPr>
+        <p:style>
+          <a:lnRef idx="2">
+            <a:schemeClr val="accent1">
+              <a:shade val="50000"/>
+            </a:schemeClr>
+          </a:lnRef>
+          <a:fillRef idx="1">
+            <a:schemeClr val="accent1"/>
+          </a:fillRef>
+          <a:effectRef idx="0">
+            <a:schemeClr val="accent1"/>
+          </a:effectRef>
+          <a:fontRef idx="minor">
+            <a:schemeClr val="lt1"/>
+          </a:fontRef>
+        </p:style>
+        <p:txBody>
+          <a:bodyPr rtlCol="0" anchor="ctr"/>
+          <a:lstStyle/>
+          <a:p>
+            <a:pPr algn="ctr"/>
+            <a:r>
+              <a:rPr lang="en-IN" sz="800" dirty="0">
+                <a:solidFill>
+                  <a:schemeClr val="tx1"/>
+                </a:solidFill>
+              </a:rPr>
+              <a:t>Validate Borrowers</a:t>
+            </a:r>
+            <a:endParaRPr lang="en-US" sz="800" dirty="0">
+              <a:solidFill>
+                <a:schemeClr val="tx1"/>
+              </a:solidFill>
+            </a:endParaRPr>
+          </a:p>
+        </p:txBody>
+      </p:sp>
+      <p:sp>
+        <p:nvSpPr>
+          <p:cNvPr id="56" name="Rectangle: Rounded Corners 55">
+            <a:extLst>
+              <a:ext uri="{FF2B5EF4-FFF2-40B4-BE49-F238E27FC236}">
+                <a16:creationId xmlns:a16="http://schemas.microsoft.com/office/drawing/2014/main" id="{609BDC6D-1EA6-4BBC-8558-FF2A0D308799}"/>
+              </a:ext>
+            </a:extLst>
+          </p:cNvPr>
+          <p:cNvSpPr/>
+          <p:nvPr/>
+        </p:nvSpPr>
+        <p:spPr>
+          <a:xfrm>
+            <a:off x="3454347" y="2986756"/>
+            <a:ext cx="830241" cy="504000"/>
+          </a:xfrm>
+          <a:prstGeom prst="roundRect">
+            <a:avLst/>
+          </a:prstGeom>
+          <a:solidFill>
+            <a:schemeClr val="accent4">
+              <a:lumMod val="20000"/>
+              <a:lumOff val="80000"/>
+            </a:schemeClr>
+          </a:solidFill>
+        </p:spPr>
+        <p:style>
+          <a:lnRef idx="2">
+            <a:schemeClr val="accent1">
+              <a:shade val="50000"/>
+            </a:schemeClr>
+          </a:lnRef>
+          <a:fillRef idx="1">
+            <a:schemeClr val="accent1"/>
+          </a:fillRef>
+          <a:effectRef idx="0">
+            <a:schemeClr val="accent1"/>
+          </a:effectRef>
+          <a:fontRef idx="minor">
+            <a:schemeClr val="lt1"/>
+          </a:fontRef>
+        </p:style>
+        <p:txBody>
+          <a:bodyPr rtlCol="0" anchor="ctr"/>
+          <a:lstStyle/>
+          <a:p>
+            <a:pPr algn="ctr"/>
+            <a:r>
+              <a:rPr lang="en-IN" sz="800" dirty="0">
+                <a:solidFill>
+                  <a:schemeClr val="tx1"/>
+                </a:solidFill>
+              </a:rPr>
+              <a:t>Validate Property</a:t>
+            </a:r>
+            <a:endParaRPr lang="en-US" sz="800" dirty="0">
+              <a:solidFill>
+                <a:schemeClr val="tx1"/>
+              </a:solidFill>
+            </a:endParaRPr>
+          </a:p>
+        </p:txBody>
+      </p:sp>
+      <p:sp>
+        <p:nvSpPr>
+          <p:cNvPr id="58" name="Rectangle: Rounded Corners 57">
+            <a:extLst>
+              <a:ext uri="{FF2B5EF4-FFF2-40B4-BE49-F238E27FC236}">
+                <a16:creationId xmlns:a16="http://schemas.microsoft.com/office/drawing/2014/main" id="{9D736D1D-DDB9-45B3-ADC5-864E16C7AE3C}"/>
+              </a:ext>
+            </a:extLst>
+          </p:cNvPr>
+          <p:cNvSpPr/>
+          <p:nvPr/>
+        </p:nvSpPr>
+        <p:spPr>
+          <a:xfrm>
+            <a:off x="4378968" y="2986756"/>
+            <a:ext cx="830241" cy="504000"/>
+          </a:xfrm>
+          <a:prstGeom prst="roundRect">
+            <a:avLst/>
+          </a:prstGeom>
+          <a:solidFill>
+            <a:schemeClr val="accent4">
+              <a:lumMod val="20000"/>
+              <a:lumOff val="80000"/>
+            </a:schemeClr>
+          </a:solidFill>
+        </p:spPr>
+        <p:style>
+          <a:lnRef idx="2">
+            <a:schemeClr val="accent1">
+              <a:shade val="50000"/>
+            </a:schemeClr>
+          </a:lnRef>
+          <a:fillRef idx="1">
+            <a:schemeClr val="accent1"/>
+          </a:fillRef>
+          <a:effectRef idx="0">
+            <a:schemeClr val="accent1"/>
+          </a:effectRef>
+          <a:fontRef idx="minor">
+            <a:schemeClr val="lt1"/>
+          </a:fontRef>
+        </p:style>
+        <p:txBody>
+          <a:bodyPr rtlCol="0" anchor="ctr"/>
+          <a:lstStyle/>
+          <a:p>
+            <a:pPr algn="ctr"/>
+            <a:r>
+              <a:rPr lang="en-IN" sz="800" dirty="0">
+                <a:solidFill>
+                  <a:schemeClr val="tx1"/>
+                </a:solidFill>
+              </a:rPr>
+              <a:t>Check Borrower Employment</a:t>
+            </a:r>
+            <a:endParaRPr lang="en-US" sz="800" dirty="0">
+              <a:solidFill>
+                <a:schemeClr val="tx1"/>
+              </a:solidFill>
+            </a:endParaRPr>
+          </a:p>
+        </p:txBody>
+      </p:sp>
+      <p:sp>
+        <p:nvSpPr>
+          <p:cNvPr id="61" name="Rectangle: Rounded Corners 60">
+            <a:extLst>
+              <a:ext uri="{FF2B5EF4-FFF2-40B4-BE49-F238E27FC236}">
+                <a16:creationId xmlns:a16="http://schemas.microsoft.com/office/drawing/2014/main" id="{0DDE9FA2-1F27-439F-81F5-3DC980DAD4EA}"/>
+              </a:ext>
+            </a:extLst>
+          </p:cNvPr>
+          <p:cNvSpPr/>
+          <p:nvPr/>
+        </p:nvSpPr>
+        <p:spPr>
+          <a:xfrm>
+            <a:off x="5303589" y="2986756"/>
+            <a:ext cx="830241" cy="504000"/>
+          </a:xfrm>
+          <a:prstGeom prst="roundRect">
+            <a:avLst/>
+          </a:prstGeom>
+          <a:solidFill>
+            <a:schemeClr val="accent4">
+              <a:lumMod val="20000"/>
+              <a:lumOff val="80000"/>
+            </a:schemeClr>
+          </a:solidFill>
+        </p:spPr>
+        <p:style>
+          <a:lnRef idx="2">
+            <a:schemeClr val="accent1">
+              <a:shade val="50000"/>
+            </a:schemeClr>
+          </a:lnRef>
+          <a:fillRef idx="1">
+            <a:schemeClr val="accent1"/>
+          </a:fillRef>
+          <a:effectRef idx="0">
+            <a:schemeClr val="accent1"/>
+          </a:effectRef>
+          <a:fontRef idx="minor">
+            <a:schemeClr val="lt1"/>
+          </a:fontRef>
+        </p:style>
+        <p:txBody>
+          <a:bodyPr rtlCol="0" anchor="ctr"/>
+          <a:lstStyle/>
+          <a:p>
+            <a:pPr algn="ctr"/>
+            <a:r>
+              <a:rPr lang="en-IN" sz="800" dirty="0">
+                <a:solidFill>
+                  <a:schemeClr val="tx1"/>
+                </a:solidFill>
+              </a:rPr>
+              <a:t>Check Borrower Credit</a:t>
+            </a:r>
+            <a:endParaRPr lang="en-US" sz="800" dirty="0">
+              <a:solidFill>
+                <a:schemeClr val="tx1"/>
+              </a:solidFill>
+            </a:endParaRPr>
+          </a:p>
+        </p:txBody>
+      </p:sp>
+      <p:sp>
+        <p:nvSpPr>
+          <p:cNvPr id="72" name="Rectangle: Rounded Corners 71">
+            <a:extLst>
+              <a:ext uri="{FF2B5EF4-FFF2-40B4-BE49-F238E27FC236}">
+                <a16:creationId xmlns:a16="http://schemas.microsoft.com/office/drawing/2014/main" id="{E87FCA41-1DE0-4696-A3A5-56E053A5CD6E}"/>
+              </a:ext>
+            </a:extLst>
+          </p:cNvPr>
+          <p:cNvSpPr/>
+          <p:nvPr/>
+        </p:nvSpPr>
+        <p:spPr>
+          <a:xfrm>
+            <a:off x="7152831" y="2986756"/>
+            <a:ext cx="830241" cy="504000"/>
+          </a:xfrm>
+          <a:prstGeom prst="roundRect">
+            <a:avLst/>
+          </a:prstGeom>
+          <a:solidFill>
+            <a:schemeClr val="accent4">
+              <a:lumMod val="20000"/>
+              <a:lumOff val="80000"/>
+            </a:schemeClr>
+          </a:solidFill>
+        </p:spPr>
+        <p:style>
+          <a:lnRef idx="2">
+            <a:schemeClr val="accent1">
+              <a:shade val="50000"/>
+            </a:schemeClr>
+          </a:lnRef>
+          <a:fillRef idx="1">
+            <a:schemeClr val="accent1"/>
+          </a:fillRef>
+          <a:effectRef idx="0">
+            <a:schemeClr val="accent1"/>
+          </a:effectRef>
+          <a:fontRef idx="minor">
+            <a:schemeClr val="lt1"/>
+          </a:fontRef>
+        </p:style>
+        <p:txBody>
+          <a:bodyPr rtlCol="0" anchor="ctr"/>
+          <a:lstStyle/>
+          <a:p>
+            <a:pPr algn="ctr"/>
+            <a:r>
+              <a:rPr lang="en-IN" sz="800" dirty="0">
+                <a:solidFill>
+                  <a:schemeClr val="tx1"/>
+                </a:solidFill>
+              </a:rPr>
+              <a:t>Review All Results</a:t>
+            </a:r>
+            <a:endParaRPr lang="en-US" sz="800" dirty="0">
+              <a:solidFill>
+                <a:schemeClr val="tx1"/>
+              </a:solidFill>
+            </a:endParaRPr>
+          </a:p>
+        </p:txBody>
+      </p:sp>
+      <p:sp>
+        <p:nvSpPr>
+          <p:cNvPr id="75" name="Rectangle: Rounded Corners 74">
+            <a:extLst>
+              <a:ext uri="{FF2B5EF4-FFF2-40B4-BE49-F238E27FC236}">
+                <a16:creationId xmlns:a16="http://schemas.microsoft.com/office/drawing/2014/main" id="{68A9DCED-73D1-443D-86A5-019A719705DD}"/>
+              </a:ext>
+            </a:extLst>
+          </p:cNvPr>
+          <p:cNvSpPr/>
+          <p:nvPr/>
+        </p:nvSpPr>
+        <p:spPr>
+          <a:xfrm>
+            <a:off x="8077455" y="2986756"/>
+            <a:ext cx="830241" cy="504000"/>
+          </a:xfrm>
+          <a:prstGeom prst="roundRect">
+            <a:avLst/>
+          </a:prstGeom>
+          <a:solidFill>
+            <a:schemeClr val="accent4">
+              <a:lumMod val="20000"/>
+              <a:lumOff val="80000"/>
+            </a:schemeClr>
+          </a:solidFill>
+        </p:spPr>
+        <p:style>
+          <a:lnRef idx="2">
+            <a:schemeClr val="accent1">
+              <a:shade val="50000"/>
+            </a:schemeClr>
+          </a:lnRef>
+          <a:fillRef idx="1">
+            <a:schemeClr val="accent1"/>
+          </a:fillRef>
+          <a:effectRef idx="0">
+            <a:schemeClr val="accent1"/>
+          </a:effectRef>
+          <a:fontRef idx="minor">
+            <a:schemeClr val="lt1"/>
+          </a:fontRef>
+        </p:style>
+        <p:txBody>
+          <a:bodyPr rtlCol="0" anchor="ctr"/>
+          <a:lstStyle/>
+          <a:p>
+            <a:pPr algn="ctr"/>
+            <a:r>
+              <a:rPr lang="en-US" sz="800" dirty="0">
+                <a:solidFill>
+                  <a:schemeClr val="tx1"/>
+                </a:solidFill>
+              </a:rPr>
+              <a:t>Notify Customer</a:t>
+            </a:r>
+          </a:p>
+        </p:txBody>
+      </p:sp>
+      <p:sp>
+        <p:nvSpPr>
+          <p:cNvPr id="100" name="Rectangle: Rounded Corners 99">
+            <a:extLst>
+              <a:ext uri="{FF2B5EF4-FFF2-40B4-BE49-F238E27FC236}">
+                <a16:creationId xmlns:a16="http://schemas.microsoft.com/office/drawing/2014/main" id="{A14C9AD4-B59F-45EA-98AF-E15FB3434413}"/>
+              </a:ext>
+            </a:extLst>
+          </p:cNvPr>
+          <p:cNvSpPr/>
+          <p:nvPr/>
+        </p:nvSpPr>
+        <p:spPr>
+          <a:xfrm>
+            <a:off x="6228210" y="2986756"/>
+            <a:ext cx="830241" cy="504000"/>
+          </a:xfrm>
+          <a:prstGeom prst="roundRect">
+            <a:avLst/>
+          </a:prstGeom>
+          <a:solidFill>
+            <a:schemeClr val="accent4">
+              <a:lumMod val="20000"/>
+              <a:lumOff val="80000"/>
+            </a:schemeClr>
+          </a:solidFill>
+        </p:spPr>
+        <p:style>
+          <a:lnRef idx="2">
+            <a:schemeClr val="accent1">
+              <a:shade val="50000"/>
+            </a:schemeClr>
+          </a:lnRef>
+          <a:fillRef idx="1">
+            <a:schemeClr val="accent1"/>
+          </a:fillRef>
+          <a:effectRef idx="0">
+            <a:schemeClr val="accent1"/>
+          </a:effectRef>
+          <a:fontRef idx="minor">
+            <a:schemeClr val="lt1"/>
+          </a:fontRef>
+        </p:style>
+        <p:txBody>
+          <a:bodyPr rtlCol="0" anchor="ctr"/>
+          <a:lstStyle/>
+          <a:p>
+            <a:pPr algn="ctr"/>
+            <a:r>
+              <a:rPr lang="en-IN" sz="800" dirty="0">
+                <a:solidFill>
+                  <a:schemeClr val="tx1"/>
+                </a:solidFill>
+              </a:rPr>
+              <a:t>Run Automatic Decision</a:t>
+            </a:r>
+            <a:endParaRPr lang="en-US" sz="800" dirty="0">
+              <a:solidFill>
+                <a:schemeClr val="tx1"/>
+              </a:solidFill>
+            </a:endParaRPr>
+          </a:p>
+        </p:txBody>
+      </p:sp>
+      <p:sp>
+        <p:nvSpPr>
+          <p:cNvPr id="67" name="Rectangle: Rounded Corners 66">
+            <a:extLst>
+              <a:ext uri="{FF2B5EF4-FFF2-40B4-BE49-F238E27FC236}">
+                <a16:creationId xmlns:a16="http://schemas.microsoft.com/office/drawing/2014/main" id="{07585B28-B884-4CE5-9101-AD492F3A1B40}"/>
+              </a:ext>
+            </a:extLst>
+          </p:cNvPr>
+          <p:cNvSpPr/>
+          <p:nvPr/>
+        </p:nvSpPr>
+        <p:spPr>
+          <a:xfrm>
+            <a:off x="1605105" y="2986756"/>
+            <a:ext cx="830241" cy="504000"/>
+          </a:xfrm>
+          <a:prstGeom prst="roundRect">
+            <a:avLst/>
+          </a:prstGeom>
+          <a:solidFill>
+            <a:schemeClr val="accent4">
+              <a:lumMod val="20000"/>
+              <a:lumOff val="80000"/>
+            </a:schemeClr>
+          </a:solidFill>
+        </p:spPr>
+        <p:style>
+          <a:lnRef idx="2">
+            <a:schemeClr val="accent1">
+              <a:shade val="50000"/>
+            </a:schemeClr>
+          </a:lnRef>
+          <a:fillRef idx="1">
+            <a:schemeClr val="accent1"/>
+          </a:fillRef>
+          <a:effectRef idx="0">
+            <a:schemeClr val="accent1"/>
+          </a:effectRef>
+          <a:fontRef idx="minor">
+            <a:schemeClr val="lt1"/>
+          </a:fontRef>
+        </p:style>
+        <p:txBody>
+          <a:bodyPr rtlCol="0" anchor="ctr"/>
+          <a:lstStyle/>
+          <a:p>
+            <a:pPr algn="ctr"/>
+            <a:r>
+              <a:rPr lang="en-IN" sz="800" dirty="0">
+                <a:solidFill>
+                  <a:schemeClr val="tx1"/>
+                </a:solidFill>
+              </a:rPr>
+              <a:t>Check Application Correctness</a:t>
+            </a:r>
+            <a:endParaRPr lang="en-US" sz="800" dirty="0">
+              <a:solidFill>
+                <a:schemeClr val="tx1"/>
+              </a:solidFill>
+            </a:endParaRPr>
+          </a:p>
+        </p:txBody>
+      </p:sp>
+      <p:sp>
+        <p:nvSpPr>
+          <p:cNvPr id="3" name="Rectangle 2">
+            <a:extLst>
+              <a:ext uri="{FF2B5EF4-FFF2-40B4-BE49-F238E27FC236}">
+                <a16:creationId xmlns:a16="http://schemas.microsoft.com/office/drawing/2014/main" id="{D1CFF701-3F11-470F-BB59-D8D566346855}"/>
+              </a:ext>
+            </a:extLst>
+          </p:cNvPr>
+          <p:cNvSpPr/>
+          <p:nvPr/>
+        </p:nvSpPr>
+        <p:spPr>
+          <a:xfrm>
+            <a:off x="563371" y="3770616"/>
+            <a:ext cx="10481350" cy="959897"/>
+          </a:xfrm>
+          <a:prstGeom prst="rect">
+            <a:avLst/>
+          </a:prstGeom>
+        </p:spPr>
+        <p:style>
+          <a:lnRef idx="2">
+            <a:schemeClr val="accent1">
+              <a:shade val="50000"/>
+            </a:schemeClr>
+          </a:lnRef>
+          <a:fillRef idx="1">
+            <a:schemeClr val="accent1"/>
+          </a:fillRef>
+          <a:effectRef idx="0">
+            <a:schemeClr val="accent1"/>
+          </a:effectRef>
+          <a:fontRef idx="minor">
+            <a:schemeClr val="lt1"/>
+          </a:fontRef>
+        </p:style>
+        <p:txBody>
+          <a:bodyPr rtlCol="0" anchor="ctr"/>
+          <a:lstStyle/>
+          <a:p>
+            <a:pPr algn="ctr"/>
+            <a:endParaRPr lang="en-US"/>
+          </a:p>
+        </p:txBody>
+      </p:sp>
+      <p:sp>
+        <p:nvSpPr>
+          <p:cNvPr id="4" name="Rectangle: Rounded Corners 3">
+            <a:extLst>
+              <a:ext uri="{FF2B5EF4-FFF2-40B4-BE49-F238E27FC236}">
+                <a16:creationId xmlns:a16="http://schemas.microsoft.com/office/drawing/2014/main" id="{70F46D1D-6D6D-46E9-A710-E99175A720B9}"/>
+              </a:ext>
+            </a:extLst>
+          </p:cNvPr>
+          <p:cNvSpPr/>
+          <p:nvPr/>
+        </p:nvSpPr>
+        <p:spPr>
+          <a:xfrm>
+            <a:off x="709130" y="3961807"/>
+            <a:ext cx="2095748" cy="586044"/>
+          </a:xfrm>
+          <a:prstGeom prst="roundRect">
+            <a:avLst/>
+          </a:prstGeom>
+          <a:solidFill>
+            <a:schemeClr val="accent4">
+              <a:lumMod val="20000"/>
+              <a:lumOff val="80000"/>
+            </a:schemeClr>
+          </a:solidFill>
+        </p:spPr>
+        <p:style>
+          <a:lnRef idx="2">
+            <a:schemeClr val="accent1">
+              <a:shade val="50000"/>
+            </a:schemeClr>
+          </a:lnRef>
+          <a:fillRef idx="1">
+            <a:schemeClr val="accent1"/>
+          </a:fillRef>
+          <a:effectRef idx="0">
+            <a:schemeClr val="accent1"/>
+          </a:effectRef>
+          <a:fontRef idx="minor">
+            <a:schemeClr val="lt1"/>
+          </a:fontRef>
+        </p:style>
+        <p:txBody>
+          <a:bodyPr rtlCol="0" anchor="ctr"/>
+          <a:lstStyle/>
+          <a:p>
+            <a:pPr algn="ctr"/>
+            <a:r>
+              <a:rPr lang="en-IN" dirty="0">
+                <a:solidFill>
+                  <a:schemeClr val="tx1"/>
+                </a:solidFill>
+              </a:rPr>
+              <a:t>Process Engine</a:t>
+            </a:r>
+            <a:endParaRPr lang="en-US" dirty="0">
+              <a:solidFill>
+                <a:schemeClr val="tx1"/>
+              </a:solidFill>
+            </a:endParaRPr>
+          </a:p>
+        </p:txBody>
+      </p:sp>
+      <p:sp>
+        <p:nvSpPr>
+          <p:cNvPr id="34" name="Rectangle: Rounded Corners 33">
+            <a:extLst>
+              <a:ext uri="{FF2B5EF4-FFF2-40B4-BE49-F238E27FC236}">
+                <a16:creationId xmlns:a16="http://schemas.microsoft.com/office/drawing/2014/main" id="{FC8B8095-174C-43E8-8624-0E70F924497A}"/>
+              </a:ext>
+            </a:extLst>
+          </p:cNvPr>
+          <p:cNvSpPr/>
+          <p:nvPr/>
+        </p:nvSpPr>
+        <p:spPr>
+          <a:xfrm>
+            <a:off x="3796990" y="3957542"/>
+            <a:ext cx="2095748" cy="586044"/>
+          </a:xfrm>
+          <a:prstGeom prst="roundRect">
+            <a:avLst/>
+          </a:prstGeom>
+          <a:solidFill>
+            <a:schemeClr val="accent4">
+              <a:lumMod val="20000"/>
+              <a:lumOff val="80000"/>
+            </a:schemeClr>
+          </a:solidFill>
+        </p:spPr>
+        <p:style>
+          <a:lnRef idx="2">
+            <a:schemeClr val="accent1">
+              <a:shade val="50000"/>
+            </a:schemeClr>
+          </a:lnRef>
+          <a:fillRef idx="1">
+            <a:schemeClr val="accent1"/>
+          </a:fillRef>
+          <a:effectRef idx="0">
+            <a:schemeClr val="accent1"/>
+          </a:effectRef>
+          <a:fontRef idx="minor">
+            <a:schemeClr val="lt1"/>
+          </a:fontRef>
+        </p:style>
+        <p:txBody>
+          <a:bodyPr rtlCol="0" anchor="ctr"/>
+          <a:lstStyle/>
+          <a:p>
+            <a:pPr algn="ctr"/>
+            <a:r>
+              <a:rPr lang="en-IN" dirty="0">
+                <a:solidFill>
+                  <a:schemeClr val="tx1"/>
+                </a:solidFill>
+              </a:rPr>
+              <a:t>Task Engine</a:t>
+            </a:r>
+            <a:endParaRPr lang="en-US" dirty="0">
+              <a:solidFill>
+                <a:schemeClr val="tx1"/>
+              </a:solidFill>
+            </a:endParaRPr>
+          </a:p>
+        </p:txBody>
+      </p:sp>
+      <p:sp>
+        <p:nvSpPr>
+          <p:cNvPr id="35" name="Rectangle: Rounded Corners 34">
+            <a:extLst>
+              <a:ext uri="{FF2B5EF4-FFF2-40B4-BE49-F238E27FC236}">
+                <a16:creationId xmlns:a16="http://schemas.microsoft.com/office/drawing/2014/main" id="{9EEB267C-525A-4B01-B09E-B09EE4FC357D}"/>
+              </a:ext>
+            </a:extLst>
+          </p:cNvPr>
+          <p:cNvSpPr/>
+          <p:nvPr/>
+        </p:nvSpPr>
+        <p:spPr>
+          <a:xfrm>
+            <a:off x="6811948" y="3961807"/>
+            <a:ext cx="2095748" cy="586044"/>
+          </a:xfrm>
+          <a:prstGeom prst="roundRect">
+            <a:avLst/>
+          </a:prstGeom>
+          <a:solidFill>
+            <a:schemeClr val="accent4">
+              <a:lumMod val="20000"/>
+              <a:lumOff val="80000"/>
+            </a:schemeClr>
+          </a:solidFill>
+        </p:spPr>
+        <p:style>
+          <a:lnRef idx="2">
+            <a:schemeClr val="accent1">
+              <a:shade val="50000"/>
+            </a:schemeClr>
+          </a:lnRef>
+          <a:fillRef idx="1">
+            <a:schemeClr val="accent1"/>
+          </a:fillRef>
+          <a:effectRef idx="0">
+            <a:schemeClr val="accent1"/>
+          </a:effectRef>
+          <a:fontRef idx="minor">
+            <a:schemeClr val="lt1"/>
+          </a:fontRef>
+        </p:style>
+        <p:txBody>
+          <a:bodyPr rtlCol="0" anchor="ctr"/>
+          <a:lstStyle/>
+          <a:p>
+            <a:pPr algn="ctr"/>
+            <a:r>
+              <a:rPr lang="en-IN" dirty="0">
+                <a:solidFill>
+                  <a:schemeClr val="tx1"/>
+                </a:solidFill>
+              </a:rPr>
+              <a:t>IAM</a:t>
+            </a:r>
+            <a:endParaRPr lang="en-US" dirty="0">
+              <a:solidFill>
+                <a:schemeClr val="tx1"/>
+              </a:solidFill>
+            </a:endParaRPr>
+          </a:p>
+        </p:txBody>
+      </p:sp>
+      <p:sp>
+        <p:nvSpPr>
+          <p:cNvPr id="39" name="Rectangle: Rounded Corners 38">
+            <a:extLst>
+              <a:ext uri="{FF2B5EF4-FFF2-40B4-BE49-F238E27FC236}">
+                <a16:creationId xmlns:a16="http://schemas.microsoft.com/office/drawing/2014/main" id="{3270575E-351F-46C1-A846-6B5B37D38002}"/>
+              </a:ext>
+            </a:extLst>
+          </p:cNvPr>
+          <p:cNvSpPr/>
+          <p:nvPr/>
+        </p:nvSpPr>
+        <p:spPr>
+          <a:xfrm>
+            <a:off x="680484" y="2320165"/>
+            <a:ext cx="8227212" cy="504000"/>
+          </a:xfrm>
+          <a:prstGeom prst="roundRect">
+            <a:avLst/>
+          </a:prstGeom>
+          <a:solidFill>
+            <a:schemeClr val="accent4">
+              <a:lumMod val="20000"/>
+              <a:lumOff val="80000"/>
+            </a:schemeClr>
+          </a:solidFill>
+        </p:spPr>
+        <p:style>
+          <a:lnRef idx="2">
+            <a:schemeClr val="accent1">
+              <a:shade val="50000"/>
+            </a:schemeClr>
+          </a:lnRef>
+          <a:fillRef idx="1">
+            <a:schemeClr val="accent1"/>
+          </a:fillRef>
+          <a:effectRef idx="0">
+            <a:schemeClr val="accent1"/>
+          </a:effectRef>
+          <a:fontRef idx="minor">
+            <a:schemeClr val="lt1"/>
+          </a:fontRef>
+        </p:style>
+        <p:txBody>
+          <a:bodyPr rtlCol="0" anchor="ctr"/>
+          <a:lstStyle/>
+          <a:p>
+            <a:pPr algn="ctr"/>
+            <a:r>
+              <a:rPr lang="en-IN" sz="1050" dirty="0">
+                <a:solidFill>
+                  <a:schemeClr val="tx1"/>
+                </a:solidFill>
+              </a:rPr>
+              <a:t>UI</a:t>
+            </a:r>
+            <a:endParaRPr lang="en-US" sz="1050" dirty="0">
+              <a:solidFill>
+                <a:schemeClr val="tx1"/>
+              </a:solidFill>
+            </a:endParaRPr>
+          </a:p>
+        </p:txBody>
+      </p:sp>
+      <p:sp>
+        <p:nvSpPr>
+          <p:cNvPr id="7" name="Flowchart: Magnetic Disk 6">
+            <a:extLst>
+              <a:ext uri="{FF2B5EF4-FFF2-40B4-BE49-F238E27FC236}">
+                <a16:creationId xmlns:a16="http://schemas.microsoft.com/office/drawing/2014/main" id="{9A22FDB6-CB35-4962-AAE4-F2C5C477DE18}"/>
+              </a:ext>
+            </a:extLst>
+          </p:cNvPr>
+          <p:cNvSpPr/>
+          <p:nvPr/>
+        </p:nvSpPr>
+        <p:spPr>
+          <a:xfrm>
+            <a:off x="9092629" y="2490695"/>
+            <a:ext cx="1777429" cy="2108611"/>
+          </a:xfrm>
+          <a:prstGeom prst="flowChartMagneticDisk">
+            <a:avLst/>
+          </a:prstGeom>
+          <a:solidFill>
+            <a:schemeClr val="accent2">
+              <a:lumMod val="40000"/>
+              <a:lumOff val="60000"/>
+            </a:schemeClr>
+          </a:solidFill>
+        </p:spPr>
+        <p:style>
+          <a:lnRef idx="2">
+            <a:schemeClr val="accent1">
+              <a:shade val="50000"/>
+            </a:schemeClr>
+          </a:lnRef>
+          <a:fillRef idx="1">
+            <a:schemeClr val="accent1"/>
+          </a:fillRef>
+          <a:effectRef idx="0">
+            <a:schemeClr val="accent1"/>
+          </a:effectRef>
+          <a:fontRef idx="minor">
+            <a:schemeClr val="lt1"/>
+          </a:fontRef>
+        </p:style>
+        <p:txBody>
+          <a:bodyPr rtlCol="0" anchor="ctr"/>
+          <a:lstStyle/>
+          <a:p>
+            <a:pPr algn="ctr"/>
+            <a:endParaRPr lang="en-US" dirty="0"/>
+          </a:p>
+        </p:txBody>
+      </p:sp>
+      <p:sp>
+        <p:nvSpPr>
+          <p:cNvPr id="8" name="Rectangle 7">
+            <a:extLst>
+              <a:ext uri="{FF2B5EF4-FFF2-40B4-BE49-F238E27FC236}">
+                <a16:creationId xmlns:a16="http://schemas.microsoft.com/office/drawing/2014/main" id="{B66A3B5D-D74A-4D73-A33F-AAE144C14732}"/>
+              </a:ext>
+            </a:extLst>
+          </p:cNvPr>
+          <p:cNvSpPr/>
+          <p:nvPr/>
+        </p:nvSpPr>
+        <p:spPr>
+          <a:xfrm>
+            <a:off x="9410555" y="2816627"/>
+            <a:ext cx="544530" cy="504000"/>
+          </a:xfrm>
+          <a:prstGeom prst="rect">
+            <a:avLst/>
+          </a:prstGeom>
+          <a:solidFill>
+            <a:schemeClr val="accent6">
+              <a:lumMod val="40000"/>
+              <a:lumOff val="60000"/>
+            </a:schemeClr>
+          </a:solidFill>
+        </p:spPr>
+        <p:style>
+          <a:lnRef idx="2">
+            <a:schemeClr val="accent1">
+              <a:shade val="50000"/>
+            </a:schemeClr>
+          </a:lnRef>
+          <a:fillRef idx="1">
+            <a:schemeClr val="accent1"/>
+          </a:fillRef>
+          <a:effectRef idx="0">
+            <a:schemeClr val="accent1"/>
+          </a:effectRef>
+          <a:fontRef idx="minor">
+            <a:schemeClr val="lt1"/>
+          </a:fontRef>
+        </p:style>
+        <p:txBody>
+          <a:bodyPr rtlCol="0" anchor="ctr"/>
+          <a:lstStyle/>
+          <a:p>
+            <a:pPr algn="ctr"/>
+            <a:endParaRPr lang="en-US"/>
+          </a:p>
+        </p:txBody>
+      </p:sp>
+      <p:sp>
+        <p:nvSpPr>
+          <p:cNvPr id="42" name="Rectangle 41">
+            <a:extLst>
+              <a:ext uri="{FF2B5EF4-FFF2-40B4-BE49-F238E27FC236}">
+                <a16:creationId xmlns:a16="http://schemas.microsoft.com/office/drawing/2014/main" id="{30146FED-793E-442C-9F0B-E4E6C6FF5A42}"/>
+              </a:ext>
+            </a:extLst>
+          </p:cNvPr>
+          <p:cNvSpPr/>
+          <p:nvPr/>
+        </p:nvSpPr>
+        <p:spPr>
+          <a:xfrm>
+            <a:off x="9610330" y="2910875"/>
+            <a:ext cx="544530" cy="504000"/>
+          </a:xfrm>
+          <a:prstGeom prst="rect">
+            <a:avLst/>
+          </a:prstGeom>
+          <a:solidFill>
+            <a:schemeClr val="accent6">
+              <a:lumMod val="40000"/>
+              <a:lumOff val="60000"/>
+            </a:schemeClr>
+          </a:solidFill>
+        </p:spPr>
+        <p:style>
+          <a:lnRef idx="2">
+            <a:schemeClr val="accent1">
+              <a:shade val="50000"/>
+            </a:schemeClr>
+          </a:lnRef>
+          <a:fillRef idx="1">
+            <a:schemeClr val="accent1"/>
+          </a:fillRef>
+          <a:effectRef idx="0">
+            <a:schemeClr val="accent1"/>
+          </a:effectRef>
+          <a:fontRef idx="minor">
+            <a:schemeClr val="lt1"/>
+          </a:fontRef>
+        </p:style>
+        <p:txBody>
+          <a:bodyPr rtlCol="0" anchor="ctr"/>
+          <a:lstStyle/>
+          <a:p>
+            <a:pPr algn="ctr"/>
+            <a:endParaRPr lang="en-US"/>
+          </a:p>
+        </p:txBody>
+      </p:sp>
+      <p:sp>
+        <p:nvSpPr>
+          <p:cNvPr id="45" name="Rectangle 44">
+            <a:extLst>
+              <a:ext uri="{FF2B5EF4-FFF2-40B4-BE49-F238E27FC236}">
+                <a16:creationId xmlns:a16="http://schemas.microsoft.com/office/drawing/2014/main" id="{740560D0-778D-4A03-B256-A93095A299B7}"/>
+              </a:ext>
+            </a:extLst>
+          </p:cNvPr>
+          <p:cNvSpPr/>
+          <p:nvPr/>
+        </p:nvSpPr>
+        <p:spPr>
+          <a:xfrm>
+            <a:off x="9808243" y="3068627"/>
+            <a:ext cx="544530" cy="504000"/>
+          </a:xfrm>
+          <a:prstGeom prst="rect">
+            <a:avLst/>
+          </a:prstGeom>
+          <a:solidFill>
+            <a:schemeClr val="accent6">
+              <a:lumMod val="40000"/>
+              <a:lumOff val="60000"/>
+            </a:schemeClr>
+          </a:solidFill>
+        </p:spPr>
+        <p:style>
+          <a:lnRef idx="2">
+            <a:schemeClr val="accent1">
+              <a:shade val="50000"/>
+            </a:schemeClr>
+          </a:lnRef>
+          <a:fillRef idx="1">
+            <a:schemeClr val="accent1"/>
+          </a:fillRef>
+          <a:effectRef idx="0">
+            <a:schemeClr val="accent1"/>
+          </a:effectRef>
+          <a:fontRef idx="minor">
+            <a:schemeClr val="lt1"/>
+          </a:fontRef>
+        </p:style>
+        <p:txBody>
+          <a:bodyPr rtlCol="0" anchor="ctr"/>
+          <a:lstStyle/>
+          <a:p>
+            <a:pPr algn="ctr"/>
+            <a:endParaRPr lang="en-US"/>
+          </a:p>
+        </p:txBody>
+      </p:sp>
+      <p:sp>
+        <p:nvSpPr>
+          <p:cNvPr id="46" name="Rectangle 45">
+            <a:extLst>
+              <a:ext uri="{FF2B5EF4-FFF2-40B4-BE49-F238E27FC236}">
+                <a16:creationId xmlns:a16="http://schemas.microsoft.com/office/drawing/2014/main" id="{4CCF0968-1AF1-4E48-96CC-889BCC8EC1D8}"/>
+              </a:ext>
+            </a:extLst>
+          </p:cNvPr>
+          <p:cNvSpPr/>
+          <p:nvPr/>
+        </p:nvSpPr>
+        <p:spPr>
+          <a:xfrm>
+            <a:off x="9441325" y="3782910"/>
+            <a:ext cx="544530" cy="504000"/>
+          </a:xfrm>
+          <a:prstGeom prst="rect">
+            <a:avLst/>
+          </a:prstGeom>
+          <a:solidFill>
+            <a:schemeClr val="accent6">
+              <a:lumMod val="40000"/>
+              <a:lumOff val="60000"/>
+            </a:schemeClr>
+          </a:solidFill>
+        </p:spPr>
+        <p:style>
+          <a:lnRef idx="2">
+            <a:schemeClr val="accent1">
+              <a:shade val="50000"/>
+            </a:schemeClr>
+          </a:lnRef>
+          <a:fillRef idx="1">
+            <a:schemeClr val="accent1"/>
+          </a:fillRef>
+          <a:effectRef idx="0">
+            <a:schemeClr val="accent1"/>
+          </a:effectRef>
+          <a:fontRef idx="minor">
+            <a:schemeClr val="lt1"/>
+          </a:fontRef>
+        </p:style>
+        <p:txBody>
+          <a:bodyPr rtlCol="0" anchor="ctr"/>
+          <a:lstStyle/>
+          <a:p>
+            <a:pPr algn="ctr"/>
+            <a:endParaRPr lang="en-US"/>
+          </a:p>
+        </p:txBody>
+      </p:sp>
+      <p:sp>
+        <p:nvSpPr>
+          <p:cNvPr id="48" name="Rectangle 47">
+            <a:extLst>
+              <a:ext uri="{FF2B5EF4-FFF2-40B4-BE49-F238E27FC236}">
+                <a16:creationId xmlns:a16="http://schemas.microsoft.com/office/drawing/2014/main" id="{9F79BC6D-F199-4217-A05B-240CA8DCB30C}"/>
+              </a:ext>
+            </a:extLst>
+          </p:cNvPr>
+          <p:cNvSpPr/>
+          <p:nvPr/>
+        </p:nvSpPr>
+        <p:spPr>
+          <a:xfrm>
+            <a:off x="9641100" y="3877158"/>
+            <a:ext cx="544530" cy="504000"/>
+          </a:xfrm>
+          <a:prstGeom prst="rect">
+            <a:avLst/>
+          </a:prstGeom>
+          <a:solidFill>
+            <a:schemeClr val="accent6">
+              <a:lumMod val="40000"/>
+              <a:lumOff val="60000"/>
+            </a:schemeClr>
+          </a:solidFill>
+        </p:spPr>
+        <p:style>
+          <a:lnRef idx="2">
+            <a:schemeClr val="accent1">
+              <a:shade val="50000"/>
+            </a:schemeClr>
+          </a:lnRef>
+          <a:fillRef idx="1">
+            <a:schemeClr val="accent1"/>
+          </a:fillRef>
+          <a:effectRef idx="0">
+            <a:schemeClr val="accent1"/>
+          </a:effectRef>
+          <a:fontRef idx="minor">
+            <a:schemeClr val="lt1"/>
+          </a:fontRef>
+        </p:style>
+        <p:txBody>
+          <a:bodyPr rtlCol="0" anchor="ctr"/>
+          <a:lstStyle/>
+          <a:p>
+            <a:pPr algn="ctr"/>
+            <a:endParaRPr lang="en-US"/>
+          </a:p>
+        </p:txBody>
+      </p:sp>
+      <p:sp>
+        <p:nvSpPr>
+          <p:cNvPr id="49" name="Rectangle 48">
+            <a:extLst>
+              <a:ext uri="{FF2B5EF4-FFF2-40B4-BE49-F238E27FC236}">
+                <a16:creationId xmlns:a16="http://schemas.microsoft.com/office/drawing/2014/main" id="{A286CF70-EA6F-4469-AE1B-7139753DE5C2}"/>
+              </a:ext>
+            </a:extLst>
+          </p:cNvPr>
+          <p:cNvSpPr/>
+          <p:nvPr/>
+        </p:nvSpPr>
+        <p:spPr>
+          <a:xfrm>
+            <a:off x="9839013" y="4034910"/>
+            <a:ext cx="544530" cy="504000"/>
+          </a:xfrm>
+          <a:prstGeom prst="rect">
+            <a:avLst/>
+          </a:prstGeom>
+          <a:solidFill>
+            <a:schemeClr val="accent6">
+              <a:lumMod val="40000"/>
+              <a:lumOff val="60000"/>
+            </a:schemeClr>
+          </a:solidFill>
+        </p:spPr>
+        <p:style>
+          <a:lnRef idx="2">
+            <a:schemeClr val="accent1">
+              <a:shade val="50000"/>
+            </a:schemeClr>
+          </a:lnRef>
+          <a:fillRef idx="1">
+            <a:schemeClr val="accent1"/>
+          </a:fillRef>
+          <a:effectRef idx="0">
+            <a:schemeClr val="accent1"/>
+          </a:effectRef>
+          <a:fontRef idx="minor">
+            <a:schemeClr val="lt1"/>
+          </a:fontRef>
+        </p:style>
+        <p:txBody>
+          <a:bodyPr rtlCol="0" anchor="ctr"/>
+          <a:lstStyle/>
+          <a:p>
+            <a:pPr algn="ctr"/>
+            <a:endParaRPr lang="en-US"/>
+          </a:p>
+        </p:txBody>
+      </p:sp>
+      <p:cxnSp>
+        <p:nvCxnSpPr>
+          <p:cNvPr id="10" name="Straight Connector 9">
+            <a:extLst>
+              <a:ext uri="{FF2B5EF4-FFF2-40B4-BE49-F238E27FC236}">
+                <a16:creationId xmlns:a16="http://schemas.microsoft.com/office/drawing/2014/main" id="{15E82A21-6204-47D5-9C53-A3D5B2E1F47F}"/>
+              </a:ext>
+            </a:extLst>
+          </p:cNvPr>
+          <p:cNvCxnSpPr/>
+          <p:nvPr/>
+        </p:nvCxnSpPr>
+        <p:spPr>
+          <a:xfrm>
+            <a:off x="9277564" y="3644545"/>
+            <a:ext cx="1428108" cy="0"/>
+          </a:xfrm>
+          <a:prstGeom prst="line">
+            <a:avLst/>
+          </a:prstGeom>
+          <a:ln w="19050">
+            <a:solidFill>
+              <a:schemeClr val="tx1"/>
+            </a:solidFill>
+            <a:prstDash val="dashDot"/>
+          </a:ln>
+        </p:spPr>
+        <p:style>
+          <a:lnRef idx="1">
+            <a:schemeClr val="accent1"/>
+          </a:lnRef>
+          <a:fillRef idx="0">
+            <a:schemeClr val="accent1"/>
+          </a:fillRef>
+          <a:effectRef idx="0">
+            <a:schemeClr val="accent1"/>
+          </a:effectRef>
+          <a:fontRef idx="minor">
+            <a:schemeClr val="tx1"/>
+          </a:fontRef>
+        </p:style>
+      </p:cxnSp>
+      <p:sp>
+        <p:nvSpPr>
+          <p:cNvPr id="51" name="Rectangle: Rounded Corners 50">
+            <a:extLst>
+              <a:ext uri="{FF2B5EF4-FFF2-40B4-BE49-F238E27FC236}">
+                <a16:creationId xmlns:a16="http://schemas.microsoft.com/office/drawing/2014/main" id="{DC968065-4DA5-488B-BA94-6C7758500B4F}"/>
+              </a:ext>
+            </a:extLst>
+          </p:cNvPr>
+          <p:cNvSpPr/>
+          <p:nvPr/>
+        </p:nvSpPr>
+        <p:spPr>
+          <a:xfrm>
+            <a:off x="9662274" y="2811803"/>
+            <a:ext cx="1135876" cy="436251"/>
+          </a:xfrm>
+          <a:prstGeom prst="roundRect">
+            <a:avLst/>
+          </a:prstGeom>
+          <a:noFill/>
+          <a:ln>
+            <a:noFill/>
+          </a:ln>
+        </p:spPr>
+        <p:style>
+          <a:lnRef idx="2">
+            <a:schemeClr val="accent1">
+              <a:shade val="50000"/>
+            </a:schemeClr>
+          </a:lnRef>
+          <a:fillRef idx="1">
+            <a:schemeClr val="accent1"/>
+          </a:fillRef>
+          <a:effectRef idx="0">
+            <a:schemeClr val="accent1"/>
+          </a:effectRef>
+          <a:fontRef idx="minor">
+            <a:schemeClr val="lt1"/>
+          </a:fontRef>
+        </p:style>
+        <p:txBody>
+          <a:bodyPr rtlCol="0" anchor="ctr"/>
+          <a:lstStyle/>
+          <a:p>
+            <a:pPr algn="ctr"/>
+            <a:r>
+              <a:rPr lang="en-IN" sz="1400" b="1" dirty="0">
+                <a:solidFill>
+                  <a:schemeClr val="tx1"/>
+                </a:solidFill>
+              </a:rPr>
+              <a:t>Loan Schema</a:t>
+            </a:r>
+            <a:endParaRPr lang="en-US" sz="1400" b="1" dirty="0">
+              <a:solidFill>
+                <a:schemeClr val="tx1"/>
+              </a:solidFill>
+            </a:endParaRPr>
+          </a:p>
+        </p:txBody>
+      </p:sp>
+      <p:sp>
+        <p:nvSpPr>
+          <p:cNvPr id="52" name="Rectangle: Rounded Corners 51">
+            <a:extLst>
+              <a:ext uri="{FF2B5EF4-FFF2-40B4-BE49-F238E27FC236}">
+                <a16:creationId xmlns:a16="http://schemas.microsoft.com/office/drawing/2014/main" id="{3612F3D1-8F5B-42EE-8DD2-BFF21162E561}"/>
+              </a:ext>
+            </a:extLst>
+          </p:cNvPr>
+          <p:cNvSpPr/>
+          <p:nvPr/>
+        </p:nvSpPr>
+        <p:spPr>
+          <a:xfrm>
+            <a:off x="9681112" y="3847779"/>
+            <a:ext cx="1135876" cy="436251"/>
+          </a:xfrm>
+          <a:prstGeom prst="roundRect">
+            <a:avLst/>
+          </a:prstGeom>
+          <a:noFill/>
+          <a:ln>
+            <a:noFill/>
+          </a:ln>
+        </p:spPr>
+        <p:style>
+          <a:lnRef idx="2">
+            <a:schemeClr val="accent1">
+              <a:shade val="50000"/>
+            </a:schemeClr>
+          </a:lnRef>
+          <a:fillRef idx="1">
+            <a:schemeClr val="accent1"/>
+          </a:fillRef>
+          <a:effectRef idx="0">
+            <a:schemeClr val="accent1"/>
+          </a:effectRef>
+          <a:fontRef idx="minor">
+            <a:schemeClr val="lt1"/>
+          </a:fontRef>
+        </p:style>
+        <p:txBody>
+          <a:bodyPr rtlCol="0" anchor="ctr"/>
+          <a:lstStyle/>
+          <a:p>
+            <a:pPr algn="ctr"/>
+            <a:r>
+              <a:rPr lang="en-IN" sz="1400" b="1" dirty="0">
+                <a:solidFill>
+                  <a:schemeClr val="tx1"/>
+                </a:solidFill>
+              </a:rPr>
+              <a:t>Process Schema</a:t>
+            </a:r>
+            <a:endParaRPr lang="en-US" sz="1400" b="1" dirty="0">
+              <a:solidFill>
+                <a:schemeClr val="tx1"/>
+              </a:solidFill>
+            </a:endParaRPr>
+          </a:p>
+        </p:txBody>
+      </p:sp>
+    </p:spTree>
+    <p:custDataLst>
+      <p:custData r:id="rId1"/>
+      <p:custData r:id="rId2"/>
+    </p:custDataLst>
+    <p:extLst>
+      <p:ext uri="{BB962C8B-B14F-4D97-AF65-F5344CB8AC3E}">
+        <p14:creationId xmlns:p14="http://schemas.microsoft.com/office/powerpoint/2010/main" val="707827376"/>
+      </p:ext>
+    </p:extLst>
+  </p:cSld>
+  <p:clrMapOvr>
+    <a:masterClrMapping/>
+  </p:clrMapOvr>
+  <mc:AlternateContent xmlns:mc="http://schemas.openxmlformats.org/markup-compatibility/2006" xmlns:p14="http://schemas.microsoft.com/office/powerpoint/2010/main">
+    <mc:Choice Requires="p14">
+      <p:transition p14:dur="200">
+        <p:fade/>
+      </p:transition>
+    </mc:Choice>
+    <mc:Fallback xmlns="">
+      <p:transition>
+        <p:fade/>
+      </p:transition>
+    </mc:Fallback>
+  </mc:AlternateContent>
+</p:sld>
+</file>
+
 <file path=ppt/tags/tag1.xml><?xml version="1.0" encoding="utf-8"?>
 <p:tagLst xmlns:a="http://schemas.openxmlformats.org/drawingml/2006/main" xmlns:r="http://schemas.openxmlformats.org/officeDocument/2006/relationships" xmlns:p="http://schemas.openxmlformats.org/presentationml/2006/main">
   <p:tag name="THINKCELLSHAPEDONOTDELETE" val="thinkcellActiveDocDoNotDelete"/>
@@ -11046,14 +12577,22 @@
 </file>
 
 <file path=customXml/item10.xml><?xml version="1.0" encoding="utf-8"?>
+<TemplafySlideFormConfiguration><![CDATA[{"formFields":[],"formDataEntries":[]}]]></TemplafySlideFormConfiguration>
+</file>
+
+<file path=customXml/item11.xml><?xml version="1.0" encoding="utf-8"?>
+<TemplafySlideFormConfiguration><![CDATA[{"formFields":[],"formDataEntries":[]}]]></TemplafySlideFormConfiguration>
+</file>
+
+<file path=customXml/item12.xml><?xml version="1.0" encoding="utf-8"?>
+<TemplafySlideFormConfiguration><![CDATA[{"formFields":[],"formDataEntries":[]}]]></TemplafySlideFormConfiguration>
+</file>
+
+<file path=customXml/item13.xml><?xml version="1.0" encoding="utf-8"?>
 <TemplafySlideTemplateConfiguration><![CDATA[{"slideVersion":1,"isValidatorEnabled":false,"isLocked":false,"elementsMetadata":[],"slideId":"637509723489077409","enableDocumentContentUpdater":false,"version":"2.0"}]]></TemplafySlideTemplateConfiguration>
 </file>
 
-<file path=customXml/item11.xml><?xml version="1.0" encoding="utf-8"?>
-<TemplafySlideTemplateConfiguration><![CDATA[{"slideVersion":1,"isValidatorEnabled":false,"isLocked":false,"elementsMetadata":[],"slideId":"637509723489077409","enableDocumentContentUpdater":false,"version":"2.0"}]]></TemplafySlideTemplateConfiguration>
-</file>
-
-<file path=customXml/item12.xml><?xml version="1.0" encoding="utf-8"?>
+<file path=customXml/item14.xml><?xml version="1.0" encoding="utf-8"?>
 <TemplafySlideFormConfiguration><![CDATA[{"formFields":[],"formDataEntries":[]}]]></TemplafySlideFormConfiguration>
 </file>
 
@@ -11062,11 +12601,11 @@
 </file>
 
 <file path=customXml/item3.xml><?xml version="1.0" encoding="utf-8"?>
-<TemplafySlideFormConfiguration><![CDATA[{"formFields":[],"formDataEntries":[]}]]></TemplafySlideFormConfiguration>
+<TemplafySlideTemplateConfiguration><![CDATA[{"slideVersion":1,"isValidatorEnabled":false,"isLocked":false,"elementsMetadata":[],"slideId":"637509723489077409","enableDocumentContentUpdater":false,"version":"2.0"}]]></TemplafySlideTemplateConfiguration>
 </file>
 
 <file path=customXml/item4.xml><?xml version="1.0" encoding="utf-8"?>
-<TemplafySlideFormConfiguration><![CDATA[{"formFields":[],"formDataEntries":[]}]]></TemplafySlideFormConfiguration>
+<TemplafySlideTemplateConfiguration><![CDATA[{"slideVersion":1,"isValidatorEnabled":false,"isLocked":false,"elementsMetadata":[],"slideId":"637509723489077409","enableDocumentContentUpdater":false,"version":"2.0"}]]></TemplafySlideTemplateConfiguration>
 </file>
 
 <file path=customXml/item5.xml><?xml version="1.0" encoding="utf-8"?>
@@ -11078,7 +12617,7 @@
 </file>
 
 <file path=customXml/item7.xml><?xml version="1.0" encoding="utf-8"?>
-<TemplafySlideFormConfiguration><![CDATA[{"formFields":[],"formDataEntries":[]}]]></TemplafySlideFormConfiguration>
+<TemplafySlideTemplateConfiguration><![CDATA[{"slideVersion":1,"isValidatorEnabled":false,"isLocked":false,"elementsMetadata":[],"slideId":"637509723489077409","enableDocumentContentUpdater":false,"version":"2.0"}]]></TemplafySlideTemplateConfiguration>
 </file>
 
 <file path=customXml/item8.xml><?xml version="1.0" encoding="utf-8"?>
@@ -11086,7 +12625,7 @@
 </file>
 
 <file path=customXml/item9.xml><?xml version="1.0" encoding="utf-8"?>
-<TemplafySlideTemplateConfiguration><![CDATA[{"slideVersion":1,"isValidatorEnabled":false,"isLocked":false,"elementsMetadata":[],"slideId":"637509723489077409","enableDocumentContentUpdater":false,"version":"2.0"}]]></TemplafySlideTemplateConfiguration>
+<TemplafySlideFormConfiguration><![CDATA[{"formFields":[],"formDataEntries":[]}]]></TemplafySlideFormConfiguration>
 </file>
 
 <file path=customXml/itemProps1.xml><?xml version="1.0" encoding="utf-8"?>
@@ -11096,55 +12635,67 @@
 </file>
 
 <file path=customXml/itemProps10.xml><?xml version="1.0" encoding="utf-8"?>
+<ds:datastoreItem xmlns:ds="http://schemas.openxmlformats.org/officeDocument/2006/customXml" ds:itemID="{644E3CC3-5418-4967-B084-476DADC75B9C}">
+  <ds:schemaRefs/>
+</ds:datastoreItem>
+</file>
+
+<file path=customXml/itemProps11.xml><?xml version="1.0" encoding="utf-8"?>
+<ds:datastoreItem xmlns:ds="http://schemas.openxmlformats.org/officeDocument/2006/customXml" ds:itemID="{BF04C681-3F73-4EBC-97E2-D1FC67EC72D0}">
+  <ds:schemaRefs/>
+</ds:datastoreItem>
+</file>
+
+<file path=customXml/itemProps12.xml><?xml version="1.0" encoding="utf-8"?>
+<ds:datastoreItem xmlns:ds="http://schemas.openxmlformats.org/officeDocument/2006/customXml" ds:itemID="{BC21E34E-8263-4266-9AD4-B98F031DFFD0}">
+  <ds:schemaRefs/>
+</ds:datastoreItem>
+</file>
+
+<file path=customXml/itemProps13.xml><?xml version="1.0" encoding="utf-8"?>
+<ds:datastoreItem xmlns:ds="http://schemas.openxmlformats.org/officeDocument/2006/customXml" ds:itemID="{2077663B-A081-4BE3-8467-95F59823B03F}">
+  <ds:schemaRefs/>
+</ds:datastoreItem>
+</file>
+
+<file path=customXml/itemProps14.xml><?xml version="1.0" encoding="utf-8"?>
+<ds:datastoreItem xmlns:ds="http://schemas.openxmlformats.org/officeDocument/2006/customXml" ds:itemID="{0C480300-50D9-4E05-8924-BFE13304B73E}">
+  <ds:schemaRefs/>
+</ds:datastoreItem>
+</file>
+
+<file path=customXml/itemProps2.xml><?xml version="1.0" encoding="utf-8"?>
+<ds:datastoreItem xmlns:ds="http://schemas.openxmlformats.org/officeDocument/2006/customXml" ds:itemID="{15ACA71F-45FC-4468-B737-845C2FDCD2DF}">
+  <ds:schemaRefs/>
+</ds:datastoreItem>
+</file>
+
+<file path=customXml/itemProps3.xml><?xml version="1.0" encoding="utf-8"?>
+<ds:datastoreItem xmlns:ds="http://schemas.openxmlformats.org/officeDocument/2006/customXml" ds:itemID="{9235110C-C9EF-4C66-A23F-31003A5550F5}">
+  <ds:schemaRefs/>
+</ds:datastoreItem>
+</file>
+
+<file path=customXml/itemProps4.xml><?xml version="1.0" encoding="utf-8"?>
+<ds:datastoreItem xmlns:ds="http://schemas.openxmlformats.org/officeDocument/2006/customXml" ds:itemID="{7FECE985-881C-406F-816D-58AEE74D8F1C}">
+  <ds:schemaRefs/>
+</ds:datastoreItem>
+</file>
+
+<file path=customXml/itemProps5.xml><?xml version="1.0" encoding="utf-8"?>
 <ds:datastoreItem xmlns:ds="http://schemas.openxmlformats.org/officeDocument/2006/customXml" ds:itemID="{2C32BD2C-3EFF-4CDB-B659-B2B4E7B7C3F7}">
   <ds:schemaRefs/>
 </ds:datastoreItem>
 </file>
 
-<file path=customXml/itemProps11.xml><?xml version="1.0" encoding="utf-8"?>
-<ds:datastoreItem xmlns:ds="http://schemas.openxmlformats.org/officeDocument/2006/customXml" ds:itemID="{9235110C-C9EF-4C66-A23F-31003A5550F5}">
-  <ds:schemaRefs/>
-</ds:datastoreItem>
-</file>
-
-<file path=customXml/itemProps12.xml><?xml version="1.0" encoding="utf-8"?>
-<ds:datastoreItem xmlns:ds="http://schemas.openxmlformats.org/officeDocument/2006/customXml" ds:itemID="{BF04C681-3F73-4EBC-97E2-D1FC67EC72D0}">
-  <ds:schemaRefs/>
-</ds:datastoreItem>
-</file>
-
-<file path=customXml/itemProps2.xml><?xml version="1.0" encoding="utf-8"?>
-<ds:datastoreItem xmlns:ds="http://schemas.openxmlformats.org/officeDocument/2006/customXml" ds:itemID="{BC21E34E-8263-4266-9AD4-B98F031DFFD0}">
-  <ds:schemaRefs/>
-</ds:datastoreItem>
-</file>
-
-<file path=customXml/itemProps3.xml><?xml version="1.0" encoding="utf-8"?>
-<ds:datastoreItem xmlns:ds="http://schemas.openxmlformats.org/officeDocument/2006/customXml" ds:itemID="{E7DCFFA5-1C0A-475A-8D4B-D9408E8F38DD}">
-  <ds:schemaRefs/>
-</ds:datastoreItem>
-</file>
-
-<file path=customXml/itemProps4.xml><?xml version="1.0" encoding="utf-8"?>
+<file path=customXml/itemProps6.xml><?xml version="1.0" encoding="utf-8"?>
 <ds:datastoreItem xmlns:ds="http://schemas.openxmlformats.org/officeDocument/2006/customXml" ds:itemID="{595D5F3C-8793-4B6C-9392-9FA7E76F1396}">
   <ds:schemaRefs/>
 </ds:datastoreItem>
 </file>
 
-<file path=customXml/itemProps5.xml><?xml version="1.0" encoding="utf-8"?>
-<ds:datastoreItem xmlns:ds="http://schemas.openxmlformats.org/officeDocument/2006/customXml" ds:itemID="{7FECE985-881C-406F-816D-58AEE74D8F1C}">
-  <ds:schemaRefs/>
-</ds:datastoreItem>
-</file>
-
-<file path=customXml/itemProps6.xml><?xml version="1.0" encoding="utf-8"?>
-<ds:datastoreItem xmlns:ds="http://schemas.openxmlformats.org/officeDocument/2006/customXml" ds:itemID="{15ACA71F-45FC-4468-B737-845C2FDCD2DF}">
-  <ds:schemaRefs/>
-</ds:datastoreItem>
-</file>
-
 <file path=customXml/itemProps7.xml><?xml version="1.0" encoding="utf-8"?>
-<ds:datastoreItem xmlns:ds="http://schemas.openxmlformats.org/officeDocument/2006/customXml" ds:itemID="{644E3CC3-5418-4967-B084-476DADC75B9C}">
+<ds:datastoreItem xmlns:ds="http://schemas.openxmlformats.org/officeDocument/2006/customXml" ds:itemID="{CB0A619E-115B-4A5D-A2D2-ADEC52679995}">
   <ds:schemaRefs/>
 </ds:datastoreItem>
 </file>
@@ -11156,7 +12707,7 @@
 </file>
 
 <file path=customXml/itemProps9.xml><?xml version="1.0" encoding="utf-8"?>
-<ds:datastoreItem xmlns:ds="http://schemas.openxmlformats.org/officeDocument/2006/customXml" ds:itemID="{CB0A619E-115B-4A5D-A2D2-ADEC52679995}">
+<ds:datastoreItem xmlns:ds="http://schemas.openxmlformats.org/officeDocument/2006/customXml" ds:itemID="{E7DCFFA5-1C0A-475A-8D4B-D9408E8F38DD}">
   <ds:schemaRefs/>
 </ds:datastoreItem>
 </file>
</xml_diff>

<commit_message>
RBAC Added Permission objects
</commit_message>
<xml_diff>
--- a/MOF.pptx
+++ b/MOF.pptx
@@ -2,15 +2,16 @@
 <file path=ppt/presentation.xml><?xml version="1.0" encoding="utf-8"?>
 <p:presentation xmlns:a="http://schemas.openxmlformats.org/drawingml/2006/main" xmlns:r="http://schemas.openxmlformats.org/officeDocument/2006/relationships" xmlns:p="http://schemas.openxmlformats.org/presentationml/2006/main" saveSubsetFonts="1">
   <p:sldMasterIdLst>
-    <p:sldMasterId id="2147483648" r:id="rId15"/>
+    <p:sldMasterId id="2147483648" r:id="rId17"/>
   </p:sldMasterIdLst>
   <p:sldIdLst>
-    <p:sldId id="2147375798" r:id="rId16"/>
-    <p:sldId id="2147375801" r:id="rId17"/>
-    <p:sldId id="2147375799" r:id="rId18"/>
-    <p:sldId id="2147375800" r:id="rId19"/>
-    <p:sldId id="2147375802" r:id="rId20"/>
-    <p:sldId id="2147375803" r:id="rId21"/>
+    <p:sldId id="2147375798" r:id="rId18"/>
+    <p:sldId id="2147375801" r:id="rId19"/>
+    <p:sldId id="2147375799" r:id="rId20"/>
+    <p:sldId id="2147375804" r:id="rId21"/>
+    <p:sldId id="2147375800" r:id="rId22"/>
+    <p:sldId id="2147375802" r:id="rId23"/>
+    <p:sldId id="2147375803" r:id="rId24"/>
   </p:sldIdLst>
   <p:sldSz cx="12192000" cy="6858000"/>
   <p:notesSz cx="6858000" cy="9144000"/>
@@ -264,7 +265,7 @@
           <a:p>
             <a:fld id="{04EA401D-5055-4814-A1ED-3DA3CC804920}" type="datetimeFigureOut">
               <a:rPr lang="en-US" smtClean="0"/>
-              <a:t>4/18/2022</a:t>
+              <a:t>4/20/2022</a:t>
             </a:fld>
             <a:endParaRPr lang="en-US"/>
           </a:p>
@@ -462,7 +463,7 @@
           <a:p>
             <a:fld id="{04EA401D-5055-4814-A1ED-3DA3CC804920}" type="datetimeFigureOut">
               <a:rPr lang="en-US" smtClean="0"/>
-              <a:t>4/18/2022</a:t>
+              <a:t>4/20/2022</a:t>
             </a:fld>
             <a:endParaRPr lang="en-US"/>
           </a:p>
@@ -670,7 +671,7 @@
           <a:p>
             <a:fld id="{04EA401D-5055-4814-A1ED-3DA3CC804920}" type="datetimeFigureOut">
               <a:rPr lang="en-US" smtClean="0"/>
-              <a:t>4/18/2022</a:t>
+              <a:t>4/20/2022</a:t>
             </a:fld>
             <a:endParaRPr lang="en-US"/>
           </a:p>
@@ -791,7 +792,7 @@
           <a:graphicData uri="http://schemas.openxmlformats.org/presentationml/2006/ole">
             <mc:AlternateContent xmlns:mc="http://schemas.openxmlformats.org/markup-compatibility/2006">
               <mc:Choice xmlns:v="urn:schemas-microsoft-com:vml" Requires="v">
-                <p:oleObj spid="_x0000_s1708" name="think-cell Slide" r:id="rId5" imgW="479" imgH="478" progId="TCLayout.ActiveDocument.1">
+                <p:oleObj spid="_x0000_s1729" name="think-cell Slide" r:id="rId5" imgW="479" imgH="478" progId="TCLayout.ActiveDocument.1">
                   <p:embed/>
                 </p:oleObj>
               </mc:Choice>
@@ -1314,7 +1315,7 @@
           <a:p>
             <a:fld id="{04EA401D-5055-4814-A1ED-3DA3CC804920}" type="datetimeFigureOut">
               <a:rPr lang="en-US" smtClean="0"/>
-              <a:t>4/18/2022</a:t>
+              <a:t>4/20/2022</a:t>
             </a:fld>
             <a:endParaRPr lang="en-US"/>
           </a:p>
@@ -1589,7 +1590,7 @@
           <a:p>
             <a:fld id="{04EA401D-5055-4814-A1ED-3DA3CC804920}" type="datetimeFigureOut">
               <a:rPr lang="en-US" smtClean="0"/>
-              <a:t>4/18/2022</a:t>
+              <a:t>4/20/2022</a:t>
             </a:fld>
             <a:endParaRPr lang="en-US"/>
           </a:p>
@@ -1854,7 +1855,7 @@
           <a:p>
             <a:fld id="{04EA401D-5055-4814-A1ED-3DA3CC804920}" type="datetimeFigureOut">
               <a:rPr lang="en-US" smtClean="0"/>
-              <a:t>4/18/2022</a:t>
+              <a:t>4/20/2022</a:t>
             </a:fld>
             <a:endParaRPr lang="en-US"/>
           </a:p>
@@ -2266,7 +2267,7 @@
           <a:p>
             <a:fld id="{04EA401D-5055-4814-A1ED-3DA3CC804920}" type="datetimeFigureOut">
               <a:rPr lang="en-US" smtClean="0"/>
-              <a:t>4/18/2022</a:t>
+              <a:t>4/20/2022</a:t>
             </a:fld>
             <a:endParaRPr lang="en-US"/>
           </a:p>
@@ -2407,7 +2408,7 @@
           <a:p>
             <a:fld id="{04EA401D-5055-4814-A1ED-3DA3CC804920}" type="datetimeFigureOut">
               <a:rPr lang="en-US" smtClean="0"/>
-              <a:t>4/18/2022</a:t>
+              <a:t>4/20/2022</a:t>
             </a:fld>
             <a:endParaRPr lang="en-US"/>
           </a:p>
@@ -2520,7 +2521,7 @@
           <a:p>
             <a:fld id="{04EA401D-5055-4814-A1ED-3DA3CC804920}" type="datetimeFigureOut">
               <a:rPr lang="en-US" smtClean="0"/>
-              <a:t>4/18/2022</a:t>
+              <a:t>4/20/2022</a:t>
             </a:fld>
             <a:endParaRPr lang="en-US"/>
           </a:p>
@@ -2831,7 +2832,7 @@
           <a:p>
             <a:fld id="{04EA401D-5055-4814-A1ED-3DA3CC804920}" type="datetimeFigureOut">
               <a:rPr lang="en-US" smtClean="0"/>
-              <a:t>4/18/2022</a:t>
+              <a:t>4/20/2022</a:t>
             </a:fld>
             <a:endParaRPr lang="en-US"/>
           </a:p>
@@ -3119,7 +3120,7 @@
           <a:p>
             <a:fld id="{04EA401D-5055-4814-A1ED-3DA3CC804920}" type="datetimeFigureOut">
               <a:rPr lang="en-US" smtClean="0"/>
-              <a:t>4/18/2022</a:t>
+              <a:t>4/20/2022</a:t>
             </a:fld>
             <a:endParaRPr lang="en-US"/>
           </a:p>
@@ -3360,7 +3361,7 @@
           <a:p>
             <a:fld id="{04EA401D-5055-4814-A1ED-3DA3CC804920}" type="datetimeFigureOut">
               <a:rPr lang="en-US" smtClean="0"/>
-              <a:t>4/18/2022</a:t>
+              <a:t>4/20/2022</a:t>
             </a:fld>
             <a:endParaRPr lang="en-US"/>
           </a:p>
@@ -7710,6 +7711,670 @@
           </a:p>
         </p:txBody>
       </p:sp>
+      <p:sp>
+        <p:nvSpPr>
+          <p:cNvPr id="45" name="Rectangle: Rounded Corners 44">
+            <a:extLst>
+              <a:ext uri="{FF2B5EF4-FFF2-40B4-BE49-F238E27FC236}">
+                <a16:creationId xmlns:a16="http://schemas.microsoft.com/office/drawing/2014/main" id="{90A35F21-CD60-4221-8A36-54AB47096812}"/>
+              </a:ext>
+            </a:extLst>
+          </p:cNvPr>
+          <p:cNvSpPr/>
+          <p:nvPr/>
+        </p:nvSpPr>
+        <p:spPr>
+          <a:xfrm>
+            <a:off x="1100746" y="4829605"/>
+            <a:ext cx="828000" cy="432000"/>
+          </a:xfrm>
+          <a:prstGeom prst="roundRect">
+            <a:avLst/>
+          </a:prstGeom>
+        </p:spPr>
+        <p:style>
+          <a:lnRef idx="2">
+            <a:schemeClr val="accent1">
+              <a:shade val="50000"/>
+            </a:schemeClr>
+          </a:lnRef>
+          <a:fillRef idx="1">
+            <a:schemeClr val="accent1"/>
+          </a:fillRef>
+          <a:effectRef idx="0">
+            <a:schemeClr val="accent1"/>
+          </a:effectRef>
+          <a:fontRef idx="minor">
+            <a:schemeClr val="lt1"/>
+          </a:fontRef>
+        </p:style>
+        <p:txBody>
+          <a:bodyPr rtlCol="0" anchor="ctr"/>
+          <a:lstStyle/>
+          <a:p>
+            <a:pPr algn="ctr"/>
+            <a:r>
+              <a:rPr lang="en-IN" sz="1200" dirty="0"/>
+              <a:t>Correctness</a:t>
+            </a:r>
+            <a:endParaRPr lang="en-US" sz="1200" dirty="0"/>
+          </a:p>
+        </p:txBody>
+      </p:sp>
+      <p:sp>
+        <p:nvSpPr>
+          <p:cNvPr id="48" name="Rectangle: Rounded Corners 47">
+            <a:extLst>
+              <a:ext uri="{FF2B5EF4-FFF2-40B4-BE49-F238E27FC236}">
+                <a16:creationId xmlns:a16="http://schemas.microsoft.com/office/drawing/2014/main" id="{2026C6EE-1464-4F6F-AEB2-41565112A066}"/>
+              </a:ext>
+            </a:extLst>
+          </p:cNvPr>
+          <p:cNvSpPr/>
+          <p:nvPr/>
+        </p:nvSpPr>
+        <p:spPr>
+          <a:xfrm>
+            <a:off x="2816027" y="4521833"/>
+            <a:ext cx="828000" cy="432000"/>
+          </a:xfrm>
+          <a:prstGeom prst="roundRect">
+            <a:avLst/>
+          </a:prstGeom>
+        </p:spPr>
+        <p:style>
+          <a:lnRef idx="2">
+            <a:schemeClr val="accent1">
+              <a:shade val="50000"/>
+            </a:schemeClr>
+          </a:lnRef>
+          <a:fillRef idx="1">
+            <a:schemeClr val="accent1"/>
+          </a:fillRef>
+          <a:effectRef idx="0">
+            <a:schemeClr val="accent1"/>
+          </a:effectRef>
+          <a:fontRef idx="minor">
+            <a:schemeClr val="lt1"/>
+          </a:fontRef>
+        </p:style>
+        <p:txBody>
+          <a:bodyPr rtlCol="0" anchor="ctr"/>
+          <a:lstStyle/>
+          <a:p>
+            <a:pPr algn="ctr"/>
+            <a:r>
+              <a:rPr lang="en-IN" sz="1200" dirty="0"/>
+              <a:t>Validate Borrower</a:t>
+            </a:r>
+            <a:endParaRPr lang="en-US" sz="1200" dirty="0"/>
+          </a:p>
+        </p:txBody>
+      </p:sp>
+      <p:sp>
+        <p:nvSpPr>
+          <p:cNvPr id="49" name="Oval 48">
+            <a:extLst>
+              <a:ext uri="{FF2B5EF4-FFF2-40B4-BE49-F238E27FC236}">
+                <a16:creationId xmlns:a16="http://schemas.microsoft.com/office/drawing/2014/main" id="{CAD6A290-B711-47ED-BFB7-921ACE55F670}"/>
+              </a:ext>
+            </a:extLst>
+          </p:cNvPr>
+          <p:cNvSpPr/>
+          <p:nvPr/>
+        </p:nvSpPr>
+        <p:spPr>
+          <a:xfrm>
+            <a:off x="1842665" y="4647167"/>
+            <a:ext cx="339047" cy="246580"/>
+          </a:xfrm>
+          <a:prstGeom prst="ellipse">
+            <a:avLst/>
+          </a:prstGeom>
+          <a:solidFill>
+            <a:srgbClr val="FFC000"/>
+          </a:solidFill>
+        </p:spPr>
+        <p:style>
+          <a:lnRef idx="2">
+            <a:schemeClr val="accent1">
+              <a:shade val="50000"/>
+            </a:schemeClr>
+          </a:lnRef>
+          <a:fillRef idx="1">
+            <a:schemeClr val="accent1"/>
+          </a:fillRef>
+          <a:effectRef idx="0">
+            <a:schemeClr val="accent1"/>
+          </a:effectRef>
+          <a:fontRef idx="minor">
+            <a:schemeClr val="lt1"/>
+          </a:fontRef>
+        </p:style>
+        <p:txBody>
+          <a:bodyPr lIns="0" tIns="0" rIns="0" bIns="0" rtlCol="0" anchor="ctr"/>
+          <a:lstStyle/>
+          <a:p>
+            <a:pPr algn="ctr"/>
+            <a:r>
+              <a:rPr lang="en-IN" sz="1200" b="1" dirty="0">
+                <a:solidFill>
+                  <a:schemeClr val="tx1"/>
+                </a:solidFill>
+              </a:rPr>
+              <a:t>e3</a:t>
+            </a:r>
+            <a:endParaRPr lang="en-US" sz="1200" b="1" dirty="0">
+              <a:solidFill>
+                <a:schemeClr val="tx1"/>
+              </a:solidFill>
+            </a:endParaRPr>
+          </a:p>
+        </p:txBody>
+      </p:sp>
+      <p:cxnSp>
+        <p:nvCxnSpPr>
+          <p:cNvPr id="50" name="Straight Arrow Connector 49">
+            <a:extLst>
+              <a:ext uri="{FF2B5EF4-FFF2-40B4-BE49-F238E27FC236}">
+                <a16:creationId xmlns:a16="http://schemas.microsoft.com/office/drawing/2014/main" id="{EF48A1D4-ECC1-44D7-9561-9DD34B3F8576}"/>
+              </a:ext>
+            </a:extLst>
+          </p:cNvPr>
+          <p:cNvCxnSpPr>
+            <a:cxnSpLocks/>
+            <a:endCxn id="48" idx="1"/>
+          </p:cNvCxnSpPr>
+          <p:nvPr/>
+        </p:nvCxnSpPr>
+        <p:spPr>
+          <a:xfrm>
+            <a:off x="2517861" y="4729481"/>
+            <a:ext cx="298166" cy="8352"/>
+          </a:xfrm>
+          <a:prstGeom prst="straightConnector1">
+            <a:avLst/>
+          </a:prstGeom>
+          <a:ln>
+            <a:solidFill>
+              <a:schemeClr val="tx1"/>
+            </a:solidFill>
+            <a:tailEnd type="triangle"/>
+          </a:ln>
+        </p:spPr>
+        <p:style>
+          <a:lnRef idx="1">
+            <a:schemeClr val="accent1"/>
+          </a:lnRef>
+          <a:fillRef idx="0">
+            <a:schemeClr val="accent1"/>
+          </a:fillRef>
+          <a:effectRef idx="0">
+            <a:schemeClr val="accent1"/>
+          </a:effectRef>
+          <a:fontRef idx="minor">
+            <a:schemeClr val="tx1"/>
+          </a:fontRef>
+        </p:style>
+      </p:cxnSp>
+      <p:sp>
+        <p:nvSpPr>
+          <p:cNvPr id="51" name="Rectangle: Rounded Corners 50">
+            <a:extLst>
+              <a:ext uri="{FF2B5EF4-FFF2-40B4-BE49-F238E27FC236}">
+                <a16:creationId xmlns:a16="http://schemas.microsoft.com/office/drawing/2014/main" id="{6E693E2D-E72F-400F-B865-4346BFF0DF2F}"/>
+              </a:ext>
+            </a:extLst>
+          </p:cNvPr>
+          <p:cNvSpPr/>
+          <p:nvPr/>
+        </p:nvSpPr>
+        <p:spPr>
+          <a:xfrm>
+            <a:off x="2845971" y="5335166"/>
+            <a:ext cx="828000" cy="432000"/>
+          </a:xfrm>
+          <a:prstGeom prst="roundRect">
+            <a:avLst/>
+          </a:prstGeom>
+        </p:spPr>
+        <p:style>
+          <a:lnRef idx="2">
+            <a:schemeClr val="accent1">
+              <a:shade val="50000"/>
+            </a:schemeClr>
+          </a:lnRef>
+          <a:fillRef idx="1">
+            <a:schemeClr val="accent1"/>
+          </a:fillRef>
+          <a:effectRef idx="0">
+            <a:schemeClr val="accent1"/>
+          </a:effectRef>
+          <a:fontRef idx="minor">
+            <a:schemeClr val="lt1"/>
+          </a:fontRef>
+        </p:style>
+        <p:txBody>
+          <a:bodyPr rtlCol="0" anchor="ctr"/>
+          <a:lstStyle/>
+          <a:p>
+            <a:pPr algn="ctr"/>
+            <a:r>
+              <a:rPr lang="en-IN" sz="1200" dirty="0"/>
+              <a:t>Validate Property</a:t>
+            </a:r>
+            <a:endParaRPr lang="en-US" sz="1200" dirty="0"/>
+          </a:p>
+        </p:txBody>
+      </p:sp>
+      <p:cxnSp>
+        <p:nvCxnSpPr>
+          <p:cNvPr id="52" name="Connector: Elbow 51">
+            <a:extLst>
+              <a:ext uri="{FF2B5EF4-FFF2-40B4-BE49-F238E27FC236}">
+                <a16:creationId xmlns:a16="http://schemas.microsoft.com/office/drawing/2014/main" id="{A07985CE-BF9B-45A3-A421-BFCAF9E33862}"/>
+              </a:ext>
+            </a:extLst>
+          </p:cNvPr>
+          <p:cNvCxnSpPr>
+            <a:cxnSpLocks/>
+            <a:stCxn id="45" idx="3"/>
+            <a:endCxn id="48" idx="1"/>
+          </p:cNvCxnSpPr>
+          <p:nvPr/>
+        </p:nvCxnSpPr>
+        <p:spPr>
+          <a:xfrm flipV="1">
+            <a:off x="1928746" y="4737833"/>
+            <a:ext cx="887281" cy="307772"/>
+          </a:xfrm>
+          <a:prstGeom prst="bentConnector3">
+            <a:avLst/>
+          </a:prstGeom>
+          <a:ln>
+            <a:solidFill>
+              <a:schemeClr val="tx1"/>
+            </a:solidFill>
+            <a:tailEnd type="triangle"/>
+          </a:ln>
+        </p:spPr>
+        <p:style>
+          <a:lnRef idx="1">
+            <a:schemeClr val="accent1"/>
+          </a:lnRef>
+          <a:fillRef idx="0">
+            <a:schemeClr val="accent1"/>
+          </a:fillRef>
+          <a:effectRef idx="0">
+            <a:schemeClr val="accent1"/>
+          </a:effectRef>
+          <a:fontRef idx="minor">
+            <a:schemeClr val="tx1"/>
+          </a:fontRef>
+        </p:style>
+      </p:cxnSp>
+      <p:cxnSp>
+        <p:nvCxnSpPr>
+          <p:cNvPr id="53" name="Connector: Elbow 52">
+            <a:extLst>
+              <a:ext uri="{FF2B5EF4-FFF2-40B4-BE49-F238E27FC236}">
+                <a16:creationId xmlns:a16="http://schemas.microsoft.com/office/drawing/2014/main" id="{886CAB29-E6F1-41D3-8BB0-45AB7685CF72}"/>
+              </a:ext>
+            </a:extLst>
+          </p:cNvPr>
+          <p:cNvCxnSpPr>
+            <a:cxnSpLocks/>
+            <a:stCxn id="45" idx="3"/>
+            <a:endCxn id="51" idx="1"/>
+          </p:cNvCxnSpPr>
+          <p:nvPr/>
+        </p:nvCxnSpPr>
+        <p:spPr>
+          <a:xfrm>
+            <a:off x="1928746" y="5045605"/>
+            <a:ext cx="917225" cy="505561"/>
+          </a:xfrm>
+          <a:prstGeom prst="bentConnector3">
+            <a:avLst/>
+          </a:prstGeom>
+          <a:ln>
+            <a:solidFill>
+              <a:schemeClr val="tx1"/>
+            </a:solidFill>
+            <a:tailEnd type="triangle"/>
+          </a:ln>
+        </p:spPr>
+        <p:style>
+          <a:lnRef idx="1">
+            <a:schemeClr val="accent1"/>
+          </a:lnRef>
+          <a:fillRef idx="0">
+            <a:schemeClr val="accent1"/>
+          </a:fillRef>
+          <a:effectRef idx="0">
+            <a:schemeClr val="accent1"/>
+          </a:effectRef>
+          <a:fontRef idx="minor">
+            <a:schemeClr val="tx1"/>
+          </a:fontRef>
+        </p:style>
+      </p:cxnSp>
+      <p:sp>
+        <p:nvSpPr>
+          <p:cNvPr id="54" name="Oval 53">
+            <a:extLst>
+              <a:ext uri="{FF2B5EF4-FFF2-40B4-BE49-F238E27FC236}">
+                <a16:creationId xmlns:a16="http://schemas.microsoft.com/office/drawing/2014/main" id="{9DE81E75-0596-40A9-B737-9EA86C84B61E}"/>
+              </a:ext>
+            </a:extLst>
+          </p:cNvPr>
+          <p:cNvSpPr/>
+          <p:nvPr/>
+        </p:nvSpPr>
+        <p:spPr>
+          <a:xfrm>
+            <a:off x="3551971" y="4326344"/>
+            <a:ext cx="339047" cy="246580"/>
+          </a:xfrm>
+          <a:prstGeom prst="ellipse">
+            <a:avLst/>
+          </a:prstGeom>
+          <a:solidFill>
+            <a:srgbClr val="FFC000"/>
+          </a:solidFill>
+        </p:spPr>
+        <p:style>
+          <a:lnRef idx="2">
+            <a:schemeClr val="accent1">
+              <a:shade val="50000"/>
+            </a:schemeClr>
+          </a:lnRef>
+          <a:fillRef idx="1">
+            <a:schemeClr val="accent1"/>
+          </a:fillRef>
+          <a:effectRef idx="0">
+            <a:schemeClr val="accent1"/>
+          </a:effectRef>
+          <a:fontRef idx="minor">
+            <a:schemeClr val="lt1"/>
+          </a:fontRef>
+        </p:style>
+        <p:txBody>
+          <a:bodyPr lIns="0" tIns="0" rIns="0" bIns="0" rtlCol="0" anchor="ctr"/>
+          <a:lstStyle/>
+          <a:p>
+            <a:pPr algn="ctr"/>
+            <a:r>
+              <a:rPr lang="en-IN" sz="1200" b="1" dirty="0">
+                <a:solidFill>
+                  <a:schemeClr val="tx1"/>
+                </a:solidFill>
+              </a:rPr>
+              <a:t>e4</a:t>
+            </a:r>
+            <a:endParaRPr lang="en-US" sz="1200" b="1" dirty="0">
+              <a:solidFill>
+                <a:schemeClr val="tx1"/>
+              </a:solidFill>
+            </a:endParaRPr>
+          </a:p>
+        </p:txBody>
+      </p:sp>
+      <p:sp>
+        <p:nvSpPr>
+          <p:cNvPr id="69" name="Oval 68">
+            <a:extLst>
+              <a:ext uri="{FF2B5EF4-FFF2-40B4-BE49-F238E27FC236}">
+                <a16:creationId xmlns:a16="http://schemas.microsoft.com/office/drawing/2014/main" id="{7CFAFC6E-DD6E-48A2-AB46-7D399F329BFA}"/>
+              </a:ext>
+            </a:extLst>
+          </p:cNvPr>
+          <p:cNvSpPr/>
+          <p:nvPr/>
+        </p:nvSpPr>
+        <p:spPr>
+          <a:xfrm>
+            <a:off x="3589999" y="5709449"/>
+            <a:ext cx="339047" cy="246580"/>
+          </a:xfrm>
+          <a:prstGeom prst="ellipse">
+            <a:avLst/>
+          </a:prstGeom>
+          <a:solidFill>
+            <a:srgbClr val="FFC000"/>
+          </a:solidFill>
+        </p:spPr>
+        <p:style>
+          <a:lnRef idx="2">
+            <a:schemeClr val="accent1">
+              <a:shade val="50000"/>
+            </a:schemeClr>
+          </a:lnRef>
+          <a:fillRef idx="1">
+            <a:schemeClr val="accent1"/>
+          </a:fillRef>
+          <a:effectRef idx="0">
+            <a:schemeClr val="accent1"/>
+          </a:effectRef>
+          <a:fontRef idx="minor">
+            <a:schemeClr val="lt1"/>
+          </a:fontRef>
+        </p:style>
+        <p:txBody>
+          <a:bodyPr lIns="0" tIns="0" rIns="0" bIns="0" rtlCol="0" anchor="ctr"/>
+          <a:lstStyle/>
+          <a:p>
+            <a:pPr algn="ctr"/>
+            <a:r>
+              <a:rPr lang="en-IN" sz="1200" b="1" dirty="0">
+                <a:solidFill>
+                  <a:schemeClr val="tx1"/>
+                </a:solidFill>
+              </a:rPr>
+              <a:t>e6</a:t>
+            </a:r>
+            <a:endParaRPr lang="en-US" sz="1200" b="1" dirty="0">
+              <a:solidFill>
+                <a:schemeClr val="tx1"/>
+              </a:solidFill>
+            </a:endParaRPr>
+          </a:p>
+        </p:txBody>
+      </p:sp>
+      <p:sp>
+        <p:nvSpPr>
+          <p:cNvPr id="70" name="Rectangle: Rounded Corners 69">
+            <a:extLst>
+              <a:ext uri="{FF2B5EF4-FFF2-40B4-BE49-F238E27FC236}">
+                <a16:creationId xmlns:a16="http://schemas.microsoft.com/office/drawing/2014/main" id="{04410E49-AE3B-4F0C-B89F-EBA05724334D}"/>
+              </a:ext>
+            </a:extLst>
+          </p:cNvPr>
+          <p:cNvSpPr/>
+          <p:nvPr/>
+        </p:nvSpPr>
+        <p:spPr>
+          <a:xfrm>
+            <a:off x="4270710" y="4521833"/>
+            <a:ext cx="828000" cy="432000"/>
+          </a:xfrm>
+          <a:prstGeom prst="roundRect">
+            <a:avLst/>
+          </a:prstGeom>
+        </p:spPr>
+        <p:style>
+          <a:lnRef idx="2">
+            <a:schemeClr val="accent1">
+              <a:shade val="50000"/>
+            </a:schemeClr>
+          </a:lnRef>
+          <a:fillRef idx="1">
+            <a:schemeClr val="accent1"/>
+          </a:fillRef>
+          <a:effectRef idx="0">
+            <a:schemeClr val="accent1"/>
+          </a:effectRef>
+          <a:fontRef idx="minor">
+            <a:schemeClr val="lt1"/>
+          </a:fontRef>
+        </p:style>
+        <p:txBody>
+          <a:bodyPr rtlCol="0" anchor="ctr"/>
+          <a:lstStyle/>
+          <a:p>
+            <a:pPr algn="ctr"/>
+            <a:r>
+              <a:rPr lang="en-IN" sz="1200" dirty="0"/>
+              <a:t>Validate Borrower</a:t>
+            </a:r>
+            <a:endParaRPr lang="en-US" sz="1200" dirty="0"/>
+          </a:p>
+        </p:txBody>
+      </p:sp>
+      <p:cxnSp>
+        <p:nvCxnSpPr>
+          <p:cNvPr id="83" name="Connector: Elbow 82">
+            <a:extLst>
+              <a:ext uri="{FF2B5EF4-FFF2-40B4-BE49-F238E27FC236}">
+                <a16:creationId xmlns:a16="http://schemas.microsoft.com/office/drawing/2014/main" id="{7352B5C3-B94B-43BE-9796-CB26CF5EBDC4}"/>
+              </a:ext>
+            </a:extLst>
+          </p:cNvPr>
+          <p:cNvCxnSpPr>
+            <a:cxnSpLocks/>
+            <a:stCxn id="48" idx="3"/>
+            <a:endCxn id="70" idx="1"/>
+          </p:cNvCxnSpPr>
+          <p:nvPr/>
+        </p:nvCxnSpPr>
+        <p:spPr>
+          <a:xfrm>
+            <a:off x="3644027" y="4737833"/>
+            <a:ext cx="626683" cy="12700"/>
+          </a:xfrm>
+          <a:prstGeom prst="bentConnector3">
+            <a:avLst/>
+          </a:prstGeom>
+          <a:ln>
+            <a:solidFill>
+              <a:schemeClr val="tx1"/>
+            </a:solidFill>
+            <a:tailEnd type="triangle"/>
+          </a:ln>
+        </p:spPr>
+        <p:style>
+          <a:lnRef idx="1">
+            <a:schemeClr val="accent1"/>
+          </a:lnRef>
+          <a:fillRef idx="0">
+            <a:schemeClr val="accent1"/>
+          </a:fillRef>
+          <a:effectRef idx="0">
+            <a:schemeClr val="accent1"/>
+          </a:effectRef>
+          <a:fontRef idx="minor">
+            <a:schemeClr val="tx1"/>
+          </a:fontRef>
+        </p:style>
+      </p:cxnSp>
+      <p:sp>
+        <p:nvSpPr>
+          <p:cNvPr id="84" name="Rectangle: Rounded Corners 83">
+            <a:extLst>
+              <a:ext uri="{FF2B5EF4-FFF2-40B4-BE49-F238E27FC236}">
+                <a16:creationId xmlns:a16="http://schemas.microsoft.com/office/drawing/2014/main" id="{35B03DCC-5448-42C8-BEEF-7763154A6630}"/>
+              </a:ext>
+            </a:extLst>
+          </p:cNvPr>
+          <p:cNvSpPr/>
+          <p:nvPr/>
+        </p:nvSpPr>
+        <p:spPr>
+          <a:xfrm>
+            <a:off x="4309442" y="5379405"/>
+            <a:ext cx="828000" cy="432000"/>
+          </a:xfrm>
+          <a:prstGeom prst="roundRect">
+            <a:avLst/>
+          </a:prstGeom>
+        </p:spPr>
+        <p:style>
+          <a:lnRef idx="2">
+            <a:schemeClr val="accent1">
+              <a:shade val="50000"/>
+            </a:schemeClr>
+          </a:lnRef>
+          <a:fillRef idx="1">
+            <a:schemeClr val="accent1"/>
+          </a:fillRef>
+          <a:effectRef idx="0">
+            <a:schemeClr val="accent1"/>
+          </a:effectRef>
+          <a:fontRef idx="minor">
+            <a:schemeClr val="lt1"/>
+          </a:fontRef>
+        </p:style>
+        <p:txBody>
+          <a:bodyPr rtlCol="0" anchor="ctr"/>
+          <a:lstStyle/>
+          <a:p>
+            <a:pPr algn="ctr"/>
+            <a:r>
+              <a:rPr lang="en-IN" sz="1200" dirty="0"/>
+              <a:t>Validate Borrower</a:t>
+            </a:r>
+            <a:endParaRPr lang="en-US" sz="1200" dirty="0"/>
+          </a:p>
+        </p:txBody>
+      </p:sp>
+      <p:cxnSp>
+        <p:nvCxnSpPr>
+          <p:cNvPr id="85" name="Connector: Elbow 84">
+            <a:extLst>
+              <a:ext uri="{FF2B5EF4-FFF2-40B4-BE49-F238E27FC236}">
+                <a16:creationId xmlns:a16="http://schemas.microsoft.com/office/drawing/2014/main" id="{109EEDEB-513E-442C-995D-E2CE2878CB8D}"/>
+              </a:ext>
+            </a:extLst>
+          </p:cNvPr>
+          <p:cNvCxnSpPr>
+            <a:cxnSpLocks/>
+            <a:stCxn id="51" idx="3"/>
+            <a:endCxn id="84" idx="1"/>
+          </p:cNvCxnSpPr>
+          <p:nvPr/>
+        </p:nvCxnSpPr>
+        <p:spPr>
+          <a:xfrm>
+            <a:off x="3673971" y="5551166"/>
+            <a:ext cx="635471" cy="44239"/>
+          </a:xfrm>
+          <a:prstGeom prst="bentConnector3">
+            <a:avLst>
+              <a:gd name="adj1" fmla="val 50000"/>
+            </a:avLst>
+          </a:prstGeom>
+          <a:ln>
+            <a:solidFill>
+              <a:schemeClr val="tx1"/>
+            </a:solidFill>
+            <a:tailEnd type="triangle"/>
+          </a:ln>
+        </p:spPr>
+        <p:style>
+          <a:lnRef idx="1">
+            <a:schemeClr val="accent1"/>
+          </a:lnRef>
+          <a:fillRef idx="0">
+            <a:schemeClr val="accent1"/>
+          </a:fillRef>
+          <a:effectRef idx="0">
+            <a:schemeClr val="accent1"/>
+          </a:effectRef>
+          <a:fontRef idx="minor">
+            <a:schemeClr val="tx1"/>
+          </a:fontRef>
+        </p:style>
+      </p:cxnSp>
     </p:spTree>
     <p:custDataLst>
       <p:custData r:id="rId1"/>
@@ -7774,6 +8439,2247 @@
         </p:nvSpPr>
         <p:spPr>
           <a:xfrm>
+            <a:off x="278204" y="300875"/>
+            <a:ext cx="10031916" cy="644842"/>
+          </a:xfrm>
+        </p:spPr>
+        <p:txBody>
+          <a:bodyPr/>
+          <a:lstStyle/>
+          <a:p>
+            <a:r>
+              <a:rPr lang="en-US" dirty="0"/>
+              <a:t>Loan Process</a:t>
+            </a:r>
+          </a:p>
+        </p:txBody>
+      </p:sp>
+      <p:sp>
+        <p:nvSpPr>
+          <p:cNvPr id="30" name="Rectangle: Rounded Corners 29">
+            <a:extLst>
+              <a:ext uri="{FF2B5EF4-FFF2-40B4-BE49-F238E27FC236}">
+                <a16:creationId xmlns:a16="http://schemas.microsoft.com/office/drawing/2014/main" id="{C3652913-5810-40EB-BCB1-4C1C82FB75B6}"/>
+              </a:ext>
+            </a:extLst>
+          </p:cNvPr>
+          <p:cNvSpPr/>
+          <p:nvPr/>
+        </p:nvSpPr>
+        <p:spPr>
+          <a:xfrm>
+            <a:off x="972816" y="2221682"/>
+            <a:ext cx="828000" cy="432000"/>
+          </a:xfrm>
+          <a:prstGeom prst="roundRect">
+            <a:avLst/>
+          </a:prstGeom>
+        </p:spPr>
+        <p:style>
+          <a:lnRef idx="2">
+            <a:schemeClr val="accent1">
+              <a:shade val="50000"/>
+            </a:schemeClr>
+          </a:lnRef>
+          <a:fillRef idx="1">
+            <a:schemeClr val="accent1"/>
+          </a:fillRef>
+          <a:effectRef idx="0">
+            <a:schemeClr val="accent1"/>
+          </a:effectRef>
+          <a:fontRef idx="minor">
+            <a:schemeClr val="lt1"/>
+          </a:fontRef>
+        </p:style>
+        <p:txBody>
+          <a:bodyPr rtlCol="0" anchor="ctr"/>
+          <a:lstStyle/>
+          <a:p>
+            <a:pPr algn="ctr"/>
+            <a:r>
+              <a:rPr lang="en-IN" sz="1200" dirty="0"/>
+              <a:t>Completeness</a:t>
+            </a:r>
+            <a:endParaRPr lang="en-US" sz="1200" dirty="0"/>
+          </a:p>
+        </p:txBody>
+      </p:sp>
+      <p:sp>
+        <p:nvSpPr>
+          <p:cNvPr id="31" name="Oval 30">
+            <a:extLst>
+              <a:ext uri="{FF2B5EF4-FFF2-40B4-BE49-F238E27FC236}">
+                <a16:creationId xmlns:a16="http://schemas.microsoft.com/office/drawing/2014/main" id="{9B1A1304-9AC7-469A-BA98-2ED565CB71DA}"/>
+              </a:ext>
+            </a:extLst>
+          </p:cNvPr>
+          <p:cNvSpPr/>
+          <p:nvPr/>
+        </p:nvSpPr>
+        <p:spPr>
+          <a:xfrm>
+            <a:off x="508976" y="1997815"/>
+            <a:ext cx="339047" cy="246580"/>
+          </a:xfrm>
+          <a:prstGeom prst="ellipse">
+            <a:avLst/>
+          </a:prstGeom>
+          <a:solidFill>
+            <a:srgbClr val="FFC000"/>
+          </a:solidFill>
+        </p:spPr>
+        <p:style>
+          <a:lnRef idx="2">
+            <a:schemeClr val="accent1">
+              <a:shade val="50000"/>
+            </a:schemeClr>
+          </a:lnRef>
+          <a:fillRef idx="1">
+            <a:schemeClr val="accent1"/>
+          </a:fillRef>
+          <a:effectRef idx="0">
+            <a:schemeClr val="accent1"/>
+          </a:effectRef>
+          <a:fontRef idx="minor">
+            <a:schemeClr val="lt1"/>
+          </a:fontRef>
+        </p:style>
+        <p:txBody>
+          <a:bodyPr lIns="0" tIns="0" rIns="0" bIns="0" rtlCol="0" anchor="ctr"/>
+          <a:lstStyle/>
+          <a:p>
+            <a:pPr algn="ctr"/>
+            <a:r>
+              <a:rPr lang="en-IN" sz="1200" b="1" dirty="0">
+                <a:solidFill>
+                  <a:schemeClr val="tx1"/>
+                </a:solidFill>
+              </a:rPr>
+              <a:t>e1</a:t>
+            </a:r>
+            <a:endParaRPr lang="en-US" sz="1200" b="1" dirty="0">
+              <a:solidFill>
+                <a:schemeClr val="tx1"/>
+              </a:solidFill>
+            </a:endParaRPr>
+          </a:p>
+        </p:txBody>
+      </p:sp>
+      <p:cxnSp>
+        <p:nvCxnSpPr>
+          <p:cNvPr id="32" name="Straight Arrow Connector 31">
+            <a:extLst>
+              <a:ext uri="{FF2B5EF4-FFF2-40B4-BE49-F238E27FC236}">
+                <a16:creationId xmlns:a16="http://schemas.microsoft.com/office/drawing/2014/main" id="{0516A37E-8590-465F-BFCB-94221A389A19}"/>
+              </a:ext>
+            </a:extLst>
+          </p:cNvPr>
+          <p:cNvCxnSpPr>
+            <a:cxnSpLocks/>
+            <a:endCxn id="30" idx="1"/>
+          </p:cNvCxnSpPr>
+          <p:nvPr/>
+        </p:nvCxnSpPr>
+        <p:spPr>
+          <a:xfrm>
+            <a:off x="674650" y="2429330"/>
+            <a:ext cx="298166" cy="8352"/>
+          </a:xfrm>
+          <a:prstGeom prst="straightConnector1">
+            <a:avLst/>
+          </a:prstGeom>
+          <a:ln>
+            <a:solidFill>
+              <a:schemeClr val="tx1"/>
+            </a:solidFill>
+            <a:tailEnd type="triangle"/>
+          </a:ln>
+        </p:spPr>
+        <p:style>
+          <a:lnRef idx="1">
+            <a:schemeClr val="accent1"/>
+          </a:lnRef>
+          <a:fillRef idx="0">
+            <a:schemeClr val="accent1"/>
+          </a:fillRef>
+          <a:effectRef idx="0">
+            <a:schemeClr val="accent1"/>
+          </a:effectRef>
+          <a:fontRef idx="minor">
+            <a:schemeClr val="tx1"/>
+          </a:fontRef>
+        </p:style>
+      </p:cxnSp>
+      <p:sp>
+        <p:nvSpPr>
+          <p:cNvPr id="41" name="Rectangle: Rounded Corners 40">
+            <a:extLst>
+              <a:ext uri="{FF2B5EF4-FFF2-40B4-BE49-F238E27FC236}">
+                <a16:creationId xmlns:a16="http://schemas.microsoft.com/office/drawing/2014/main" id="{745CBD2C-9AE7-4600-9DB0-8199A0D8FBFB}"/>
+              </a:ext>
+            </a:extLst>
+          </p:cNvPr>
+          <p:cNvSpPr/>
+          <p:nvPr/>
+        </p:nvSpPr>
+        <p:spPr>
+          <a:xfrm>
+            <a:off x="2104052" y="2221682"/>
+            <a:ext cx="828000" cy="432000"/>
+          </a:xfrm>
+          <a:prstGeom prst="roundRect">
+            <a:avLst/>
+          </a:prstGeom>
+        </p:spPr>
+        <p:style>
+          <a:lnRef idx="2">
+            <a:schemeClr val="accent1">
+              <a:shade val="50000"/>
+            </a:schemeClr>
+          </a:lnRef>
+          <a:fillRef idx="1">
+            <a:schemeClr val="accent1"/>
+          </a:fillRef>
+          <a:effectRef idx="0">
+            <a:schemeClr val="accent1"/>
+          </a:effectRef>
+          <a:fontRef idx="minor">
+            <a:schemeClr val="lt1"/>
+          </a:fontRef>
+        </p:style>
+        <p:txBody>
+          <a:bodyPr rtlCol="0" anchor="ctr"/>
+          <a:lstStyle/>
+          <a:p>
+            <a:pPr algn="ctr"/>
+            <a:r>
+              <a:rPr lang="en-IN" sz="1200" dirty="0"/>
+              <a:t>Correctness</a:t>
+            </a:r>
+            <a:endParaRPr lang="en-US" sz="1200" dirty="0"/>
+          </a:p>
+        </p:txBody>
+      </p:sp>
+      <p:sp>
+        <p:nvSpPr>
+          <p:cNvPr id="42" name="Oval 41">
+            <a:extLst>
+              <a:ext uri="{FF2B5EF4-FFF2-40B4-BE49-F238E27FC236}">
+                <a16:creationId xmlns:a16="http://schemas.microsoft.com/office/drawing/2014/main" id="{7DD57BFD-9820-4779-8E8E-55D1D4B2DE4D}"/>
+              </a:ext>
+            </a:extLst>
+          </p:cNvPr>
+          <p:cNvSpPr/>
+          <p:nvPr/>
+        </p:nvSpPr>
+        <p:spPr>
+          <a:xfrm>
+            <a:off x="1648986" y="1997815"/>
+            <a:ext cx="339047" cy="246580"/>
+          </a:xfrm>
+          <a:prstGeom prst="ellipse">
+            <a:avLst/>
+          </a:prstGeom>
+          <a:solidFill>
+            <a:srgbClr val="FFC000"/>
+          </a:solidFill>
+        </p:spPr>
+        <p:style>
+          <a:lnRef idx="2">
+            <a:schemeClr val="accent1">
+              <a:shade val="50000"/>
+            </a:schemeClr>
+          </a:lnRef>
+          <a:fillRef idx="1">
+            <a:schemeClr val="accent1"/>
+          </a:fillRef>
+          <a:effectRef idx="0">
+            <a:schemeClr val="accent1"/>
+          </a:effectRef>
+          <a:fontRef idx="minor">
+            <a:schemeClr val="lt1"/>
+          </a:fontRef>
+        </p:style>
+        <p:txBody>
+          <a:bodyPr lIns="0" tIns="0" rIns="0" bIns="0" rtlCol="0" anchor="ctr"/>
+          <a:lstStyle/>
+          <a:p>
+            <a:pPr algn="ctr"/>
+            <a:r>
+              <a:rPr lang="en-IN" sz="1200" b="1" dirty="0">
+                <a:solidFill>
+                  <a:schemeClr val="tx1"/>
+                </a:solidFill>
+              </a:rPr>
+              <a:t>e2</a:t>
+            </a:r>
+            <a:endParaRPr lang="en-US" sz="1200" b="1" dirty="0">
+              <a:solidFill>
+                <a:schemeClr val="tx1"/>
+              </a:solidFill>
+            </a:endParaRPr>
+          </a:p>
+        </p:txBody>
+      </p:sp>
+      <p:cxnSp>
+        <p:nvCxnSpPr>
+          <p:cNvPr id="43" name="Straight Arrow Connector 42">
+            <a:extLst>
+              <a:ext uri="{FF2B5EF4-FFF2-40B4-BE49-F238E27FC236}">
+                <a16:creationId xmlns:a16="http://schemas.microsoft.com/office/drawing/2014/main" id="{90F4D50B-C1AF-495A-84C2-4091DFB9D2E7}"/>
+              </a:ext>
+            </a:extLst>
+          </p:cNvPr>
+          <p:cNvCxnSpPr>
+            <a:cxnSpLocks/>
+            <a:endCxn id="41" idx="1"/>
+          </p:cNvCxnSpPr>
+          <p:nvPr/>
+        </p:nvCxnSpPr>
+        <p:spPr>
+          <a:xfrm>
+            <a:off x="1805886" y="2429330"/>
+            <a:ext cx="298166" cy="8352"/>
+          </a:xfrm>
+          <a:prstGeom prst="straightConnector1">
+            <a:avLst/>
+          </a:prstGeom>
+          <a:ln>
+            <a:solidFill>
+              <a:schemeClr val="tx1"/>
+            </a:solidFill>
+            <a:tailEnd type="triangle"/>
+          </a:ln>
+        </p:spPr>
+        <p:style>
+          <a:lnRef idx="1">
+            <a:schemeClr val="accent1"/>
+          </a:lnRef>
+          <a:fillRef idx="0">
+            <a:schemeClr val="accent1"/>
+          </a:fillRef>
+          <a:effectRef idx="0">
+            <a:schemeClr val="accent1"/>
+          </a:effectRef>
+          <a:fontRef idx="minor">
+            <a:schemeClr val="tx1"/>
+          </a:fontRef>
+        </p:style>
+      </p:cxnSp>
+      <p:sp>
+        <p:nvSpPr>
+          <p:cNvPr id="44" name="Rectangle: Rounded Corners 43">
+            <a:extLst>
+              <a:ext uri="{FF2B5EF4-FFF2-40B4-BE49-F238E27FC236}">
+                <a16:creationId xmlns:a16="http://schemas.microsoft.com/office/drawing/2014/main" id="{68923BF8-E49E-4F94-917F-DF1386571ADC}"/>
+              </a:ext>
+            </a:extLst>
+          </p:cNvPr>
+          <p:cNvSpPr/>
+          <p:nvPr/>
+        </p:nvSpPr>
+        <p:spPr>
+          <a:xfrm>
+            <a:off x="3819333" y="1913910"/>
+            <a:ext cx="828000" cy="432000"/>
+          </a:xfrm>
+          <a:prstGeom prst="roundRect">
+            <a:avLst/>
+          </a:prstGeom>
+        </p:spPr>
+        <p:style>
+          <a:lnRef idx="2">
+            <a:schemeClr val="accent1">
+              <a:shade val="50000"/>
+            </a:schemeClr>
+          </a:lnRef>
+          <a:fillRef idx="1">
+            <a:schemeClr val="accent1"/>
+          </a:fillRef>
+          <a:effectRef idx="0">
+            <a:schemeClr val="accent1"/>
+          </a:effectRef>
+          <a:fontRef idx="minor">
+            <a:schemeClr val="lt1"/>
+          </a:fontRef>
+        </p:style>
+        <p:txBody>
+          <a:bodyPr rtlCol="0" anchor="ctr"/>
+          <a:lstStyle/>
+          <a:p>
+            <a:pPr algn="ctr"/>
+            <a:r>
+              <a:rPr lang="en-IN" sz="1200" dirty="0"/>
+              <a:t>Validate Borrower</a:t>
+            </a:r>
+            <a:endParaRPr lang="en-US" sz="1200" dirty="0"/>
+          </a:p>
+        </p:txBody>
+      </p:sp>
+      <p:sp>
+        <p:nvSpPr>
+          <p:cNvPr id="46" name="Oval 45">
+            <a:extLst>
+              <a:ext uri="{FF2B5EF4-FFF2-40B4-BE49-F238E27FC236}">
+                <a16:creationId xmlns:a16="http://schemas.microsoft.com/office/drawing/2014/main" id="{2E9C0472-4CFF-4F2F-A7D1-58434586CCA7}"/>
+              </a:ext>
+            </a:extLst>
+          </p:cNvPr>
+          <p:cNvSpPr/>
+          <p:nvPr/>
+        </p:nvSpPr>
+        <p:spPr>
+          <a:xfrm>
+            <a:off x="2845971" y="2039244"/>
+            <a:ext cx="339047" cy="246580"/>
+          </a:xfrm>
+          <a:prstGeom prst="ellipse">
+            <a:avLst/>
+          </a:prstGeom>
+          <a:solidFill>
+            <a:srgbClr val="FFC000"/>
+          </a:solidFill>
+        </p:spPr>
+        <p:style>
+          <a:lnRef idx="2">
+            <a:schemeClr val="accent1">
+              <a:shade val="50000"/>
+            </a:schemeClr>
+          </a:lnRef>
+          <a:fillRef idx="1">
+            <a:schemeClr val="accent1"/>
+          </a:fillRef>
+          <a:effectRef idx="0">
+            <a:schemeClr val="accent1"/>
+          </a:effectRef>
+          <a:fontRef idx="minor">
+            <a:schemeClr val="lt1"/>
+          </a:fontRef>
+        </p:style>
+        <p:txBody>
+          <a:bodyPr lIns="0" tIns="0" rIns="0" bIns="0" rtlCol="0" anchor="ctr"/>
+          <a:lstStyle/>
+          <a:p>
+            <a:pPr algn="ctr"/>
+            <a:r>
+              <a:rPr lang="en-IN" sz="1200" b="1" dirty="0">
+                <a:solidFill>
+                  <a:schemeClr val="tx1"/>
+                </a:solidFill>
+              </a:rPr>
+              <a:t>e3</a:t>
+            </a:r>
+            <a:endParaRPr lang="en-US" sz="1200" b="1" dirty="0">
+              <a:solidFill>
+                <a:schemeClr val="tx1"/>
+              </a:solidFill>
+            </a:endParaRPr>
+          </a:p>
+        </p:txBody>
+      </p:sp>
+      <p:cxnSp>
+        <p:nvCxnSpPr>
+          <p:cNvPr id="47" name="Straight Arrow Connector 46">
+            <a:extLst>
+              <a:ext uri="{FF2B5EF4-FFF2-40B4-BE49-F238E27FC236}">
+                <a16:creationId xmlns:a16="http://schemas.microsoft.com/office/drawing/2014/main" id="{071FA890-6AC6-495F-91DD-8CC9E726FF14}"/>
+              </a:ext>
+            </a:extLst>
+          </p:cNvPr>
+          <p:cNvCxnSpPr>
+            <a:cxnSpLocks/>
+            <a:endCxn id="44" idx="1"/>
+          </p:cNvCxnSpPr>
+          <p:nvPr/>
+        </p:nvCxnSpPr>
+        <p:spPr>
+          <a:xfrm>
+            <a:off x="3521167" y="2121558"/>
+            <a:ext cx="298166" cy="8352"/>
+          </a:xfrm>
+          <a:prstGeom prst="straightConnector1">
+            <a:avLst/>
+          </a:prstGeom>
+          <a:ln>
+            <a:solidFill>
+              <a:schemeClr val="tx1"/>
+            </a:solidFill>
+            <a:tailEnd type="triangle"/>
+          </a:ln>
+        </p:spPr>
+        <p:style>
+          <a:lnRef idx="1">
+            <a:schemeClr val="accent1"/>
+          </a:lnRef>
+          <a:fillRef idx="0">
+            <a:schemeClr val="accent1"/>
+          </a:fillRef>
+          <a:effectRef idx="0">
+            <a:schemeClr val="accent1"/>
+          </a:effectRef>
+          <a:fontRef idx="minor">
+            <a:schemeClr val="tx1"/>
+          </a:fontRef>
+        </p:style>
+      </p:cxnSp>
+      <p:sp>
+        <p:nvSpPr>
+          <p:cNvPr id="55" name="Oval 54">
+            <a:extLst>
+              <a:ext uri="{FF2B5EF4-FFF2-40B4-BE49-F238E27FC236}">
+                <a16:creationId xmlns:a16="http://schemas.microsoft.com/office/drawing/2014/main" id="{ECFADFFE-66C3-41DF-AEC2-45FCC7520C5F}"/>
+              </a:ext>
+            </a:extLst>
+          </p:cNvPr>
+          <p:cNvSpPr/>
+          <p:nvPr/>
+        </p:nvSpPr>
+        <p:spPr>
+          <a:xfrm>
+            <a:off x="478124" y="2292365"/>
+            <a:ext cx="251302" cy="246580"/>
+          </a:xfrm>
+          <a:prstGeom prst="ellipse">
+            <a:avLst/>
+          </a:prstGeom>
+          <a:solidFill>
+            <a:schemeClr val="bg2">
+              <a:lumMod val="90000"/>
+            </a:schemeClr>
+          </a:solidFill>
+        </p:spPr>
+        <p:style>
+          <a:lnRef idx="2">
+            <a:schemeClr val="accent1">
+              <a:shade val="50000"/>
+            </a:schemeClr>
+          </a:lnRef>
+          <a:fillRef idx="1">
+            <a:schemeClr val="accent1"/>
+          </a:fillRef>
+          <a:effectRef idx="0">
+            <a:schemeClr val="accent1"/>
+          </a:effectRef>
+          <a:fontRef idx="minor">
+            <a:schemeClr val="lt1"/>
+          </a:fontRef>
+        </p:style>
+        <p:txBody>
+          <a:bodyPr lIns="0" tIns="0" rIns="0" bIns="0" rtlCol="0" anchor="ctr"/>
+          <a:lstStyle/>
+          <a:p>
+            <a:pPr algn="ctr"/>
+            <a:endParaRPr lang="en-US" sz="1200" b="1" dirty="0">
+              <a:solidFill>
+                <a:schemeClr val="tx1"/>
+              </a:solidFill>
+            </a:endParaRPr>
+          </a:p>
+        </p:txBody>
+      </p:sp>
+      <p:sp>
+        <p:nvSpPr>
+          <p:cNvPr id="56" name="Rectangle: Rounded Corners 55">
+            <a:extLst>
+              <a:ext uri="{FF2B5EF4-FFF2-40B4-BE49-F238E27FC236}">
+                <a16:creationId xmlns:a16="http://schemas.microsoft.com/office/drawing/2014/main" id="{609BDC6D-1EA6-4BBC-8558-FF2A0D308799}"/>
+              </a:ext>
+            </a:extLst>
+          </p:cNvPr>
+          <p:cNvSpPr/>
+          <p:nvPr/>
+        </p:nvSpPr>
+        <p:spPr>
+          <a:xfrm>
+            <a:off x="3849277" y="2727243"/>
+            <a:ext cx="828000" cy="432000"/>
+          </a:xfrm>
+          <a:prstGeom prst="roundRect">
+            <a:avLst/>
+          </a:prstGeom>
+        </p:spPr>
+        <p:style>
+          <a:lnRef idx="2">
+            <a:schemeClr val="accent1">
+              <a:shade val="50000"/>
+            </a:schemeClr>
+          </a:lnRef>
+          <a:fillRef idx="1">
+            <a:schemeClr val="accent1"/>
+          </a:fillRef>
+          <a:effectRef idx="0">
+            <a:schemeClr val="accent1"/>
+          </a:effectRef>
+          <a:fontRef idx="minor">
+            <a:schemeClr val="lt1"/>
+          </a:fontRef>
+        </p:style>
+        <p:txBody>
+          <a:bodyPr rtlCol="0" anchor="ctr"/>
+          <a:lstStyle/>
+          <a:p>
+            <a:pPr algn="ctr"/>
+            <a:r>
+              <a:rPr lang="en-IN" sz="1200" dirty="0"/>
+              <a:t>Validate Property</a:t>
+            </a:r>
+            <a:endParaRPr lang="en-US" sz="1200" dirty="0"/>
+          </a:p>
+        </p:txBody>
+      </p:sp>
+      <p:cxnSp>
+        <p:nvCxnSpPr>
+          <p:cNvPr id="21" name="Connector: Elbow 20">
+            <a:extLst>
+              <a:ext uri="{FF2B5EF4-FFF2-40B4-BE49-F238E27FC236}">
+                <a16:creationId xmlns:a16="http://schemas.microsoft.com/office/drawing/2014/main" id="{8B29DEBE-0855-4E1E-9B62-E5C04A539D81}"/>
+              </a:ext>
+            </a:extLst>
+          </p:cNvPr>
+          <p:cNvCxnSpPr>
+            <a:cxnSpLocks/>
+            <a:stCxn id="41" idx="3"/>
+            <a:endCxn id="44" idx="1"/>
+          </p:cNvCxnSpPr>
+          <p:nvPr/>
+        </p:nvCxnSpPr>
+        <p:spPr>
+          <a:xfrm flipV="1">
+            <a:off x="2932052" y="2129910"/>
+            <a:ext cx="887281" cy="307772"/>
+          </a:xfrm>
+          <a:prstGeom prst="bentConnector3">
+            <a:avLst/>
+          </a:prstGeom>
+          <a:ln>
+            <a:solidFill>
+              <a:schemeClr val="tx1"/>
+            </a:solidFill>
+            <a:tailEnd type="triangle"/>
+          </a:ln>
+        </p:spPr>
+        <p:style>
+          <a:lnRef idx="1">
+            <a:schemeClr val="accent1"/>
+          </a:lnRef>
+          <a:fillRef idx="0">
+            <a:schemeClr val="accent1"/>
+          </a:fillRef>
+          <a:effectRef idx="0">
+            <a:schemeClr val="accent1"/>
+          </a:effectRef>
+          <a:fontRef idx="minor">
+            <a:schemeClr val="tx1"/>
+          </a:fontRef>
+        </p:style>
+      </p:cxnSp>
+      <p:cxnSp>
+        <p:nvCxnSpPr>
+          <p:cNvPr id="57" name="Connector: Elbow 56">
+            <a:extLst>
+              <a:ext uri="{FF2B5EF4-FFF2-40B4-BE49-F238E27FC236}">
+                <a16:creationId xmlns:a16="http://schemas.microsoft.com/office/drawing/2014/main" id="{429B2738-058B-4325-9B8A-7B1D41356A7E}"/>
+              </a:ext>
+            </a:extLst>
+          </p:cNvPr>
+          <p:cNvCxnSpPr>
+            <a:cxnSpLocks/>
+            <a:stCxn id="41" idx="3"/>
+            <a:endCxn id="56" idx="1"/>
+          </p:cNvCxnSpPr>
+          <p:nvPr/>
+        </p:nvCxnSpPr>
+        <p:spPr>
+          <a:xfrm>
+            <a:off x="2932052" y="2437682"/>
+            <a:ext cx="917225" cy="505561"/>
+          </a:xfrm>
+          <a:prstGeom prst="bentConnector3">
+            <a:avLst/>
+          </a:prstGeom>
+          <a:ln>
+            <a:solidFill>
+              <a:schemeClr val="tx1"/>
+            </a:solidFill>
+            <a:tailEnd type="triangle"/>
+          </a:ln>
+        </p:spPr>
+        <p:style>
+          <a:lnRef idx="1">
+            <a:schemeClr val="accent1"/>
+          </a:lnRef>
+          <a:fillRef idx="0">
+            <a:schemeClr val="accent1"/>
+          </a:fillRef>
+          <a:effectRef idx="0">
+            <a:schemeClr val="accent1"/>
+          </a:effectRef>
+          <a:fontRef idx="minor">
+            <a:schemeClr val="tx1"/>
+          </a:fontRef>
+        </p:style>
+      </p:cxnSp>
+      <p:sp>
+        <p:nvSpPr>
+          <p:cNvPr id="58" name="Rectangle: Rounded Corners 57">
+            <a:extLst>
+              <a:ext uri="{FF2B5EF4-FFF2-40B4-BE49-F238E27FC236}">
+                <a16:creationId xmlns:a16="http://schemas.microsoft.com/office/drawing/2014/main" id="{9D736D1D-DDB9-45B3-ADC5-864E16C7AE3C}"/>
+              </a:ext>
+            </a:extLst>
+          </p:cNvPr>
+          <p:cNvSpPr/>
+          <p:nvPr/>
+        </p:nvSpPr>
+        <p:spPr>
+          <a:xfrm>
+            <a:off x="5312885" y="1603361"/>
+            <a:ext cx="857944" cy="432000"/>
+          </a:xfrm>
+          <a:prstGeom prst="roundRect">
+            <a:avLst/>
+          </a:prstGeom>
+        </p:spPr>
+        <p:style>
+          <a:lnRef idx="2">
+            <a:schemeClr val="accent1">
+              <a:shade val="50000"/>
+            </a:schemeClr>
+          </a:lnRef>
+          <a:fillRef idx="1">
+            <a:schemeClr val="accent1"/>
+          </a:fillRef>
+          <a:effectRef idx="0">
+            <a:schemeClr val="accent1"/>
+          </a:effectRef>
+          <a:fontRef idx="minor">
+            <a:schemeClr val="lt1"/>
+          </a:fontRef>
+        </p:style>
+        <p:txBody>
+          <a:bodyPr rtlCol="0" anchor="ctr"/>
+          <a:lstStyle/>
+          <a:p>
+            <a:pPr algn="ctr"/>
+            <a:r>
+              <a:rPr lang="en-IN" sz="1200" dirty="0"/>
+              <a:t>Employment Check</a:t>
+            </a:r>
+            <a:endParaRPr lang="en-US" sz="1200" dirty="0"/>
+          </a:p>
+        </p:txBody>
+      </p:sp>
+      <p:sp>
+        <p:nvSpPr>
+          <p:cNvPr id="59" name="Oval 58">
+            <a:extLst>
+              <a:ext uri="{FF2B5EF4-FFF2-40B4-BE49-F238E27FC236}">
+                <a16:creationId xmlns:a16="http://schemas.microsoft.com/office/drawing/2014/main" id="{63CB0FA8-2695-4286-B878-0A6A005A28E9}"/>
+              </a:ext>
+            </a:extLst>
+          </p:cNvPr>
+          <p:cNvSpPr/>
+          <p:nvPr/>
+        </p:nvSpPr>
+        <p:spPr>
+          <a:xfrm>
+            <a:off x="4555277" y="1718421"/>
+            <a:ext cx="339047" cy="246580"/>
+          </a:xfrm>
+          <a:prstGeom prst="ellipse">
+            <a:avLst/>
+          </a:prstGeom>
+          <a:solidFill>
+            <a:srgbClr val="FFC000"/>
+          </a:solidFill>
+        </p:spPr>
+        <p:style>
+          <a:lnRef idx="2">
+            <a:schemeClr val="accent1">
+              <a:shade val="50000"/>
+            </a:schemeClr>
+          </a:lnRef>
+          <a:fillRef idx="1">
+            <a:schemeClr val="accent1"/>
+          </a:fillRef>
+          <a:effectRef idx="0">
+            <a:schemeClr val="accent1"/>
+          </a:effectRef>
+          <a:fontRef idx="minor">
+            <a:schemeClr val="lt1"/>
+          </a:fontRef>
+        </p:style>
+        <p:txBody>
+          <a:bodyPr lIns="0" tIns="0" rIns="0" bIns="0" rtlCol="0" anchor="ctr"/>
+          <a:lstStyle/>
+          <a:p>
+            <a:pPr algn="ctr"/>
+            <a:r>
+              <a:rPr lang="en-IN" sz="1200" b="1" dirty="0">
+                <a:solidFill>
+                  <a:schemeClr val="tx1"/>
+                </a:solidFill>
+              </a:rPr>
+              <a:t>e4</a:t>
+            </a:r>
+            <a:endParaRPr lang="en-US" sz="1200" b="1" dirty="0">
+              <a:solidFill>
+                <a:schemeClr val="tx1"/>
+              </a:solidFill>
+            </a:endParaRPr>
+          </a:p>
+        </p:txBody>
+      </p:sp>
+      <p:cxnSp>
+        <p:nvCxnSpPr>
+          <p:cNvPr id="60" name="Straight Arrow Connector 59">
+            <a:extLst>
+              <a:ext uri="{FF2B5EF4-FFF2-40B4-BE49-F238E27FC236}">
+                <a16:creationId xmlns:a16="http://schemas.microsoft.com/office/drawing/2014/main" id="{0CE9B777-5437-4B07-B341-64364FAACA9A}"/>
+              </a:ext>
+            </a:extLst>
+          </p:cNvPr>
+          <p:cNvCxnSpPr>
+            <a:cxnSpLocks/>
+            <a:endCxn id="58" idx="1"/>
+          </p:cNvCxnSpPr>
+          <p:nvPr/>
+        </p:nvCxnSpPr>
+        <p:spPr>
+          <a:xfrm>
+            <a:off x="5014719" y="1811009"/>
+            <a:ext cx="298166" cy="8352"/>
+          </a:xfrm>
+          <a:prstGeom prst="straightConnector1">
+            <a:avLst/>
+          </a:prstGeom>
+          <a:ln>
+            <a:solidFill>
+              <a:schemeClr val="tx1"/>
+            </a:solidFill>
+            <a:tailEnd type="triangle"/>
+          </a:ln>
+        </p:spPr>
+        <p:style>
+          <a:lnRef idx="1">
+            <a:schemeClr val="accent1"/>
+          </a:lnRef>
+          <a:fillRef idx="0">
+            <a:schemeClr val="accent1"/>
+          </a:fillRef>
+          <a:effectRef idx="0">
+            <a:schemeClr val="accent1"/>
+          </a:effectRef>
+          <a:fontRef idx="minor">
+            <a:schemeClr val="tx1"/>
+          </a:fontRef>
+        </p:style>
+      </p:cxnSp>
+      <p:sp>
+        <p:nvSpPr>
+          <p:cNvPr id="61" name="Rectangle: Rounded Corners 60">
+            <a:extLst>
+              <a:ext uri="{FF2B5EF4-FFF2-40B4-BE49-F238E27FC236}">
+                <a16:creationId xmlns:a16="http://schemas.microsoft.com/office/drawing/2014/main" id="{0DDE9FA2-1F27-439F-81F5-3DC980DAD4EA}"/>
+              </a:ext>
+            </a:extLst>
+          </p:cNvPr>
+          <p:cNvSpPr/>
+          <p:nvPr/>
+        </p:nvSpPr>
+        <p:spPr>
+          <a:xfrm>
+            <a:off x="5342829" y="2159844"/>
+            <a:ext cx="828000" cy="432000"/>
+          </a:xfrm>
+          <a:prstGeom prst="roundRect">
+            <a:avLst/>
+          </a:prstGeom>
+        </p:spPr>
+        <p:style>
+          <a:lnRef idx="2">
+            <a:schemeClr val="accent1">
+              <a:shade val="50000"/>
+            </a:schemeClr>
+          </a:lnRef>
+          <a:fillRef idx="1">
+            <a:schemeClr val="accent1"/>
+          </a:fillRef>
+          <a:effectRef idx="0">
+            <a:schemeClr val="accent1"/>
+          </a:effectRef>
+          <a:fontRef idx="minor">
+            <a:schemeClr val="lt1"/>
+          </a:fontRef>
+        </p:style>
+        <p:txBody>
+          <a:bodyPr rtlCol="0" anchor="ctr"/>
+          <a:lstStyle/>
+          <a:p>
+            <a:pPr algn="ctr"/>
+            <a:r>
+              <a:rPr lang="en-IN" sz="1200" dirty="0"/>
+              <a:t>Credit Check</a:t>
+            </a:r>
+            <a:endParaRPr lang="en-US" sz="1200" dirty="0"/>
+          </a:p>
+        </p:txBody>
+      </p:sp>
+      <p:cxnSp>
+        <p:nvCxnSpPr>
+          <p:cNvPr id="62" name="Connector: Elbow 61">
+            <a:extLst>
+              <a:ext uri="{FF2B5EF4-FFF2-40B4-BE49-F238E27FC236}">
+                <a16:creationId xmlns:a16="http://schemas.microsoft.com/office/drawing/2014/main" id="{9A63417E-59A3-483B-83FE-835FF89F1C04}"/>
+              </a:ext>
+            </a:extLst>
+          </p:cNvPr>
+          <p:cNvCxnSpPr>
+            <a:cxnSpLocks/>
+            <a:stCxn id="44" idx="3"/>
+            <a:endCxn id="58" idx="1"/>
+          </p:cNvCxnSpPr>
+          <p:nvPr/>
+        </p:nvCxnSpPr>
+        <p:spPr>
+          <a:xfrm flipV="1">
+            <a:off x="4647333" y="1819361"/>
+            <a:ext cx="665552" cy="310549"/>
+          </a:xfrm>
+          <a:prstGeom prst="bentConnector3">
+            <a:avLst/>
+          </a:prstGeom>
+          <a:ln>
+            <a:solidFill>
+              <a:schemeClr val="tx1"/>
+            </a:solidFill>
+            <a:tailEnd type="triangle"/>
+          </a:ln>
+        </p:spPr>
+        <p:style>
+          <a:lnRef idx="1">
+            <a:schemeClr val="accent1"/>
+          </a:lnRef>
+          <a:fillRef idx="0">
+            <a:schemeClr val="accent1"/>
+          </a:fillRef>
+          <a:effectRef idx="0">
+            <a:schemeClr val="accent1"/>
+          </a:effectRef>
+          <a:fontRef idx="minor">
+            <a:schemeClr val="tx1"/>
+          </a:fontRef>
+        </p:style>
+      </p:cxnSp>
+      <p:cxnSp>
+        <p:nvCxnSpPr>
+          <p:cNvPr id="63" name="Connector: Elbow 62">
+            <a:extLst>
+              <a:ext uri="{FF2B5EF4-FFF2-40B4-BE49-F238E27FC236}">
+                <a16:creationId xmlns:a16="http://schemas.microsoft.com/office/drawing/2014/main" id="{A4D520F6-F352-4571-8FA0-488EDA74DC92}"/>
+              </a:ext>
+            </a:extLst>
+          </p:cNvPr>
+          <p:cNvCxnSpPr>
+            <a:cxnSpLocks/>
+            <a:stCxn id="44" idx="3"/>
+            <a:endCxn id="61" idx="1"/>
+          </p:cNvCxnSpPr>
+          <p:nvPr/>
+        </p:nvCxnSpPr>
+        <p:spPr>
+          <a:xfrm>
+            <a:off x="4647333" y="2129910"/>
+            <a:ext cx="695496" cy="245934"/>
+          </a:xfrm>
+          <a:prstGeom prst="bentConnector3">
+            <a:avLst/>
+          </a:prstGeom>
+          <a:ln>
+            <a:solidFill>
+              <a:schemeClr val="tx1"/>
+            </a:solidFill>
+            <a:tailEnd type="triangle"/>
+          </a:ln>
+        </p:spPr>
+        <p:style>
+          <a:lnRef idx="1">
+            <a:schemeClr val="accent1"/>
+          </a:lnRef>
+          <a:fillRef idx="0">
+            <a:schemeClr val="accent1"/>
+          </a:fillRef>
+          <a:effectRef idx="0">
+            <a:schemeClr val="accent1"/>
+          </a:effectRef>
+          <a:fontRef idx="minor">
+            <a:schemeClr val="tx1"/>
+          </a:fontRef>
+        </p:style>
+      </p:cxnSp>
+      <p:sp>
+        <p:nvSpPr>
+          <p:cNvPr id="64" name="Oval 63">
+            <a:extLst>
+              <a:ext uri="{FF2B5EF4-FFF2-40B4-BE49-F238E27FC236}">
+                <a16:creationId xmlns:a16="http://schemas.microsoft.com/office/drawing/2014/main" id="{93623CB9-146C-40A4-9863-7F2B09ECE53A}"/>
+              </a:ext>
+            </a:extLst>
+          </p:cNvPr>
+          <p:cNvSpPr/>
+          <p:nvPr/>
+        </p:nvSpPr>
+        <p:spPr>
+          <a:xfrm>
+            <a:off x="4553919" y="2271032"/>
+            <a:ext cx="339047" cy="246580"/>
+          </a:xfrm>
+          <a:prstGeom prst="ellipse">
+            <a:avLst/>
+          </a:prstGeom>
+          <a:solidFill>
+            <a:srgbClr val="FFC000"/>
+          </a:solidFill>
+        </p:spPr>
+        <p:style>
+          <a:lnRef idx="2">
+            <a:schemeClr val="accent1">
+              <a:shade val="50000"/>
+            </a:schemeClr>
+          </a:lnRef>
+          <a:fillRef idx="1">
+            <a:schemeClr val="accent1"/>
+          </a:fillRef>
+          <a:effectRef idx="0">
+            <a:schemeClr val="accent1"/>
+          </a:effectRef>
+          <a:fontRef idx="minor">
+            <a:schemeClr val="lt1"/>
+          </a:fontRef>
+        </p:style>
+        <p:txBody>
+          <a:bodyPr lIns="0" tIns="0" rIns="0" bIns="0" rtlCol="0" anchor="ctr"/>
+          <a:lstStyle/>
+          <a:p>
+            <a:pPr algn="ctr"/>
+            <a:r>
+              <a:rPr lang="en-IN" sz="1200" b="1" dirty="0">
+                <a:solidFill>
+                  <a:schemeClr val="tx1"/>
+                </a:solidFill>
+              </a:rPr>
+              <a:t>e5</a:t>
+            </a:r>
+            <a:endParaRPr lang="en-US" sz="1200" b="1" dirty="0">
+              <a:solidFill>
+                <a:schemeClr val="tx1"/>
+              </a:solidFill>
+            </a:endParaRPr>
+          </a:p>
+        </p:txBody>
+      </p:sp>
+      <p:sp>
+        <p:nvSpPr>
+          <p:cNvPr id="65" name="Rectangle: Rounded Corners 64">
+            <a:extLst>
+              <a:ext uri="{FF2B5EF4-FFF2-40B4-BE49-F238E27FC236}">
+                <a16:creationId xmlns:a16="http://schemas.microsoft.com/office/drawing/2014/main" id="{96CCFCE7-40C9-4285-9E43-C3F258C8467F}"/>
+              </a:ext>
+            </a:extLst>
+          </p:cNvPr>
+          <p:cNvSpPr/>
+          <p:nvPr/>
+        </p:nvSpPr>
+        <p:spPr>
+          <a:xfrm>
+            <a:off x="6615440" y="2223295"/>
+            <a:ext cx="910414" cy="432000"/>
+          </a:xfrm>
+          <a:prstGeom prst="roundRect">
+            <a:avLst/>
+          </a:prstGeom>
+        </p:spPr>
+        <p:style>
+          <a:lnRef idx="2">
+            <a:schemeClr val="accent1">
+              <a:shade val="50000"/>
+            </a:schemeClr>
+          </a:lnRef>
+          <a:fillRef idx="1">
+            <a:schemeClr val="accent1"/>
+          </a:fillRef>
+          <a:effectRef idx="0">
+            <a:schemeClr val="accent1"/>
+          </a:effectRef>
+          <a:fontRef idx="minor">
+            <a:schemeClr val="lt1"/>
+          </a:fontRef>
+        </p:style>
+        <p:txBody>
+          <a:bodyPr rtlCol="0" anchor="ctr"/>
+          <a:lstStyle/>
+          <a:p>
+            <a:pPr algn="ctr"/>
+            <a:r>
+              <a:rPr lang="en-IN" sz="1200" dirty="0"/>
+              <a:t>All Checks Done</a:t>
+            </a:r>
+            <a:endParaRPr lang="en-US" sz="1200" dirty="0"/>
+          </a:p>
+        </p:txBody>
+      </p:sp>
+      <p:cxnSp>
+        <p:nvCxnSpPr>
+          <p:cNvPr id="25" name="Connector: Elbow 24">
+            <a:extLst>
+              <a:ext uri="{FF2B5EF4-FFF2-40B4-BE49-F238E27FC236}">
+                <a16:creationId xmlns:a16="http://schemas.microsoft.com/office/drawing/2014/main" id="{823B24B3-D922-476A-AC2E-026AB7D6339E}"/>
+              </a:ext>
+            </a:extLst>
+          </p:cNvPr>
+          <p:cNvCxnSpPr>
+            <a:cxnSpLocks/>
+            <a:stCxn id="56" idx="3"/>
+            <a:endCxn id="65" idx="1"/>
+          </p:cNvCxnSpPr>
+          <p:nvPr/>
+        </p:nvCxnSpPr>
+        <p:spPr>
+          <a:xfrm flipV="1">
+            <a:off x="4677277" y="2439295"/>
+            <a:ext cx="1938163" cy="503948"/>
+          </a:xfrm>
+          <a:prstGeom prst="bentConnector3">
+            <a:avLst>
+              <a:gd name="adj1" fmla="val 87637"/>
+            </a:avLst>
+          </a:prstGeom>
+          <a:ln>
+            <a:solidFill>
+              <a:schemeClr val="tx1"/>
+            </a:solidFill>
+            <a:tailEnd type="triangle"/>
+          </a:ln>
+        </p:spPr>
+        <p:style>
+          <a:lnRef idx="1">
+            <a:schemeClr val="accent1"/>
+          </a:lnRef>
+          <a:fillRef idx="0">
+            <a:schemeClr val="accent1"/>
+          </a:fillRef>
+          <a:effectRef idx="0">
+            <a:schemeClr val="accent1"/>
+          </a:effectRef>
+          <a:fontRef idx="minor">
+            <a:schemeClr val="tx1"/>
+          </a:fontRef>
+        </p:style>
+      </p:cxnSp>
+      <p:cxnSp>
+        <p:nvCxnSpPr>
+          <p:cNvPr id="66" name="Connector: Elbow 65">
+            <a:extLst>
+              <a:ext uri="{FF2B5EF4-FFF2-40B4-BE49-F238E27FC236}">
+                <a16:creationId xmlns:a16="http://schemas.microsoft.com/office/drawing/2014/main" id="{417D9594-9F4B-4EA1-8282-E5D0AF4E0974}"/>
+              </a:ext>
+            </a:extLst>
+          </p:cNvPr>
+          <p:cNvCxnSpPr>
+            <a:cxnSpLocks/>
+            <a:stCxn id="61" idx="3"/>
+            <a:endCxn id="65" idx="1"/>
+          </p:cNvCxnSpPr>
+          <p:nvPr/>
+        </p:nvCxnSpPr>
+        <p:spPr>
+          <a:xfrm>
+            <a:off x="6170829" y="2375844"/>
+            <a:ext cx="444611" cy="63451"/>
+          </a:xfrm>
+          <a:prstGeom prst="bentConnector3">
+            <a:avLst/>
+          </a:prstGeom>
+          <a:ln>
+            <a:solidFill>
+              <a:schemeClr val="tx1"/>
+            </a:solidFill>
+            <a:tailEnd type="triangle"/>
+          </a:ln>
+        </p:spPr>
+        <p:style>
+          <a:lnRef idx="1">
+            <a:schemeClr val="accent1"/>
+          </a:lnRef>
+          <a:fillRef idx="0">
+            <a:schemeClr val="accent1"/>
+          </a:fillRef>
+          <a:effectRef idx="0">
+            <a:schemeClr val="accent1"/>
+          </a:effectRef>
+          <a:fontRef idx="minor">
+            <a:schemeClr val="tx1"/>
+          </a:fontRef>
+        </p:style>
+      </p:cxnSp>
+      <p:cxnSp>
+        <p:nvCxnSpPr>
+          <p:cNvPr id="68" name="Connector: Elbow 67">
+            <a:extLst>
+              <a:ext uri="{FF2B5EF4-FFF2-40B4-BE49-F238E27FC236}">
+                <a16:creationId xmlns:a16="http://schemas.microsoft.com/office/drawing/2014/main" id="{DF577F2B-355E-490D-8BD6-FABED7938988}"/>
+              </a:ext>
+            </a:extLst>
+          </p:cNvPr>
+          <p:cNvCxnSpPr>
+            <a:cxnSpLocks/>
+            <a:stCxn id="58" idx="3"/>
+            <a:endCxn id="65" idx="1"/>
+          </p:cNvCxnSpPr>
+          <p:nvPr/>
+        </p:nvCxnSpPr>
+        <p:spPr>
+          <a:xfrm>
+            <a:off x="6170829" y="1819361"/>
+            <a:ext cx="444611" cy="619934"/>
+          </a:xfrm>
+          <a:prstGeom prst="bentConnector3">
+            <a:avLst/>
+          </a:prstGeom>
+          <a:ln>
+            <a:solidFill>
+              <a:schemeClr val="tx1"/>
+            </a:solidFill>
+            <a:tailEnd type="triangle"/>
+          </a:ln>
+        </p:spPr>
+        <p:style>
+          <a:lnRef idx="1">
+            <a:schemeClr val="accent1"/>
+          </a:lnRef>
+          <a:fillRef idx="0">
+            <a:schemeClr val="accent1"/>
+          </a:fillRef>
+          <a:effectRef idx="0">
+            <a:schemeClr val="accent1"/>
+          </a:effectRef>
+          <a:fontRef idx="minor">
+            <a:schemeClr val="tx1"/>
+          </a:fontRef>
+        </p:style>
+      </p:cxnSp>
+      <p:sp>
+        <p:nvSpPr>
+          <p:cNvPr id="71" name="Oval 70">
+            <a:extLst>
+              <a:ext uri="{FF2B5EF4-FFF2-40B4-BE49-F238E27FC236}">
+                <a16:creationId xmlns:a16="http://schemas.microsoft.com/office/drawing/2014/main" id="{FF742F7C-2207-40F0-BB6D-B31BBC35F850}"/>
+              </a:ext>
+            </a:extLst>
+          </p:cNvPr>
+          <p:cNvSpPr/>
+          <p:nvPr/>
+        </p:nvSpPr>
+        <p:spPr>
+          <a:xfrm>
+            <a:off x="4593305" y="3101526"/>
+            <a:ext cx="339047" cy="246580"/>
+          </a:xfrm>
+          <a:prstGeom prst="ellipse">
+            <a:avLst/>
+          </a:prstGeom>
+          <a:solidFill>
+            <a:srgbClr val="FFC000"/>
+          </a:solidFill>
+        </p:spPr>
+        <p:style>
+          <a:lnRef idx="2">
+            <a:schemeClr val="accent1">
+              <a:shade val="50000"/>
+            </a:schemeClr>
+          </a:lnRef>
+          <a:fillRef idx="1">
+            <a:schemeClr val="accent1"/>
+          </a:fillRef>
+          <a:effectRef idx="0">
+            <a:schemeClr val="accent1"/>
+          </a:effectRef>
+          <a:fontRef idx="minor">
+            <a:schemeClr val="lt1"/>
+          </a:fontRef>
+        </p:style>
+        <p:txBody>
+          <a:bodyPr lIns="0" tIns="0" rIns="0" bIns="0" rtlCol="0" anchor="ctr"/>
+          <a:lstStyle/>
+          <a:p>
+            <a:pPr algn="ctr"/>
+            <a:r>
+              <a:rPr lang="en-IN" sz="1200" b="1" dirty="0">
+                <a:solidFill>
+                  <a:schemeClr val="tx1"/>
+                </a:solidFill>
+              </a:rPr>
+              <a:t>e6</a:t>
+            </a:r>
+            <a:endParaRPr lang="en-US" sz="1200" b="1" dirty="0">
+              <a:solidFill>
+                <a:schemeClr val="tx1"/>
+              </a:solidFill>
+            </a:endParaRPr>
+          </a:p>
+        </p:txBody>
+      </p:sp>
+      <p:sp>
+        <p:nvSpPr>
+          <p:cNvPr id="72" name="Rectangle: Rounded Corners 71">
+            <a:extLst>
+              <a:ext uri="{FF2B5EF4-FFF2-40B4-BE49-F238E27FC236}">
+                <a16:creationId xmlns:a16="http://schemas.microsoft.com/office/drawing/2014/main" id="{E87FCA41-1DE0-4696-A3A5-56E053A5CD6E}"/>
+              </a:ext>
+            </a:extLst>
+          </p:cNvPr>
+          <p:cNvSpPr/>
+          <p:nvPr/>
+        </p:nvSpPr>
+        <p:spPr>
+          <a:xfrm>
+            <a:off x="8990311" y="2203963"/>
+            <a:ext cx="828000" cy="432000"/>
+          </a:xfrm>
+          <a:prstGeom prst="roundRect">
+            <a:avLst/>
+          </a:prstGeom>
+        </p:spPr>
+        <p:style>
+          <a:lnRef idx="2">
+            <a:schemeClr val="accent1">
+              <a:shade val="50000"/>
+            </a:schemeClr>
+          </a:lnRef>
+          <a:fillRef idx="1">
+            <a:schemeClr val="accent1"/>
+          </a:fillRef>
+          <a:effectRef idx="0">
+            <a:schemeClr val="accent1"/>
+          </a:effectRef>
+          <a:fontRef idx="minor">
+            <a:schemeClr val="lt1"/>
+          </a:fontRef>
+        </p:style>
+        <p:txBody>
+          <a:bodyPr rtlCol="0" anchor="ctr"/>
+          <a:lstStyle/>
+          <a:p>
+            <a:pPr algn="ctr"/>
+            <a:r>
+              <a:rPr lang="en-IN" sz="1200" dirty="0"/>
+              <a:t>Review Result</a:t>
+            </a:r>
+            <a:endParaRPr lang="en-US" sz="1200" dirty="0"/>
+          </a:p>
+        </p:txBody>
+      </p:sp>
+      <p:sp>
+        <p:nvSpPr>
+          <p:cNvPr id="73" name="Oval 72">
+            <a:extLst>
+              <a:ext uri="{FF2B5EF4-FFF2-40B4-BE49-F238E27FC236}">
+                <a16:creationId xmlns:a16="http://schemas.microsoft.com/office/drawing/2014/main" id="{0413E8CD-CD18-4958-931B-EB4BAFB84050}"/>
+              </a:ext>
+            </a:extLst>
+          </p:cNvPr>
+          <p:cNvSpPr/>
+          <p:nvPr/>
+        </p:nvSpPr>
+        <p:spPr>
+          <a:xfrm>
+            <a:off x="8535245" y="1980096"/>
+            <a:ext cx="339047" cy="246580"/>
+          </a:xfrm>
+          <a:prstGeom prst="ellipse">
+            <a:avLst/>
+          </a:prstGeom>
+          <a:solidFill>
+            <a:srgbClr val="FFC000"/>
+          </a:solidFill>
+        </p:spPr>
+        <p:style>
+          <a:lnRef idx="2">
+            <a:schemeClr val="accent1">
+              <a:shade val="50000"/>
+            </a:schemeClr>
+          </a:lnRef>
+          <a:fillRef idx="1">
+            <a:schemeClr val="accent1"/>
+          </a:fillRef>
+          <a:effectRef idx="0">
+            <a:schemeClr val="accent1"/>
+          </a:effectRef>
+          <a:fontRef idx="minor">
+            <a:schemeClr val="lt1"/>
+          </a:fontRef>
+        </p:style>
+        <p:txBody>
+          <a:bodyPr lIns="0" tIns="0" rIns="0" bIns="0" rtlCol="0" anchor="ctr"/>
+          <a:lstStyle/>
+          <a:p>
+            <a:pPr algn="ctr"/>
+            <a:r>
+              <a:rPr lang="en-IN" sz="1200" b="1" dirty="0">
+                <a:solidFill>
+                  <a:schemeClr val="tx1"/>
+                </a:solidFill>
+              </a:rPr>
+              <a:t>e7</a:t>
+            </a:r>
+            <a:endParaRPr lang="en-US" sz="1200" b="1" dirty="0">
+              <a:solidFill>
+                <a:schemeClr val="tx1"/>
+              </a:solidFill>
+            </a:endParaRPr>
+          </a:p>
+        </p:txBody>
+      </p:sp>
+      <p:cxnSp>
+        <p:nvCxnSpPr>
+          <p:cNvPr id="74" name="Straight Arrow Connector 73">
+            <a:extLst>
+              <a:ext uri="{FF2B5EF4-FFF2-40B4-BE49-F238E27FC236}">
+                <a16:creationId xmlns:a16="http://schemas.microsoft.com/office/drawing/2014/main" id="{3967E24C-DF00-448E-B5D8-0684282136E0}"/>
+              </a:ext>
+            </a:extLst>
+          </p:cNvPr>
+          <p:cNvCxnSpPr>
+            <a:cxnSpLocks/>
+            <a:endCxn id="72" idx="1"/>
+          </p:cNvCxnSpPr>
+          <p:nvPr/>
+        </p:nvCxnSpPr>
+        <p:spPr>
+          <a:xfrm>
+            <a:off x="8692145" y="2411611"/>
+            <a:ext cx="298166" cy="8352"/>
+          </a:xfrm>
+          <a:prstGeom prst="straightConnector1">
+            <a:avLst/>
+          </a:prstGeom>
+          <a:ln>
+            <a:solidFill>
+              <a:schemeClr val="tx1"/>
+            </a:solidFill>
+            <a:tailEnd type="triangle"/>
+          </a:ln>
+        </p:spPr>
+        <p:style>
+          <a:lnRef idx="1">
+            <a:schemeClr val="accent1"/>
+          </a:lnRef>
+          <a:fillRef idx="0">
+            <a:schemeClr val="accent1"/>
+          </a:fillRef>
+          <a:effectRef idx="0">
+            <a:schemeClr val="accent1"/>
+          </a:effectRef>
+          <a:fontRef idx="minor">
+            <a:schemeClr val="tx1"/>
+          </a:fontRef>
+        </p:style>
+      </p:cxnSp>
+      <p:sp>
+        <p:nvSpPr>
+          <p:cNvPr id="75" name="Rectangle: Rounded Corners 74">
+            <a:extLst>
+              <a:ext uri="{FF2B5EF4-FFF2-40B4-BE49-F238E27FC236}">
+                <a16:creationId xmlns:a16="http://schemas.microsoft.com/office/drawing/2014/main" id="{68A9DCED-73D1-443D-86A5-019A719705DD}"/>
+              </a:ext>
+            </a:extLst>
+          </p:cNvPr>
+          <p:cNvSpPr/>
+          <p:nvPr/>
+        </p:nvSpPr>
+        <p:spPr>
+          <a:xfrm>
+            <a:off x="10140595" y="2193238"/>
+            <a:ext cx="828000" cy="432000"/>
+          </a:xfrm>
+          <a:prstGeom prst="roundRect">
+            <a:avLst/>
+          </a:prstGeom>
+        </p:spPr>
+        <p:style>
+          <a:lnRef idx="2">
+            <a:schemeClr val="accent1">
+              <a:shade val="50000"/>
+            </a:schemeClr>
+          </a:lnRef>
+          <a:fillRef idx="1">
+            <a:schemeClr val="accent1"/>
+          </a:fillRef>
+          <a:effectRef idx="0">
+            <a:schemeClr val="accent1"/>
+          </a:effectRef>
+          <a:fontRef idx="minor">
+            <a:schemeClr val="lt1"/>
+          </a:fontRef>
+        </p:style>
+        <p:txBody>
+          <a:bodyPr rtlCol="0" anchor="ctr"/>
+          <a:lstStyle/>
+          <a:p>
+            <a:pPr algn="ctr"/>
+            <a:r>
+              <a:rPr lang="en-US" sz="1200" dirty="0"/>
+              <a:t>Notify Customer</a:t>
+            </a:r>
+          </a:p>
+        </p:txBody>
+      </p:sp>
+      <p:sp>
+        <p:nvSpPr>
+          <p:cNvPr id="76" name="Oval 75">
+            <a:extLst>
+              <a:ext uri="{FF2B5EF4-FFF2-40B4-BE49-F238E27FC236}">
+                <a16:creationId xmlns:a16="http://schemas.microsoft.com/office/drawing/2014/main" id="{89AF929D-80B1-4A56-9A83-01D4D549BBB4}"/>
+              </a:ext>
+            </a:extLst>
+          </p:cNvPr>
+          <p:cNvSpPr/>
+          <p:nvPr/>
+        </p:nvSpPr>
+        <p:spPr>
+          <a:xfrm>
+            <a:off x="9685529" y="1969371"/>
+            <a:ext cx="339047" cy="246580"/>
+          </a:xfrm>
+          <a:prstGeom prst="ellipse">
+            <a:avLst/>
+          </a:prstGeom>
+          <a:solidFill>
+            <a:srgbClr val="FFC000"/>
+          </a:solidFill>
+        </p:spPr>
+        <p:style>
+          <a:lnRef idx="2">
+            <a:schemeClr val="accent1">
+              <a:shade val="50000"/>
+            </a:schemeClr>
+          </a:lnRef>
+          <a:fillRef idx="1">
+            <a:schemeClr val="accent1"/>
+          </a:fillRef>
+          <a:effectRef idx="0">
+            <a:schemeClr val="accent1"/>
+          </a:effectRef>
+          <a:fontRef idx="minor">
+            <a:schemeClr val="lt1"/>
+          </a:fontRef>
+        </p:style>
+        <p:txBody>
+          <a:bodyPr lIns="0" tIns="0" rIns="0" bIns="0" rtlCol="0" anchor="ctr"/>
+          <a:lstStyle/>
+          <a:p>
+            <a:pPr algn="ctr"/>
+            <a:r>
+              <a:rPr lang="en-IN" sz="1200" b="1" dirty="0">
+                <a:solidFill>
+                  <a:schemeClr val="tx1"/>
+                </a:solidFill>
+              </a:rPr>
+              <a:t>e8</a:t>
+            </a:r>
+            <a:endParaRPr lang="en-US" sz="1200" b="1" dirty="0">
+              <a:solidFill>
+                <a:schemeClr val="tx1"/>
+              </a:solidFill>
+            </a:endParaRPr>
+          </a:p>
+        </p:txBody>
+      </p:sp>
+      <p:cxnSp>
+        <p:nvCxnSpPr>
+          <p:cNvPr id="77" name="Straight Arrow Connector 76">
+            <a:extLst>
+              <a:ext uri="{FF2B5EF4-FFF2-40B4-BE49-F238E27FC236}">
+                <a16:creationId xmlns:a16="http://schemas.microsoft.com/office/drawing/2014/main" id="{F53DD779-A89B-485A-A6FD-37F3D9CC1464}"/>
+              </a:ext>
+            </a:extLst>
+          </p:cNvPr>
+          <p:cNvCxnSpPr>
+            <a:cxnSpLocks/>
+            <a:endCxn id="75" idx="1"/>
+          </p:cNvCxnSpPr>
+          <p:nvPr/>
+        </p:nvCxnSpPr>
+        <p:spPr>
+          <a:xfrm>
+            <a:off x="9842429" y="2400886"/>
+            <a:ext cx="298166" cy="8352"/>
+          </a:xfrm>
+          <a:prstGeom prst="straightConnector1">
+            <a:avLst/>
+          </a:prstGeom>
+          <a:ln>
+            <a:solidFill>
+              <a:schemeClr val="tx1"/>
+            </a:solidFill>
+            <a:tailEnd type="triangle"/>
+          </a:ln>
+        </p:spPr>
+        <p:style>
+          <a:lnRef idx="1">
+            <a:schemeClr val="accent1"/>
+          </a:lnRef>
+          <a:fillRef idx="0">
+            <a:schemeClr val="accent1"/>
+          </a:fillRef>
+          <a:effectRef idx="0">
+            <a:schemeClr val="accent1"/>
+          </a:effectRef>
+          <a:fontRef idx="minor">
+            <a:schemeClr val="tx1"/>
+          </a:fontRef>
+        </p:style>
+      </p:cxnSp>
+      <p:sp>
+        <p:nvSpPr>
+          <p:cNvPr id="78" name="Oval 77">
+            <a:extLst>
+              <a:ext uri="{FF2B5EF4-FFF2-40B4-BE49-F238E27FC236}">
+                <a16:creationId xmlns:a16="http://schemas.microsoft.com/office/drawing/2014/main" id="{9AADD200-4A0E-4612-B019-88C0614B47E8}"/>
+              </a:ext>
+            </a:extLst>
+          </p:cNvPr>
+          <p:cNvSpPr/>
+          <p:nvPr/>
+        </p:nvSpPr>
+        <p:spPr>
+          <a:xfrm>
+            <a:off x="10854460" y="2018657"/>
+            <a:ext cx="339047" cy="246580"/>
+          </a:xfrm>
+          <a:prstGeom prst="ellipse">
+            <a:avLst/>
+          </a:prstGeom>
+          <a:solidFill>
+            <a:srgbClr val="FFC000"/>
+          </a:solidFill>
+        </p:spPr>
+        <p:style>
+          <a:lnRef idx="2">
+            <a:schemeClr val="accent1">
+              <a:shade val="50000"/>
+            </a:schemeClr>
+          </a:lnRef>
+          <a:fillRef idx="1">
+            <a:schemeClr val="accent1"/>
+          </a:fillRef>
+          <a:effectRef idx="0">
+            <a:schemeClr val="accent1"/>
+          </a:effectRef>
+          <a:fontRef idx="minor">
+            <a:schemeClr val="lt1"/>
+          </a:fontRef>
+        </p:style>
+        <p:txBody>
+          <a:bodyPr lIns="0" tIns="0" rIns="0" bIns="0" rtlCol="0" anchor="ctr"/>
+          <a:lstStyle/>
+          <a:p>
+            <a:pPr algn="ctr"/>
+            <a:r>
+              <a:rPr lang="en-IN" sz="1200" b="1" dirty="0">
+                <a:solidFill>
+                  <a:schemeClr val="tx1"/>
+                </a:solidFill>
+              </a:rPr>
+              <a:t>e9</a:t>
+            </a:r>
+            <a:endParaRPr lang="en-US" sz="1200" b="1" dirty="0">
+              <a:solidFill>
+                <a:schemeClr val="tx1"/>
+              </a:solidFill>
+            </a:endParaRPr>
+          </a:p>
+        </p:txBody>
+      </p:sp>
+      <p:grpSp>
+        <p:nvGrpSpPr>
+          <p:cNvPr id="81" name="Group 80">
+            <a:extLst>
+              <a:ext uri="{FF2B5EF4-FFF2-40B4-BE49-F238E27FC236}">
+                <a16:creationId xmlns:a16="http://schemas.microsoft.com/office/drawing/2014/main" id="{33B458CA-562A-4DF8-A3C9-5E95CDCC4D1A}"/>
+              </a:ext>
+            </a:extLst>
+          </p:cNvPr>
+          <p:cNvGrpSpPr/>
+          <p:nvPr/>
+        </p:nvGrpSpPr>
+        <p:grpSpPr>
+          <a:xfrm>
+            <a:off x="11374840" y="2286155"/>
+            <a:ext cx="251302" cy="246580"/>
+            <a:chOff x="1253423" y="2902353"/>
+            <a:chExt cx="251302" cy="246580"/>
+          </a:xfrm>
+        </p:grpSpPr>
+        <p:sp>
+          <p:nvSpPr>
+            <p:cNvPr id="79" name="Oval 78">
+              <a:extLst>
+                <a:ext uri="{FF2B5EF4-FFF2-40B4-BE49-F238E27FC236}">
+                  <a16:creationId xmlns:a16="http://schemas.microsoft.com/office/drawing/2014/main" id="{1B82B3C6-E99A-449F-A090-A7B348C37048}"/>
+                </a:ext>
+              </a:extLst>
+            </p:cNvPr>
+            <p:cNvSpPr/>
+            <p:nvPr/>
+          </p:nvSpPr>
+          <p:spPr>
+            <a:xfrm>
+              <a:off x="1253423" y="2902353"/>
+              <a:ext cx="251302" cy="246580"/>
+            </a:xfrm>
+            <a:prstGeom prst="ellipse">
+              <a:avLst/>
+            </a:prstGeom>
+            <a:solidFill>
+              <a:schemeClr val="bg2">
+                <a:lumMod val="90000"/>
+              </a:schemeClr>
+            </a:solidFill>
+          </p:spPr>
+          <p:style>
+            <a:lnRef idx="2">
+              <a:schemeClr val="accent1">
+                <a:shade val="50000"/>
+              </a:schemeClr>
+            </a:lnRef>
+            <a:fillRef idx="1">
+              <a:schemeClr val="accent1"/>
+            </a:fillRef>
+            <a:effectRef idx="0">
+              <a:schemeClr val="accent1"/>
+            </a:effectRef>
+            <a:fontRef idx="minor">
+              <a:schemeClr val="lt1"/>
+            </a:fontRef>
+          </p:style>
+          <p:txBody>
+            <a:bodyPr lIns="0" tIns="0" rIns="0" bIns="0" rtlCol="0" anchor="ctr"/>
+            <a:lstStyle/>
+            <a:p>
+              <a:pPr algn="ctr"/>
+              <a:endParaRPr lang="en-US" sz="1200" b="1" dirty="0">
+                <a:solidFill>
+                  <a:schemeClr val="tx1"/>
+                </a:solidFill>
+              </a:endParaRPr>
+            </a:p>
+          </p:txBody>
+        </p:sp>
+        <p:sp>
+          <p:nvSpPr>
+            <p:cNvPr id="80" name="Oval 79">
+              <a:extLst>
+                <a:ext uri="{FF2B5EF4-FFF2-40B4-BE49-F238E27FC236}">
+                  <a16:creationId xmlns:a16="http://schemas.microsoft.com/office/drawing/2014/main" id="{058017AE-93BD-4625-A451-B9F1E31E9605}"/>
+                </a:ext>
+              </a:extLst>
+            </p:cNvPr>
+            <p:cNvSpPr/>
+            <p:nvPr/>
+          </p:nvSpPr>
+          <p:spPr>
+            <a:xfrm>
+              <a:off x="1297048" y="2937227"/>
+              <a:ext cx="151609" cy="142456"/>
+            </a:xfrm>
+            <a:prstGeom prst="ellipse">
+              <a:avLst/>
+            </a:prstGeom>
+            <a:solidFill>
+              <a:schemeClr val="bg1"/>
+            </a:solidFill>
+          </p:spPr>
+          <p:style>
+            <a:lnRef idx="2">
+              <a:schemeClr val="accent1">
+                <a:shade val="50000"/>
+              </a:schemeClr>
+            </a:lnRef>
+            <a:fillRef idx="1">
+              <a:schemeClr val="accent1"/>
+            </a:fillRef>
+            <a:effectRef idx="0">
+              <a:schemeClr val="accent1"/>
+            </a:effectRef>
+            <a:fontRef idx="minor">
+              <a:schemeClr val="lt1"/>
+            </a:fontRef>
+          </p:style>
+          <p:txBody>
+            <a:bodyPr lIns="0" tIns="0" rIns="0" bIns="0" rtlCol="0" anchor="ctr"/>
+            <a:lstStyle/>
+            <a:p>
+              <a:pPr algn="ctr"/>
+              <a:endParaRPr lang="en-US" sz="1200" b="1" dirty="0">
+                <a:solidFill>
+                  <a:schemeClr val="tx1"/>
+                </a:solidFill>
+              </a:endParaRPr>
+            </a:p>
+          </p:txBody>
+        </p:sp>
+      </p:grpSp>
+      <p:cxnSp>
+        <p:nvCxnSpPr>
+          <p:cNvPr id="82" name="Straight Arrow Connector 81">
+            <a:extLst>
+              <a:ext uri="{FF2B5EF4-FFF2-40B4-BE49-F238E27FC236}">
+                <a16:creationId xmlns:a16="http://schemas.microsoft.com/office/drawing/2014/main" id="{7D26C70A-5A9F-4B53-8497-C06DDE153981}"/>
+              </a:ext>
+            </a:extLst>
+          </p:cNvPr>
+          <p:cNvCxnSpPr>
+            <a:cxnSpLocks/>
+            <a:stCxn id="75" idx="3"/>
+            <a:endCxn id="79" idx="2"/>
+          </p:cNvCxnSpPr>
+          <p:nvPr/>
+        </p:nvCxnSpPr>
+        <p:spPr>
+          <a:xfrm>
+            <a:off x="10968595" y="2409238"/>
+            <a:ext cx="406245" cy="207"/>
+          </a:xfrm>
+          <a:prstGeom prst="straightConnector1">
+            <a:avLst/>
+          </a:prstGeom>
+          <a:ln>
+            <a:solidFill>
+              <a:schemeClr val="tx1"/>
+            </a:solidFill>
+            <a:tailEnd type="triangle"/>
+          </a:ln>
+        </p:spPr>
+        <p:style>
+          <a:lnRef idx="1">
+            <a:schemeClr val="accent1"/>
+          </a:lnRef>
+          <a:fillRef idx="0">
+            <a:schemeClr val="accent1"/>
+          </a:fillRef>
+          <a:effectRef idx="0">
+            <a:schemeClr val="accent1"/>
+          </a:effectRef>
+          <a:fontRef idx="minor">
+            <a:schemeClr val="tx1"/>
+          </a:fontRef>
+        </p:style>
+      </p:cxnSp>
+      <p:sp>
+        <p:nvSpPr>
+          <p:cNvPr id="100" name="Rectangle: Rounded Corners 99">
+            <a:extLst>
+              <a:ext uri="{FF2B5EF4-FFF2-40B4-BE49-F238E27FC236}">
+                <a16:creationId xmlns:a16="http://schemas.microsoft.com/office/drawing/2014/main" id="{A14C9AD4-B59F-45EA-98AF-E15FB3434413}"/>
+              </a:ext>
+            </a:extLst>
+          </p:cNvPr>
+          <p:cNvSpPr/>
+          <p:nvPr/>
+        </p:nvSpPr>
+        <p:spPr>
+          <a:xfrm>
+            <a:off x="7776406" y="2221682"/>
+            <a:ext cx="910414" cy="432000"/>
+          </a:xfrm>
+          <a:prstGeom prst="roundRect">
+            <a:avLst/>
+          </a:prstGeom>
+        </p:spPr>
+        <p:style>
+          <a:lnRef idx="2">
+            <a:schemeClr val="accent1">
+              <a:shade val="50000"/>
+            </a:schemeClr>
+          </a:lnRef>
+          <a:fillRef idx="1">
+            <a:schemeClr val="accent1"/>
+          </a:fillRef>
+          <a:effectRef idx="0">
+            <a:schemeClr val="accent1"/>
+          </a:effectRef>
+          <a:fontRef idx="minor">
+            <a:schemeClr val="lt1"/>
+          </a:fontRef>
+        </p:style>
+        <p:txBody>
+          <a:bodyPr rtlCol="0" anchor="ctr"/>
+          <a:lstStyle/>
+          <a:p>
+            <a:pPr algn="ctr"/>
+            <a:r>
+              <a:rPr lang="en-IN" sz="1200" dirty="0"/>
+              <a:t>Automatic Decision</a:t>
+            </a:r>
+            <a:endParaRPr lang="en-US" sz="1200" dirty="0"/>
+          </a:p>
+        </p:txBody>
+      </p:sp>
+      <p:cxnSp>
+        <p:nvCxnSpPr>
+          <p:cNvPr id="101" name="Straight Arrow Connector 100">
+            <a:extLst>
+              <a:ext uri="{FF2B5EF4-FFF2-40B4-BE49-F238E27FC236}">
+                <a16:creationId xmlns:a16="http://schemas.microsoft.com/office/drawing/2014/main" id="{4AD8D351-56D7-4A41-9F09-3CC873F20187}"/>
+              </a:ext>
+            </a:extLst>
+          </p:cNvPr>
+          <p:cNvCxnSpPr>
+            <a:cxnSpLocks/>
+            <a:stCxn id="65" idx="3"/>
+            <a:endCxn id="100" idx="1"/>
+          </p:cNvCxnSpPr>
+          <p:nvPr/>
+        </p:nvCxnSpPr>
+        <p:spPr>
+          <a:xfrm flipV="1">
+            <a:off x="7525854" y="2437682"/>
+            <a:ext cx="250552" cy="1613"/>
+          </a:xfrm>
+          <a:prstGeom prst="straightConnector1">
+            <a:avLst/>
+          </a:prstGeom>
+          <a:ln>
+            <a:solidFill>
+              <a:schemeClr val="tx1"/>
+            </a:solidFill>
+            <a:tailEnd type="triangle"/>
+          </a:ln>
+        </p:spPr>
+        <p:style>
+          <a:lnRef idx="1">
+            <a:schemeClr val="accent1"/>
+          </a:lnRef>
+          <a:fillRef idx="0">
+            <a:schemeClr val="accent1"/>
+          </a:fillRef>
+          <a:effectRef idx="0">
+            <a:schemeClr val="accent1"/>
+          </a:effectRef>
+          <a:fontRef idx="minor">
+            <a:schemeClr val="tx1"/>
+          </a:fontRef>
+        </p:style>
+      </p:cxnSp>
+      <p:sp>
+        <p:nvSpPr>
+          <p:cNvPr id="104" name="Oval 103">
+            <a:extLst>
+              <a:ext uri="{FF2B5EF4-FFF2-40B4-BE49-F238E27FC236}">
+                <a16:creationId xmlns:a16="http://schemas.microsoft.com/office/drawing/2014/main" id="{8F26C3A0-1CDF-4514-BFBA-22C9C1164C63}"/>
+              </a:ext>
+            </a:extLst>
+          </p:cNvPr>
+          <p:cNvSpPr/>
+          <p:nvPr/>
+        </p:nvSpPr>
+        <p:spPr>
+          <a:xfrm>
+            <a:off x="5969804" y="1402540"/>
+            <a:ext cx="339047" cy="246580"/>
+          </a:xfrm>
+          <a:prstGeom prst="ellipse">
+            <a:avLst/>
+          </a:prstGeom>
+          <a:solidFill>
+            <a:srgbClr val="FFC000"/>
+          </a:solidFill>
+        </p:spPr>
+        <p:style>
+          <a:lnRef idx="2">
+            <a:schemeClr val="accent1">
+              <a:shade val="50000"/>
+            </a:schemeClr>
+          </a:lnRef>
+          <a:fillRef idx="1">
+            <a:schemeClr val="accent1"/>
+          </a:fillRef>
+          <a:effectRef idx="0">
+            <a:schemeClr val="accent1"/>
+          </a:effectRef>
+          <a:fontRef idx="minor">
+            <a:schemeClr val="lt1"/>
+          </a:fontRef>
+        </p:style>
+        <p:txBody>
+          <a:bodyPr lIns="0" tIns="0" rIns="0" bIns="0" rtlCol="0" anchor="ctr"/>
+          <a:lstStyle/>
+          <a:p>
+            <a:pPr algn="ctr"/>
+            <a:r>
+              <a:rPr lang="en-IN" sz="1200" b="1" dirty="0">
+                <a:solidFill>
+                  <a:schemeClr val="tx1"/>
+                </a:solidFill>
+              </a:rPr>
+              <a:t>e6</a:t>
+            </a:r>
+            <a:endParaRPr lang="en-US" sz="1200" b="1" dirty="0">
+              <a:solidFill>
+                <a:schemeClr val="tx1"/>
+              </a:solidFill>
+            </a:endParaRPr>
+          </a:p>
+        </p:txBody>
+      </p:sp>
+      <p:sp>
+        <p:nvSpPr>
+          <p:cNvPr id="105" name="Oval 104">
+            <a:extLst>
+              <a:ext uri="{FF2B5EF4-FFF2-40B4-BE49-F238E27FC236}">
+                <a16:creationId xmlns:a16="http://schemas.microsoft.com/office/drawing/2014/main" id="{93EB16EF-21AE-453F-9A80-E46B4FE5AE39}"/>
+              </a:ext>
+            </a:extLst>
+          </p:cNvPr>
+          <p:cNvSpPr/>
+          <p:nvPr/>
+        </p:nvSpPr>
+        <p:spPr>
+          <a:xfrm>
+            <a:off x="5972266" y="2532820"/>
+            <a:ext cx="339047" cy="246580"/>
+          </a:xfrm>
+          <a:prstGeom prst="ellipse">
+            <a:avLst/>
+          </a:prstGeom>
+          <a:solidFill>
+            <a:srgbClr val="FFC000"/>
+          </a:solidFill>
+        </p:spPr>
+        <p:style>
+          <a:lnRef idx="2">
+            <a:schemeClr val="accent1">
+              <a:shade val="50000"/>
+            </a:schemeClr>
+          </a:lnRef>
+          <a:fillRef idx="1">
+            <a:schemeClr val="accent1"/>
+          </a:fillRef>
+          <a:effectRef idx="0">
+            <a:schemeClr val="accent1"/>
+          </a:effectRef>
+          <a:fontRef idx="minor">
+            <a:schemeClr val="lt1"/>
+          </a:fontRef>
+        </p:style>
+        <p:txBody>
+          <a:bodyPr lIns="0" tIns="0" rIns="0" bIns="0" rtlCol="0" anchor="ctr"/>
+          <a:lstStyle/>
+          <a:p>
+            <a:pPr algn="ctr"/>
+            <a:r>
+              <a:rPr lang="en-IN" sz="1200" b="1" dirty="0">
+                <a:solidFill>
+                  <a:schemeClr val="tx1"/>
+                </a:solidFill>
+              </a:rPr>
+              <a:t>e6</a:t>
+            </a:r>
+            <a:endParaRPr lang="en-US" sz="1200" b="1" dirty="0">
+              <a:solidFill>
+                <a:schemeClr val="tx1"/>
+              </a:solidFill>
+            </a:endParaRPr>
+          </a:p>
+        </p:txBody>
+      </p:sp>
+      <p:sp>
+        <p:nvSpPr>
+          <p:cNvPr id="106" name="Oval 105">
+            <a:extLst>
+              <a:ext uri="{FF2B5EF4-FFF2-40B4-BE49-F238E27FC236}">
+                <a16:creationId xmlns:a16="http://schemas.microsoft.com/office/drawing/2014/main" id="{9E1B09FF-CB4B-4495-BBC3-DC28BA49B803}"/>
+              </a:ext>
+            </a:extLst>
+          </p:cNvPr>
+          <p:cNvSpPr/>
+          <p:nvPr/>
+        </p:nvSpPr>
+        <p:spPr>
+          <a:xfrm>
+            <a:off x="7321340" y="2006297"/>
+            <a:ext cx="339047" cy="246580"/>
+          </a:xfrm>
+          <a:prstGeom prst="ellipse">
+            <a:avLst/>
+          </a:prstGeom>
+          <a:solidFill>
+            <a:srgbClr val="FFC000"/>
+          </a:solidFill>
+        </p:spPr>
+        <p:style>
+          <a:lnRef idx="2">
+            <a:schemeClr val="accent1">
+              <a:shade val="50000"/>
+            </a:schemeClr>
+          </a:lnRef>
+          <a:fillRef idx="1">
+            <a:schemeClr val="accent1"/>
+          </a:fillRef>
+          <a:effectRef idx="0">
+            <a:schemeClr val="accent1"/>
+          </a:effectRef>
+          <a:fontRef idx="minor">
+            <a:schemeClr val="lt1"/>
+          </a:fontRef>
+        </p:style>
+        <p:txBody>
+          <a:bodyPr lIns="0" tIns="0" rIns="0" bIns="0" rtlCol="0" anchor="ctr"/>
+          <a:lstStyle/>
+          <a:p>
+            <a:pPr algn="ctr"/>
+            <a:r>
+              <a:rPr lang="en-IN" sz="1200" b="1" dirty="0">
+                <a:solidFill>
+                  <a:schemeClr val="tx1"/>
+                </a:solidFill>
+              </a:rPr>
+              <a:t>e9</a:t>
+            </a:r>
+            <a:endParaRPr lang="en-US" sz="1200" b="1" dirty="0">
+              <a:solidFill>
+                <a:schemeClr val="tx1"/>
+              </a:solidFill>
+            </a:endParaRPr>
+          </a:p>
+        </p:txBody>
+      </p:sp>
+      <p:sp>
+        <p:nvSpPr>
+          <p:cNvPr id="7" name="Rectangle 6">
+            <a:extLst>
+              <a:ext uri="{FF2B5EF4-FFF2-40B4-BE49-F238E27FC236}">
+                <a16:creationId xmlns:a16="http://schemas.microsoft.com/office/drawing/2014/main" id="{86718F95-55C1-4DFC-8A04-F0ECC70C286E}"/>
+              </a:ext>
+            </a:extLst>
+          </p:cNvPr>
+          <p:cNvSpPr/>
+          <p:nvPr/>
+        </p:nvSpPr>
+        <p:spPr>
+          <a:xfrm>
+            <a:off x="435986" y="4220195"/>
+            <a:ext cx="10670378" cy="1461608"/>
+          </a:xfrm>
+          <a:prstGeom prst="rect">
+            <a:avLst/>
+          </a:prstGeom>
+        </p:spPr>
+        <p:style>
+          <a:lnRef idx="2">
+            <a:schemeClr val="accent1">
+              <a:shade val="50000"/>
+            </a:schemeClr>
+          </a:lnRef>
+          <a:fillRef idx="1">
+            <a:schemeClr val="accent1"/>
+          </a:fillRef>
+          <a:effectRef idx="0">
+            <a:schemeClr val="accent1"/>
+          </a:effectRef>
+          <a:fontRef idx="minor">
+            <a:schemeClr val="lt1"/>
+          </a:fontRef>
+        </p:style>
+        <p:txBody>
+          <a:bodyPr rtlCol="0" anchor="ctr"/>
+          <a:lstStyle/>
+          <a:p>
+            <a:r>
+              <a:rPr lang="en-IN" dirty="0"/>
+              <a:t>If an event has multiple handlers, </a:t>
+            </a:r>
+            <a:r>
+              <a:rPr lang="en-IN" dirty="0" err="1"/>
+              <a:t>nextEvents</a:t>
+            </a:r>
+            <a:r>
+              <a:rPr lang="en-IN" dirty="0"/>
+              <a:t> not permitted at main event level, only each handler must have </a:t>
+            </a:r>
+            <a:r>
+              <a:rPr lang="en-IN" dirty="0" err="1"/>
+              <a:t>nextEvents</a:t>
+            </a:r>
+            <a:endParaRPr lang="en-US" dirty="0"/>
+          </a:p>
+        </p:txBody>
+      </p:sp>
+    </p:spTree>
+    <p:custDataLst>
+      <p:custData r:id="rId1"/>
+      <p:custData r:id="rId2"/>
+    </p:custDataLst>
+    <p:extLst>
+      <p:ext uri="{BB962C8B-B14F-4D97-AF65-F5344CB8AC3E}">
+        <p14:creationId xmlns:p14="http://schemas.microsoft.com/office/powerpoint/2010/main" val="584604313"/>
+      </p:ext>
+    </p:extLst>
+  </p:cSld>
+  <p:clrMapOvr>
+    <a:masterClrMapping/>
+  </p:clrMapOvr>
+  <mc:AlternateContent xmlns:mc="http://schemas.openxmlformats.org/markup-compatibility/2006" xmlns:p14="http://schemas.microsoft.com/office/powerpoint/2010/main">
+    <mc:Choice Requires="p14">
+      <p:transition p14:dur="200">
+        <p:fade/>
+      </p:transition>
+    </mc:Choice>
+    <mc:Fallback xmlns="">
+      <p:transition>
+        <p:fade/>
+      </p:transition>
+    </mc:Fallback>
+  </mc:AlternateContent>
+</p:sld>
+</file>
+
+<file path=ppt/slides/slide5.xml><?xml version="1.0" encoding="utf-8"?>
+<p:sld xmlns:a="http://schemas.openxmlformats.org/drawingml/2006/main" xmlns:r="http://schemas.openxmlformats.org/officeDocument/2006/relationships" xmlns:p="http://schemas.openxmlformats.org/presentationml/2006/main">
+  <p:cSld>
+    <p:spTree>
+      <p:nvGrpSpPr>
+        <p:cNvPr id="1" name=""/>
+        <p:cNvGrpSpPr/>
+        <p:nvPr/>
+      </p:nvGrpSpPr>
+      <p:grpSpPr>
+        <a:xfrm>
+          <a:off x="0" y="0"/>
+          <a:ext cx="0" cy="0"/>
+          <a:chOff x="0" y="0"/>
+          <a:chExt cx="0" cy="0"/>
+        </a:xfrm>
+      </p:grpSpPr>
+      <p:sp>
+        <p:nvSpPr>
+          <p:cNvPr id="2" name="Title 1">
+            <a:extLst>
+              <a:ext uri="{FF2B5EF4-FFF2-40B4-BE49-F238E27FC236}">
+                <a16:creationId xmlns:a16="http://schemas.microsoft.com/office/drawing/2014/main" id="{F3802A6F-0493-7845-9E0B-F82F7ED5C4E8}"/>
+              </a:ext>
+            </a:extLst>
+          </p:cNvPr>
+          <p:cNvSpPr>
+            <a:spLocks noGrp="1"/>
+          </p:cNvSpPr>
+          <p:nvPr>
+            <p:ph type="title"/>
+          </p:nvPr>
+        </p:nvSpPr>
+        <p:spPr>
+          <a:xfrm>
             <a:off x="582579" y="314520"/>
             <a:ext cx="10031916" cy="958849"/>
           </a:xfrm>
@@ -8715,7 +11621,7 @@
 </p:sld>
 </file>
 
-<file path=ppt/slides/slide5.xml><?xml version="1.0" encoding="utf-8"?>
+<file path=ppt/slides/slide6.xml><?xml version="1.0" encoding="utf-8"?>
 <p:sld xmlns:a="http://schemas.openxmlformats.org/drawingml/2006/main" xmlns:r="http://schemas.openxmlformats.org/officeDocument/2006/relationships" xmlns:p="http://schemas.openxmlformats.org/presentationml/2006/main">
   <p:cSld>
     <p:spTree>
@@ -10735,7 +13641,7 @@
 </p:sld>
 </file>
 
-<file path=ppt/slides/slide6.xml><?xml version="1.0" encoding="utf-8"?>
+<file path=ppt/slides/slide7.xml><?xml version="1.0" encoding="utf-8"?>
 <p:sld xmlns:a="http://schemas.openxmlformats.org/drawingml/2006/main" xmlns:r="http://schemas.openxmlformats.org/officeDocument/2006/relationships" xmlns:p="http://schemas.openxmlformats.org/presentationml/2006/main">
   <p:cSld>
     <p:spTree>
@@ -12573,15 +15479,15 @@
 </file>
 
 <file path=customXml/item1.xml><?xml version="1.0" encoding="utf-8"?>
+<TemplafySlideFormConfiguration><![CDATA[{"formFields":[],"formDataEntries":[]}]]></TemplafySlideFormConfiguration>
+</file>
+
+<file path=customXml/item10.xml><?xml version="1.0" encoding="utf-8"?>
 <TemplafySlideTemplateConfiguration><![CDATA[{"slideVersion":1,"isValidatorEnabled":false,"isLocked":false,"elementsMetadata":[],"slideId":"637509723489077409","enableDocumentContentUpdater":false,"version":"2.0"}]]></TemplafySlideTemplateConfiguration>
 </file>
 
-<file path=customXml/item10.xml><?xml version="1.0" encoding="utf-8"?>
-<TemplafySlideFormConfiguration><![CDATA[{"formFields":[],"formDataEntries":[]}]]></TemplafySlideFormConfiguration>
-</file>
-
 <file path=customXml/item11.xml><?xml version="1.0" encoding="utf-8"?>
-<TemplafySlideFormConfiguration><![CDATA[{"formFields":[],"formDataEntries":[]}]]></TemplafySlideFormConfiguration>
+<TemplafySlideTemplateConfiguration><![CDATA[{"slideVersion":1,"isValidatorEnabled":false,"isLocked":false,"elementsMetadata":[],"slideId":"637509723489077409","enableDocumentContentUpdater":false,"version":"2.0"}]]></TemplafySlideTemplateConfiguration>
 </file>
 
 <file path=customXml/item12.xml><?xml version="1.0" encoding="utf-8"?>
@@ -12589,10 +15495,18 @@
 </file>
 
 <file path=customXml/item13.xml><?xml version="1.0" encoding="utf-8"?>
+<TemplafySlideFormConfiguration><![CDATA[{"formFields":[],"formDataEntries":[]}]]></TemplafySlideFormConfiguration>
+</file>
+
+<file path=customXml/item14.xml><?xml version="1.0" encoding="utf-8"?>
 <TemplafySlideTemplateConfiguration><![CDATA[{"slideVersion":1,"isValidatorEnabled":false,"isLocked":false,"elementsMetadata":[],"slideId":"637509723489077409","enableDocumentContentUpdater":false,"version":"2.0"}]]></TemplafySlideTemplateConfiguration>
 </file>
 
-<file path=customXml/item14.xml><?xml version="1.0" encoding="utf-8"?>
+<file path=customXml/item15.xml><?xml version="1.0" encoding="utf-8"?>
+<TemplafySlideTemplateConfiguration><![CDATA[{"slideVersion":1,"isValidatorEnabled":false,"isLocked":false,"elementsMetadata":[],"slideId":"637509723489077409","enableDocumentContentUpdater":false,"version":"2.0"}]]></TemplafySlideTemplateConfiguration>
+</file>
+
+<file path=customXml/item16.xml><?xml version="1.0" encoding="utf-8"?>
 <TemplafySlideFormConfiguration><![CDATA[{"formFields":[],"formDataEntries":[]}]]></TemplafySlideFormConfiguration>
 </file>
 
@@ -12605,7 +15519,7 @@
 </file>
 
 <file path=customXml/item4.xml><?xml version="1.0" encoding="utf-8"?>
-<TemplafySlideTemplateConfiguration><![CDATA[{"slideVersion":1,"isValidatorEnabled":false,"isLocked":false,"elementsMetadata":[],"slideId":"637509723489077409","enableDocumentContentUpdater":false,"version":"2.0"}]]></TemplafySlideTemplateConfiguration>
+<TemplafySlideFormConfiguration><![CDATA[{"formFields":[],"formDataEntries":[]}]]></TemplafySlideFormConfiguration>
 </file>
 
 <file path=customXml/item5.xml><?xml version="1.0" encoding="utf-8"?>
@@ -12617,7 +15531,7 @@
 </file>
 
 <file path=customXml/item7.xml><?xml version="1.0" encoding="utf-8"?>
-<TemplafySlideTemplateConfiguration><![CDATA[{"slideVersion":1,"isValidatorEnabled":false,"isLocked":false,"elementsMetadata":[],"slideId":"637509723489077409","enableDocumentContentUpdater":false,"version":"2.0"}]]></TemplafySlideTemplateConfiguration>
+<TemplafySlideFormConfiguration><![CDATA[{"formFields":[],"formDataEntries":[]}]]></TemplafySlideFormConfiguration>
 </file>
 
 <file path=customXml/item8.xml><?xml version="1.0" encoding="utf-8"?>
@@ -12625,23 +15539,23 @@
 </file>
 
 <file path=customXml/item9.xml><?xml version="1.0" encoding="utf-8"?>
-<TemplafySlideFormConfiguration><![CDATA[{"formFields":[],"formDataEntries":[]}]]></TemplafySlideFormConfiguration>
+<TemplafySlideTemplateConfiguration><![CDATA[{"slideVersion":1,"isValidatorEnabled":false,"isLocked":false,"elementsMetadata":[],"slideId":"637509723489077409","enableDocumentContentUpdater":false,"version":"2.0"}]]></TemplafySlideTemplateConfiguration>
 </file>
 
 <file path=customXml/itemProps1.xml><?xml version="1.0" encoding="utf-8"?>
-<ds:datastoreItem xmlns:ds="http://schemas.openxmlformats.org/officeDocument/2006/customXml" ds:itemID="{3EDC3CFB-00B6-4A76-A4F8-213B80511C87}">
+<ds:datastoreItem xmlns:ds="http://schemas.openxmlformats.org/officeDocument/2006/customXml" ds:itemID="{595D5F3C-8793-4B6C-9392-9FA7E76F1396}">
   <ds:schemaRefs/>
 </ds:datastoreItem>
 </file>
 
 <file path=customXml/itemProps10.xml><?xml version="1.0" encoding="utf-8"?>
-<ds:datastoreItem xmlns:ds="http://schemas.openxmlformats.org/officeDocument/2006/customXml" ds:itemID="{644E3CC3-5418-4967-B084-476DADC75B9C}">
+<ds:datastoreItem xmlns:ds="http://schemas.openxmlformats.org/officeDocument/2006/customXml" ds:itemID="{9235110C-C9EF-4C66-A23F-31003A5550F5}">
   <ds:schemaRefs/>
 </ds:datastoreItem>
 </file>
 
 <file path=customXml/itemProps11.xml><?xml version="1.0" encoding="utf-8"?>
-<ds:datastoreItem xmlns:ds="http://schemas.openxmlformats.org/officeDocument/2006/customXml" ds:itemID="{BF04C681-3F73-4EBC-97E2-D1FC67EC72D0}">
+<ds:datastoreItem xmlns:ds="http://schemas.openxmlformats.org/officeDocument/2006/customXml" ds:itemID="{CB0A619E-115B-4A5D-A2D2-ADEC52679995}">
   <ds:schemaRefs/>
 </ds:datastoreItem>
 </file>
@@ -12653,49 +15567,61 @@
 </file>
 
 <file path=customXml/itemProps13.xml><?xml version="1.0" encoding="utf-8"?>
-<ds:datastoreItem xmlns:ds="http://schemas.openxmlformats.org/officeDocument/2006/customXml" ds:itemID="{2077663B-A081-4BE3-8467-95F59823B03F}">
+<ds:datastoreItem xmlns:ds="http://schemas.openxmlformats.org/officeDocument/2006/customXml" ds:itemID="{15ACA71F-45FC-4468-B737-845C2FDCD2DF}">
   <ds:schemaRefs/>
 </ds:datastoreItem>
 </file>
 
 <file path=customXml/itemProps14.xml><?xml version="1.0" encoding="utf-8"?>
-<ds:datastoreItem xmlns:ds="http://schemas.openxmlformats.org/officeDocument/2006/customXml" ds:itemID="{0C480300-50D9-4E05-8924-BFE13304B73E}">
+<ds:datastoreItem xmlns:ds="http://schemas.openxmlformats.org/officeDocument/2006/customXml" ds:itemID="{3EDC3CFB-00B6-4A76-A4F8-213B80511C87}">
+  <ds:schemaRefs/>
+</ds:datastoreItem>
+</file>
+
+<file path=customXml/itemProps15.xml><?xml version="1.0" encoding="utf-8"?>
+<ds:datastoreItem xmlns:ds="http://schemas.openxmlformats.org/officeDocument/2006/customXml" ds:itemID="{D45FD69B-AA4B-47EA-8C90-E4848817C9DA}">
+  <ds:schemaRefs/>
+</ds:datastoreItem>
+</file>
+
+<file path=customXml/itemProps16.xml><?xml version="1.0" encoding="utf-8"?>
+<ds:datastoreItem xmlns:ds="http://schemas.openxmlformats.org/officeDocument/2006/customXml" ds:itemID="{D9DD55CC-8181-41DF-AB11-D31D3DE8977E}">
   <ds:schemaRefs/>
 </ds:datastoreItem>
 </file>
 
 <file path=customXml/itemProps2.xml><?xml version="1.0" encoding="utf-8"?>
-<ds:datastoreItem xmlns:ds="http://schemas.openxmlformats.org/officeDocument/2006/customXml" ds:itemID="{15ACA71F-45FC-4468-B737-845C2FDCD2DF}">
+<ds:datastoreItem xmlns:ds="http://schemas.openxmlformats.org/officeDocument/2006/customXml" ds:itemID="{BF04C681-3F73-4EBC-97E2-D1FC67EC72D0}">
   <ds:schemaRefs/>
 </ds:datastoreItem>
 </file>
 
 <file path=customXml/itemProps3.xml><?xml version="1.0" encoding="utf-8"?>
-<ds:datastoreItem xmlns:ds="http://schemas.openxmlformats.org/officeDocument/2006/customXml" ds:itemID="{9235110C-C9EF-4C66-A23F-31003A5550F5}">
+<ds:datastoreItem xmlns:ds="http://schemas.openxmlformats.org/officeDocument/2006/customXml" ds:itemID="{2C32BD2C-3EFF-4CDB-B659-B2B4E7B7C3F7}">
   <ds:schemaRefs/>
 </ds:datastoreItem>
 </file>
 
 <file path=customXml/itemProps4.xml><?xml version="1.0" encoding="utf-8"?>
+<ds:datastoreItem xmlns:ds="http://schemas.openxmlformats.org/officeDocument/2006/customXml" ds:itemID="{644E3CC3-5418-4967-B084-476DADC75B9C}">
+  <ds:schemaRefs/>
+</ds:datastoreItem>
+</file>
+
+<file path=customXml/itemProps5.xml><?xml version="1.0" encoding="utf-8"?>
 <ds:datastoreItem xmlns:ds="http://schemas.openxmlformats.org/officeDocument/2006/customXml" ds:itemID="{7FECE985-881C-406F-816D-58AEE74D8F1C}">
   <ds:schemaRefs/>
 </ds:datastoreItem>
 </file>
 
-<file path=customXml/itemProps5.xml><?xml version="1.0" encoding="utf-8"?>
-<ds:datastoreItem xmlns:ds="http://schemas.openxmlformats.org/officeDocument/2006/customXml" ds:itemID="{2C32BD2C-3EFF-4CDB-B659-B2B4E7B7C3F7}">
-  <ds:schemaRefs/>
-</ds:datastoreItem>
-</file>
-
 <file path=customXml/itemProps6.xml><?xml version="1.0" encoding="utf-8"?>
-<ds:datastoreItem xmlns:ds="http://schemas.openxmlformats.org/officeDocument/2006/customXml" ds:itemID="{595D5F3C-8793-4B6C-9392-9FA7E76F1396}">
+<ds:datastoreItem xmlns:ds="http://schemas.openxmlformats.org/officeDocument/2006/customXml" ds:itemID="{E7DCFFA5-1C0A-475A-8D4B-D9408E8F38DD}">
   <ds:schemaRefs/>
 </ds:datastoreItem>
 </file>
 
 <file path=customXml/itemProps7.xml><?xml version="1.0" encoding="utf-8"?>
-<ds:datastoreItem xmlns:ds="http://schemas.openxmlformats.org/officeDocument/2006/customXml" ds:itemID="{CB0A619E-115B-4A5D-A2D2-ADEC52679995}">
+<ds:datastoreItem xmlns:ds="http://schemas.openxmlformats.org/officeDocument/2006/customXml" ds:itemID="{0C480300-50D9-4E05-8924-BFE13304B73E}">
   <ds:schemaRefs/>
 </ds:datastoreItem>
 </file>
@@ -12707,7 +15633,7 @@
 </file>
 
 <file path=customXml/itemProps9.xml><?xml version="1.0" encoding="utf-8"?>
-<ds:datastoreItem xmlns:ds="http://schemas.openxmlformats.org/officeDocument/2006/customXml" ds:itemID="{E7DCFFA5-1C0A-475A-8D4B-D9408E8F38DD}">
+<ds:datastoreItem xmlns:ds="http://schemas.openxmlformats.org/officeDocument/2006/customXml" ds:itemID="{2077663B-A081-4BE3-8467-95F59823B03F}">
   <ds:schemaRefs/>
 </ds:datastoreItem>
 </file>
</xml_diff>